<commit_message>
course agenda edits post baby
</commit_message>
<xml_diff>
--- a/slides/cds431_week7_1.pptx
+++ b/slides/cds431_week7_1.pptx
@@ -5,13 +5,14 @@
     <p:sldMasterId id="2147483648" r:id="rId1"/>
   </p:sldMasterIdLst>
   <p:notesMasterIdLst>
-    <p:notesMasterId r:id="rId6"/>
+    <p:notesMasterId r:id="rId7"/>
   </p:notesMasterIdLst>
   <p:sldIdLst>
-    <p:sldId id="578" r:id="rId2"/>
-    <p:sldId id="463" r:id="rId3"/>
-    <p:sldId id="573" r:id="rId4"/>
-    <p:sldId id="446" r:id="rId5"/>
+    <p:sldId id="428" r:id="rId2"/>
+    <p:sldId id="429" r:id="rId3"/>
+    <p:sldId id="430" r:id="rId4"/>
+    <p:sldId id="461" r:id="rId5"/>
+    <p:sldId id="369" r:id="rId6"/>
   </p:sldIdLst>
   <p:sldSz cx="12192000" cy="6858000"/>
   <p:notesSz cx="6858000" cy="9144000"/>
@@ -118,2657 +119,6 @@
 </p:presentation>
 </file>
 
-<file path=ppt/diagrams/colors1.xml><?xml version="1.0" encoding="utf-8"?>
-<dgm:colorsDef xmlns:dgm="http://schemas.openxmlformats.org/drawingml/2006/diagram" xmlns:a="http://schemas.openxmlformats.org/drawingml/2006/main" uniqueId="urn:microsoft.com/office/officeart/2005/8/colors/colorful2">
-  <dgm:title val=""/>
-  <dgm:desc val=""/>
-  <dgm:catLst>
-    <dgm:cat type="colorful" pri="10200"/>
-  </dgm:catLst>
-  <dgm:styleLbl name="node0">
-    <dgm:fillClrLst meth="repeat">
-      <a:schemeClr val="accent1"/>
-    </dgm:fillClrLst>
-    <dgm:linClrLst meth="repeat">
-      <a:schemeClr val="lt1"/>
-    </dgm:linClrLst>
-    <dgm:effectClrLst/>
-    <dgm:txLinClrLst/>
-    <dgm:txFillClrLst/>
-    <dgm:txEffectClrLst/>
-  </dgm:styleLbl>
-  <dgm:styleLbl name="node1">
-    <dgm:fillClrLst>
-      <a:schemeClr val="accent2"/>
-      <a:schemeClr val="accent3"/>
-    </dgm:fillClrLst>
-    <dgm:linClrLst meth="repeat">
-      <a:schemeClr val="lt1"/>
-    </dgm:linClrLst>
-    <dgm:effectClrLst/>
-    <dgm:txLinClrLst/>
-    <dgm:txFillClrLst/>
-    <dgm:txEffectClrLst/>
-  </dgm:styleLbl>
-  <dgm:styleLbl name="alignNode1">
-    <dgm:fillClrLst>
-      <a:schemeClr val="accent2"/>
-      <a:schemeClr val="accent3"/>
-    </dgm:fillClrLst>
-    <dgm:linClrLst>
-      <a:schemeClr val="accent2"/>
-      <a:schemeClr val="accent3"/>
-    </dgm:linClrLst>
-    <dgm:effectClrLst/>
-    <dgm:txLinClrLst/>
-    <dgm:txFillClrLst/>
-    <dgm:txEffectClrLst/>
-  </dgm:styleLbl>
-  <dgm:styleLbl name="lnNode1">
-    <dgm:fillClrLst>
-      <a:schemeClr val="accent2"/>
-      <a:schemeClr val="accent3"/>
-    </dgm:fillClrLst>
-    <dgm:linClrLst meth="repeat">
-      <a:schemeClr val="lt1"/>
-    </dgm:linClrLst>
-    <dgm:effectClrLst/>
-    <dgm:txLinClrLst/>
-    <dgm:txFillClrLst/>
-    <dgm:txEffectClrLst/>
-  </dgm:styleLbl>
-  <dgm:styleLbl name="vennNode1">
-    <dgm:fillClrLst>
-      <a:schemeClr val="accent2">
-        <a:alpha val="50000"/>
-      </a:schemeClr>
-      <a:schemeClr val="accent3">
-        <a:alpha val="50000"/>
-      </a:schemeClr>
-    </dgm:fillClrLst>
-    <dgm:linClrLst meth="repeat">
-      <a:schemeClr val="lt1"/>
-    </dgm:linClrLst>
-    <dgm:effectClrLst/>
-    <dgm:txLinClrLst/>
-    <dgm:txFillClrLst/>
-    <dgm:txEffectClrLst/>
-  </dgm:styleLbl>
-  <dgm:styleLbl name="node2">
-    <dgm:fillClrLst>
-      <a:schemeClr val="accent3"/>
-    </dgm:fillClrLst>
-    <dgm:linClrLst meth="repeat">
-      <a:schemeClr val="lt1"/>
-    </dgm:linClrLst>
-    <dgm:effectClrLst/>
-    <dgm:txLinClrLst/>
-    <dgm:txFillClrLst/>
-    <dgm:txEffectClrLst/>
-  </dgm:styleLbl>
-  <dgm:styleLbl name="node3">
-    <dgm:fillClrLst>
-      <a:schemeClr val="accent4"/>
-    </dgm:fillClrLst>
-    <dgm:linClrLst meth="repeat">
-      <a:schemeClr val="lt1"/>
-    </dgm:linClrLst>
-    <dgm:effectClrLst/>
-    <dgm:txLinClrLst/>
-    <dgm:txFillClrLst/>
-    <dgm:txEffectClrLst/>
-  </dgm:styleLbl>
-  <dgm:styleLbl name="node4">
-    <dgm:fillClrLst>
-      <a:schemeClr val="accent5"/>
-    </dgm:fillClrLst>
-    <dgm:linClrLst meth="repeat">
-      <a:schemeClr val="lt1"/>
-    </dgm:linClrLst>
-    <dgm:effectClrLst/>
-    <dgm:txLinClrLst/>
-    <dgm:txFillClrLst/>
-    <dgm:txEffectClrLst/>
-  </dgm:styleLbl>
-  <dgm:styleLbl name="fgImgPlace1">
-    <dgm:fillClrLst>
-      <a:schemeClr val="accent2">
-        <a:tint val="50000"/>
-      </a:schemeClr>
-      <a:schemeClr val="accent3">
-        <a:tint val="50000"/>
-      </a:schemeClr>
-    </dgm:fillClrLst>
-    <dgm:linClrLst meth="repeat">
-      <a:schemeClr val="lt1"/>
-    </dgm:linClrLst>
-    <dgm:effectClrLst/>
-    <dgm:txLinClrLst/>
-    <dgm:txFillClrLst meth="repeat">
-      <a:schemeClr val="lt1"/>
-    </dgm:txFillClrLst>
-    <dgm:txEffectClrLst/>
-  </dgm:styleLbl>
-  <dgm:styleLbl name="alignImgPlace1">
-    <dgm:fillClrLst>
-      <a:schemeClr val="accent2">
-        <a:tint val="50000"/>
-      </a:schemeClr>
-      <a:schemeClr val="accent3">
-        <a:tint val="20000"/>
-      </a:schemeClr>
-    </dgm:fillClrLst>
-    <dgm:linClrLst meth="repeat">
-      <a:schemeClr val="lt1"/>
-    </dgm:linClrLst>
-    <dgm:effectClrLst/>
-    <dgm:txLinClrLst/>
-    <dgm:txFillClrLst meth="repeat">
-      <a:schemeClr val="lt1"/>
-    </dgm:txFillClrLst>
-    <dgm:txEffectClrLst/>
-  </dgm:styleLbl>
-  <dgm:styleLbl name="bgImgPlace1">
-    <dgm:fillClrLst>
-      <a:schemeClr val="accent2">
-        <a:tint val="50000"/>
-      </a:schemeClr>
-      <a:schemeClr val="accent3">
-        <a:tint val="20000"/>
-      </a:schemeClr>
-    </dgm:fillClrLst>
-    <dgm:linClrLst meth="repeat">
-      <a:schemeClr val="lt1"/>
-    </dgm:linClrLst>
-    <dgm:effectClrLst/>
-    <dgm:txLinClrLst/>
-    <dgm:txFillClrLst meth="repeat">
-      <a:schemeClr val="lt1"/>
-    </dgm:txFillClrLst>
-    <dgm:txEffectClrLst/>
-  </dgm:styleLbl>
-  <dgm:styleLbl name="sibTrans2D1">
-    <dgm:fillClrLst>
-      <a:schemeClr val="accent2"/>
-      <a:schemeClr val="accent3"/>
-    </dgm:fillClrLst>
-    <dgm:linClrLst meth="repeat">
-      <a:schemeClr val="lt1"/>
-    </dgm:linClrLst>
-    <dgm:effectClrLst/>
-    <dgm:txLinClrLst/>
-    <dgm:txFillClrLst/>
-    <dgm:txEffectClrLst/>
-  </dgm:styleLbl>
-  <dgm:styleLbl name="fgSibTrans2D1">
-    <dgm:fillClrLst>
-      <a:schemeClr val="accent2"/>
-      <a:schemeClr val="accent3"/>
-    </dgm:fillClrLst>
-    <dgm:linClrLst meth="repeat">
-      <a:schemeClr val="lt1"/>
-    </dgm:linClrLst>
-    <dgm:effectClrLst/>
-    <dgm:txLinClrLst/>
-    <dgm:txFillClrLst meth="repeat">
-      <a:schemeClr val="lt1"/>
-    </dgm:txFillClrLst>
-    <dgm:txEffectClrLst/>
-  </dgm:styleLbl>
-  <dgm:styleLbl name="bgSibTrans2D1">
-    <dgm:fillClrLst>
-      <a:schemeClr val="accent2"/>
-      <a:schemeClr val="accent3"/>
-    </dgm:fillClrLst>
-    <dgm:linClrLst meth="repeat">
-      <a:schemeClr val="lt1"/>
-    </dgm:linClrLst>
-    <dgm:effectClrLst/>
-    <dgm:txLinClrLst/>
-    <dgm:txFillClrLst meth="repeat">
-      <a:schemeClr val="lt1"/>
-    </dgm:txFillClrLst>
-    <dgm:txEffectClrLst/>
-  </dgm:styleLbl>
-  <dgm:styleLbl name="sibTrans1D1">
-    <dgm:fillClrLst/>
-    <dgm:linClrLst>
-      <a:schemeClr val="accent2"/>
-      <a:schemeClr val="accent3"/>
-    </dgm:linClrLst>
-    <dgm:effectClrLst/>
-    <dgm:txLinClrLst/>
-    <dgm:txFillClrLst meth="repeat">
-      <a:schemeClr val="tx1"/>
-    </dgm:txFillClrLst>
-    <dgm:txEffectClrLst/>
-  </dgm:styleLbl>
-  <dgm:styleLbl name="callout">
-    <dgm:fillClrLst meth="repeat">
-      <a:schemeClr val="accent2"/>
-    </dgm:fillClrLst>
-    <dgm:linClrLst meth="repeat">
-      <a:schemeClr val="accent2">
-        <a:tint val="50000"/>
-      </a:schemeClr>
-    </dgm:linClrLst>
-    <dgm:effectClrLst/>
-    <dgm:txLinClrLst/>
-    <dgm:txFillClrLst meth="repeat">
-      <a:schemeClr val="tx1"/>
-    </dgm:txFillClrLst>
-    <dgm:txEffectClrLst/>
-  </dgm:styleLbl>
-  <dgm:styleLbl name="asst0">
-    <dgm:fillClrLst meth="repeat">
-      <a:schemeClr val="accent2"/>
-    </dgm:fillClrLst>
-    <dgm:linClrLst meth="repeat">
-      <a:schemeClr val="lt1">
-        <a:shade val="80000"/>
-      </a:schemeClr>
-    </dgm:linClrLst>
-    <dgm:effectClrLst/>
-    <dgm:txLinClrLst/>
-    <dgm:txFillClrLst/>
-    <dgm:txEffectClrLst/>
-  </dgm:styleLbl>
-  <dgm:styleLbl name="asst1">
-    <dgm:fillClrLst meth="repeat">
-      <a:schemeClr val="accent3"/>
-    </dgm:fillClrLst>
-    <dgm:linClrLst meth="repeat">
-      <a:schemeClr val="lt1">
-        <a:shade val="80000"/>
-      </a:schemeClr>
-    </dgm:linClrLst>
-    <dgm:effectClrLst/>
-    <dgm:txLinClrLst/>
-    <dgm:txFillClrLst/>
-    <dgm:txEffectClrLst/>
-  </dgm:styleLbl>
-  <dgm:styleLbl name="asst2">
-    <dgm:fillClrLst>
-      <a:schemeClr val="accent4"/>
-    </dgm:fillClrLst>
-    <dgm:linClrLst meth="repeat">
-      <a:schemeClr val="lt1"/>
-    </dgm:linClrLst>
-    <dgm:effectClrLst/>
-    <dgm:txLinClrLst/>
-    <dgm:txFillClrLst/>
-    <dgm:txEffectClrLst/>
-  </dgm:styleLbl>
-  <dgm:styleLbl name="asst3">
-    <dgm:fillClrLst>
-      <a:schemeClr val="accent5"/>
-    </dgm:fillClrLst>
-    <dgm:linClrLst meth="repeat">
-      <a:schemeClr val="lt1"/>
-    </dgm:linClrLst>
-    <dgm:effectClrLst/>
-    <dgm:txLinClrLst/>
-    <dgm:txFillClrLst/>
-    <dgm:txEffectClrLst/>
-  </dgm:styleLbl>
-  <dgm:styleLbl name="asst4">
-    <dgm:fillClrLst>
-      <a:schemeClr val="accent6"/>
-    </dgm:fillClrLst>
-    <dgm:linClrLst meth="repeat">
-      <a:schemeClr val="lt1"/>
-    </dgm:linClrLst>
-    <dgm:effectClrLst/>
-    <dgm:txLinClrLst/>
-    <dgm:txFillClrLst/>
-    <dgm:txEffectClrLst/>
-  </dgm:styleLbl>
-  <dgm:styleLbl name="parChTrans2D1">
-    <dgm:fillClrLst meth="repeat">
-      <a:schemeClr val="accent2"/>
-    </dgm:fillClrLst>
-    <dgm:linClrLst meth="repeat">
-      <a:schemeClr val="lt1"/>
-    </dgm:linClrLst>
-    <dgm:effectClrLst/>
-    <dgm:txLinClrLst/>
-    <dgm:txFillClrLst meth="repeat">
-      <a:schemeClr val="lt1"/>
-    </dgm:txFillClrLst>
-    <dgm:txEffectClrLst/>
-  </dgm:styleLbl>
-  <dgm:styleLbl name="parChTrans2D2">
-    <dgm:fillClrLst meth="repeat">
-      <a:schemeClr val="accent3"/>
-    </dgm:fillClrLst>
-    <dgm:linClrLst meth="repeat">
-      <a:schemeClr val="lt1"/>
-    </dgm:linClrLst>
-    <dgm:effectClrLst/>
-    <dgm:txLinClrLst/>
-    <dgm:txFillClrLst/>
-    <dgm:txEffectClrLst/>
-  </dgm:styleLbl>
-  <dgm:styleLbl name="parChTrans2D3">
-    <dgm:fillClrLst meth="repeat">
-      <a:schemeClr val="accent4"/>
-    </dgm:fillClrLst>
-    <dgm:linClrLst meth="repeat">
-      <a:schemeClr val="lt1"/>
-    </dgm:linClrLst>
-    <dgm:effectClrLst/>
-    <dgm:txLinClrLst/>
-    <dgm:txFillClrLst/>
-    <dgm:txEffectClrLst/>
-  </dgm:styleLbl>
-  <dgm:styleLbl name="parChTrans2D4">
-    <dgm:fillClrLst meth="repeat">
-      <a:schemeClr val="accent5"/>
-    </dgm:fillClrLst>
-    <dgm:linClrLst meth="repeat">
-      <a:schemeClr val="lt1"/>
-    </dgm:linClrLst>
-    <dgm:effectClrLst/>
-    <dgm:txLinClrLst/>
-    <dgm:txFillClrLst meth="repeat">
-      <a:schemeClr val="lt1"/>
-    </dgm:txFillClrLst>
-    <dgm:txEffectClrLst/>
-  </dgm:styleLbl>
-  <dgm:styleLbl name="parChTrans1D1">
-    <dgm:fillClrLst meth="repeat">
-      <a:schemeClr val="accent2"/>
-    </dgm:fillClrLst>
-    <dgm:linClrLst meth="repeat">
-      <a:schemeClr val="accent2"/>
-    </dgm:linClrLst>
-    <dgm:effectClrLst/>
-    <dgm:txLinClrLst/>
-    <dgm:txFillClrLst meth="repeat">
-      <a:schemeClr val="tx1"/>
-    </dgm:txFillClrLst>
-    <dgm:txEffectClrLst/>
-  </dgm:styleLbl>
-  <dgm:styleLbl name="parChTrans1D2">
-    <dgm:fillClrLst meth="repeat">
-      <a:schemeClr val="accent2">
-        <a:tint val="90000"/>
-      </a:schemeClr>
-    </dgm:fillClrLst>
-    <dgm:linClrLst meth="repeat">
-      <a:schemeClr val="accent3"/>
-    </dgm:linClrLst>
-    <dgm:effectClrLst/>
-    <dgm:txLinClrLst/>
-    <dgm:txFillClrLst meth="repeat">
-      <a:schemeClr val="tx1"/>
-    </dgm:txFillClrLst>
-    <dgm:txEffectClrLst/>
-  </dgm:styleLbl>
-  <dgm:styleLbl name="parChTrans1D3">
-    <dgm:fillClrLst meth="repeat">
-      <a:schemeClr val="accent2">
-        <a:tint val="70000"/>
-      </a:schemeClr>
-    </dgm:fillClrLst>
-    <dgm:linClrLst meth="repeat">
-      <a:schemeClr val="accent4"/>
-    </dgm:linClrLst>
-    <dgm:effectClrLst/>
-    <dgm:txLinClrLst/>
-    <dgm:txFillClrLst meth="repeat">
-      <a:schemeClr val="tx1"/>
-    </dgm:txFillClrLst>
-    <dgm:txEffectClrLst/>
-  </dgm:styleLbl>
-  <dgm:styleLbl name="parChTrans1D4">
-    <dgm:fillClrLst meth="repeat">
-      <a:schemeClr val="accent2">
-        <a:tint val="50000"/>
-      </a:schemeClr>
-    </dgm:fillClrLst>
-    <dgm:linClrLst meth="repeat">
-      <a:schemeClr val="accent5"/>
-    </dgm:linClrLst>
-    <dgm:effectClrLst/>
-    <dgm:txLinClrLst/>
-    <dgm:txFillClrLst meth="repeat">
-      <a:schemeClr val="tx1"/>
-    </dgm:txFillClrLst>
-    <dgm:txEffectClrLst/>
-  </dgm:styleLbl>
-  <dgm:styleLbl name="fgAcc1">
-    <dgm:fillClrLst meth="repeat">
-      <a:schemeClr val="lt1">
-        <a:alpha val="90000"/>
-      </a:schemeClr>
-    </dgm:fillClrLst>
-    <dgm:linClrLst>
-      <a:schemeClr val="accent2"/>
-      <a:schemeClr val="accent3"/>
-    </dgm:linClrLst>
-    <dgm:effectClrLst/>
-    <dgm:txLinClrLst/>
-    <dgm:txFillClrLst meth="repeat">
-      <a:schemeClr val="dk1"/>
-    </dgm:txFillClrLst>
-    <dgm:txEffectClrLst/>
-  </dgm:styleLbl>
-  <dgm:styleLbl name="conFgAcc1">
-    <dgm:fillClrLst meth="repeat">
-      <a:schemeClr val="lt1">
-        <a:alpha val="90000"/>
-      </a:schemeClr>
-    </dgm:fillClrLst>
-    <dgm:linClrLst>
-      <a:schemeClr val="accent2"/>
-      <a:schemeClr val="accent3"/>
-    </dgm:linClrLst>
-    <dgm:effectClrLst/>
-    <dgm:txLinClrLst/>
-    <dgm:txFillClrLst meth="repeat">
-      <a:schemeClr val="dk1"/>
-    </dgm:txFillClrLst>
-    <dgm:txEffectClrLst/>
-  </dgm:styleLbl>
-  <dgm:styleLbl name="alignAcc1">
-    <dgm:fillClrLst meth="repeat">
-      <a:schemeClr val="lt1">
-        <a:alpha val="90000"/>
-      </a:schemeClr>
-    </dgm:fillClrLst>
-    <dgm:linClrLst>
-      <a:schemeClr val="accent2"/>
-      <a:schemeClr val="accent3"/>
-    </dgm:linClrLst>
-    <dgm:effectClrLst/>
-    <dgm:txLinClrLst/>
-    <dgm:txFillClrLst meth="repeat">
-      <a:schemeClr val="dk1"/>
-    </dgm:txFillClrLst>
-    <dgm:txEffectClrLst/>
-  </dgm:styleLbl>
-  <dgm:styleLbl name="trAlignAcc1">
-    <dgm:fillClrLst meth="repeat">
-      <a:schemeClr val="lt1">
-        <a:alpha val="40000"/>
-      </a:schemeClr>
-    </dgm:fillClrLst>
-    <dgm:linClrLst meth="repeat">
-      <a:schemeClr val="accent2"/>
-    </dgm:linClrLst>
-    <dgm:effectClrLst/>
-    <dgm:txLinClrLst/>
-    <dgm:txFillClrLst meth="repeat">
-      <a:schemeClr val="dk1"/>
-    </dgm:txFillClrLst>
-    <dgm:txEffectClrLst/>
-  </dgm:styleLbl>
-  <dgm:styleLbl name="bgAcc1">
-    <dgm:fillClrLst meth="repeat">
-      <a:schemeClr val="lt1">
-        <a:alpha val="90000"/>
-      </a:schemeClr>
-    </dgm:fillClrLst>
-    <dgm:linClrLst>
-      <a:schemeClr val="accent2"/>
-      <a:schemeClr val="accent3"/>
-    </dgm:linClrLst>
-    <dgm:effectClrLst/>
-    <dgm:txLinClrLst/>
-    <dgm:txFillClrLst meth="repeat">
-      <a:schemeClr val="dk1"/>
-    </dgm:txFillClrLst>
-    <dgm:txEffectClrLst/>
-  </dgm:styleLbl>
-  <dgm:styleLbl name="solidFgAcc1">
-    <dgm:fillClrLst meth="repeat">
-      <a:schemeClr val="lt1"/>
-    </dgm:fillClrLst>
-    <dgm:linClrLst>
-      <a:schemeClr val="accent2"/>
-      <a:schemeClr val="accent3"/>
-    </dgm:linClrLst>
-    <dgm:effectClrLst/>
-    <dgm:txLinClrLst/>
-    <dgm:txFillClrLst meth="repeat">
-      <a:schemeClr val="dk1"/>
-    </dgm:txFillClrLst>
-    <dgm:txEffectClrLst/>
-  </dgm:styleLbl>
-  <dgm:styleLbl name="solidAlignAcc1">
-    <dgm:fillClrLst meth="repeat">
-      <a:schemeClr val="lt1"/>
-    </dgm:fillClrLst>
-    <dgm:linClrLst>
-      <a:schemeClr val="accent2"/>
-      <a:schemeClr val="accent3"/>
-    </dgm:linClrLst>
-    <dgm:effectClrLst/>
-    <dgm:txLinClrLst/>
-    <dgm:txFillClrLst meth="repeat">
-      <a:schemeClr val="dk1"/>
-    </dgm:txFillClrLst>
-    <dgm:txEffectClrLst/>
-  </dgm:styleLbl>
-  <dgm:styleLbl name="solidBgAcc1">
-    <dgm:fillClrLst meth="repeat">
-      <a:schemeClr val="lt1"/>
-    </dgm:fillClrLst>
-    <dgm:linClrLst>
-      <a:schemeClr val="accent2"/>
-      <a:schemeClr val="accent3"/>
-    </dgm:linClrLst>
-    <dgm:effectClrLst/>
-    <dgm:txLinClrLst/>
-    <dgm:txFillClrLst meth="repeat">
-      <a:schemeClr val="dk1"/>
-    </dgm:txFillClrLst>
-    <dgm:txEffectClrLst/>
-  </dgm:styleLbl>
-  <dgm:styleLbl name="fgAccFollowNode1">
-    <dgm:fillClrLst>
-      <a:schemeClr val="accent2">
-        <a:tint val="40000"/>
-        <a:alpha val="90000"/>
-      </a:schemeClr>
-      <a:schemeClr val="accent3">
-        <a:tint val="40000"/>
-        <a:alpha val="90000"/>
-      </a:schemeClr>
-    </dgm:fillClrLst>
-    <dgm:linClrLst>
-      <a:schemeClr val="accent2">
-        <a:tint val="40000"/>
-        <a:alpha val="90000"/>
-      </a:schemeClr>
-      <a:schemeClr val="accent3">
-        <a:tint val="40000"/>
-        <a:alpha val="90000"/>
-      </a:schemeClr>
-    </dgm:linClrLst>
-    <dgm:effectClrLst/>
-    <dgm:txLinClrLst/>
-    <dgm:txFillClrLst meth="repeat">
-      <a:schemeClr val="dk1"/>
-    </dgm:txFillClrLst>
-    <dgm:txEffectClrLst/>
-  </dgm:styleLbl>
-  <dgm:styleLbl name="alignAccFollowNode1">
-    <dgm:fillClrLst>
-      <a:schemeClr val="accent2">
-        <a:tint val="40000"/>
-        <a:alpha val="90000"/>
-      </a:schemeClr>
-      <a:schemeClr val="accent3">
-        <a:tint val="40000"/>
-        <a:alpha val="90000"/>
-      </a:schemeClr>
-    </dgm:fillClrLst>
-    <dgm:linClrLst>
-      <a:schemeClr val="accent2">
-        <a:tint val="40000"/>
-        <a:alpha val="90000"/>
-      </a:schemeClr>
-      <a:schemeClr val="accent3">
-        <a:tint val="40000"/>
-        <a:alpha val="90000"/>
-      </a:schemeClr>
-    </dgm:linClrLst>
-    <dgm:effectClrLst/>
-    <dgm:txLinClrLst/>
-    <dgm:txFillClrLst meth="repeat">
-      <a:schemeClr val="dk1"/>
-    </dgm:txFillClrLst>
-    <dgm:txEffectClrLst/>
-  </dgm:styleLbl>
-  <dgm:styleLbl name="bgAccFollowNode1">
-    <dgm:fillClrLst>
-      <a:schemeClr val="accent2">
-        <a:tint val="40000"/>
-        <a:alpha val="90000"/>
-      </a:schemeClr>
-      <a:schemeClr val="accent3">
-        <a:tint val="40000"/>
-        <a:alpha val="90000"/>
-      </a:schemeClr>
-    </dgm:fillClrLst>
-    <dgm:linClrLst>
-      <a:schemeClr val="accent2">
-        <a:tint val="40000"/>
-        <a:alpha val="90000"/>
-      </a:schemeClr>
-      <a:schemeClr val="accent3">
-        <a:tint val="40000"/>
-        <a:alpha val="90000"/>
-      </a:schemeClr>
-    </dgm:linClrLst>
-    <dgm:effectClrLst/>
-    <dgm:txLinClrLst/>
-    <dgm:txFillClrLst meth="repeat">
-      <a:schemeClr val="dk1"/>
-    </dgm:txFillClrLst>
-    <dgm:txEffectClrLst/>
-  </dgm:styleLbl>
-  <dgm:styleLbl name="fgAcc0">
-    <dgm:fillClrLst meth="repeat">
-      <a:schemeClr val="lt1">
-        <a:alpha val="90000"/>
-      </a:schemeClr>
-    </dgm:fillClrLst>
-    <dgm:linClrLst>
-      <a:schemeClr val="accent1"/>
-    </dgm:linClrLst>
-    <dgm:effectClrLst/>
-    <dgm:txLinClrLst/>
-    <dgm:txFillClrLst meth="repeat">
-      <a:schemeClr val="dk1"/>
-    </dgm:txFillClrLst>
-    <dgm:txEffectClrLst/>
-  </dgm:styleLbl>
-  <dgm:styleLbl name="fgAcc2">
-    <dgm:fillClrLst meth="repeat">
-      <a:schemeClr val="lt1">
-        <a:alpha val="90000"/>
-      </a:schemeClr>
-    </dgm:fillClrLst>
-    <dgm:linClrLst>
-      <a:schemeClr val="accent3"/>
-    </dgm:linClrLst>
-    <dgm:effectClrLst/>
-    <dgm:txLinClrLst/>
-    <dgm:txFillClrLst meth="repeat">
-      <a:schemeClr val="dk1"/>
-    </dgm:txFillClrLst>
-    <dgm:txEffectClrLst/>
-  </dgm:styleLbl>
-  <dgm:styleLbl name="fgAcc3">
-    <dgm:fillClrLst meth="repeat">
-      <a:schemeClr val="lt1">
-        <a:alpha val="90000"/>
-      </a:schemeClr>
-    </dgm:fillClrLst>
-    <dgm:linClrLst>
-      <a:schemeClr val="accent4"/>
-    </dgm:linClrLst>
-    <dgm:effectClrLst/>
-    <dgm:txLinClrLst/>
-    <dgm:txFillClrLst meth="repeat">
-      <a:schemeClr val="dk1"/>
-    </dgm:txFillClrLst>
-    <dgm:txEffectClrLst/>
-  </dgm:styleLbl>
-  <dgm:styleLbl name="fgAcc4">
-    <dgm:fillClrLst meth="repeat">
-      <a:schemeClr val="lt1">
-        <a:alpha val="90000"/>
-      </a:schemeClr>
-    </dgm:fillClrLst>
-    <dgm:linClrLst>
-      <a:schemeClr val="accent5"/>
-    </dgm:linClrLst>
-    <dgm:effectClrLst/>
-    <dgm:txLinClrLst/>
-    <dgm:txFillClrLst meth="repeat">
-      <a:schemeClr val="dk1"/>
-    </dgm:txFillClrLst>
-    <dgm:txEffectClrLst/>
-  </dgm:styleLbl>
-  <dgm:styleLbl name="bgShp">
-    <dgm:fillClrLst meth="repeat">
-      <a:schemeClr val="accent2">
-        <a:tint val="40000"/>
-      </a:schemeClr>
-    </dgm:fillClrLst>
-    <dgm:linClrLst meth="repeat">
-      <a:schemeClr val="dk1"/>
-    </dgm:linClrLst>
-    <dgm:effectClrLst/>
-    <dgm:txLinClrLst/>
-    <dgm:txFillClrLst meth="repeat">
-      <a:schemeClr val="dk1"/>
-    </dgm:txFillClrLst>
-    <dgm:txEffectClrLst/>
-  </dgm:styleLbl>
-  <dgm:styleLbl name="dkBgShp">
-    <dgm:fillClrLst meth="repeat">
-      <a:schemeClr val="accent2">
-        <a:shade val="90000"/>
-      </a:schemeClr>
-    </dgm:fillClrLst>
-    <dgm:linClrLst meth="repeat">
-      <a:schemeClr val="dk1"/>
-    </dgm:linClrLst>
-    <dgm:effectClrLst/>
-    <dgm:txLinClrLst/>
-    <dgm:txFillClrLst meth="repeat">
-      <a:schemeClr val="lt1"/>
-    </dgm:txFillClrLst>
-    <dgm:txEffectClrLst/>
-  </dgm:styleLbl>
-  <dgm:styleLbl name="trBgShp">
-    <dgm:fillClrLst meth="repeat">
-      <a:schemeClr val="accent2">
-        <a:tint val="50000"/>
-        <a:alpha val="40000"/>
-      </a:schemeClr>
-    </dgm:fillClrLst>
-    <dgm:linClrLst meth="repeat">
-      <a:schemeClr val="accent2"/>
-    </dgm:linClrLst>
-    <dgm:effectClrLst/>
-    <dgm:txLinClrLst/>
-    <dgm:txFillClrLst meth="repeat">
-      <a:schemeClr val="lt1"/>
-    </dgm:txFillClrLst>
-    <dgm:txEffectClrLst/>
-  </dgm:styleLbl>
-  <dgm:styleLbl name="fgShp">
-    <dgm:fillClrLst meth="repeat">
-      <a:schemeClr val="accent2">
-        <a:tint val="40000"/>
-      </a:schemeClr>
-    </dgm:fillClrLst>
-    <dgm:linClrLst meth="repeat">
-      <a:schemeClr val="lt1"/>
-    </dgm:linClrLst>
-    <dgm:effectClrLst/>
-    <dgm:txLinClrLst/>
-    <dgm:txFillClrLst meth="repeat">
-      <a:schemeClr val="dk1"/>
-    </dgm:txFillClrLst>
-    <dgm:txEffectClrLst/>
-  </dgm:styleLbl>
-  <dgm:styleLbl name="revTx">
-    <dgm:fillClrLst meth="repeat">
-      <a:schemeClr val="lt1">
-        <a:alpha val="0"/>
-      </a:schemeClr>
-    </dgm:fillClrLst>
-    <dgm:linClrLst meth="repeat">
-      <a:schemeClr val="dk1">
-        <a:alpha val="0"/>
-      </a:schemeClr>
-    </dgm:linClrLst>
-    <dgm:effectClrLst/>
-    <dgm:txLinClrLst/>
-    <dgm:txFillClrLst meth="repeat">
-      <a:schemeClr val="tx1"/>
-    </dgm:txFillClrLst>
-    <dgm:txEffectClrLst/>
-  </dgm:styleLbl>
-</dgm:colorsDef>
-</file>
-
-<file path=ppt/diagrams/data1.xml><?xml version="1.0" encoding="utf-8"?>
-<dgm:dataModel xmlns:dgm="http://schemas.openxmlformats.org/drawingml/2006/diagram" xmlns:a="http://schemas.openxmlformats.org/drawingml/2006/main">
-  <dgm:ptLst>
-    <dgm:pt modelId="{2AFBA9D6-57E6-1747-BE1A-BC30FF59EFC7}" type="doc">
-      <dgm:prSet loTypeId="urn:microsoft.com/office/officeart/2005/8/layout/cycle1" loCatId="" qsTypeId="urn:microsoft.com/office/officeart/2005/8/quickstyle/simple4" qsCatId="simple" csTypeId="urn:microsoft.com/office/officeart/2005/8/colors/colorful2" csCatId="colorful" phldr="1"/>
-      <dgm:spPr/>
-      <dgm:t>
-        <a:bodyPr/>
-        <a:lstStyle/>
-        <a:p>
-          <a:endParaRPr lang="en-US"/>
-        </a:p>
-      </dgm:t>
-    </dgm:pt>
-    <dgm:pt modelId="{4992799E-678C-1644-BAB5-45376C4E9BCC}">
-      <dgm:prSet phldrT="[Text]"/>
-      <dgm:spPr/>
-      <dgm:t>
-        <a:bodyPr/>
-        <a:lstStyle/>
-        <a:p>
-          <a:r>
-            <a:rPr lang="en-US" b="1"/>
-            <a:t>Assessment</a:t>
-          </a:r>
-        </a:p>
-      </dgm:t>
-    </dgm:pt>
-    <dgm:pt modelId="{6CA93F6F-2C5B-3543-B35F-D1B2E291110D}" type="parTrans" cxnId="{CEC21C17-53E6-EF45-8EEB-15F94B7795BA}">
-      <dgm:prSet/>
-      <dgm:spPr/>
-      <dgm:t>
-        <a:bodyPr/>
-        <a:lstStyle/>
-        <a:p>
-          <a:endParaRPr lang="en-US"/>
-        </a:p>
-      </dgm:t>
-    </dgm:pt>
-    <dgm:pt modelId="{0376A2C8-3862-614F-93E3-DF6A3BA3792C}" type="sibTrans" cxnId="{CEC21C17-53E6-EF45-8EEB-15F94B7795BA}">
-      <dgm:prSet/>
-      <dgm:spPr/>
-      <dgm:t>
-        <a:bodyPr/>
-        <a:lstStyle/>
-        <a:p>
-          <a:endParaRPr lang="en-US"/>
-        </a:p>
-      </dgm:t>
-    </dgm:pt>
-    <dgm:pt modelId="{C8EA277B-42E9-3542-B18D-4E0E7CC9E2FD}">
-      <dgm:prSet phldrT="[Text]"/>
-      <dgm:spPr/>
-      <dgm:t>
-        <a:bodyPr/>
-        <a:lstStyle/>
-        <a:p>
-          <a:r>
-            <a:rPr lang="en-US" b="1"/>
-            <a:t>Treatment Planning</a:t>
-          </a:r>
-        </a:p>
-      </dgm:t>
-    </dgm:pt>
-    <dgm:pt modelId="{D4C7B1B2-5F09-C045-B921-A26E2215EDDC}" type="parTrans" cxnId="{4D67A284-FC58-7448-B458-68BDD6D789DE}">
-      <dgm:prSet/>
-      <dgm:spPr/>
-      <dgm:t>
-        <a:bodyPr/>
-        <a:lstStyle/>
-        <a:p>
-          <a:endParaRPr lang="en-US"/>
-        </a:p>
-      </dgm:t>
-    </dgm:pt>
-    <dgm:pt modelId="{4DCC9BC1-AB77-9045-898A-465998B10AB1}" type="sibTrans" cxnId="{4D67A284-FC58-7448-B458-68BDD6D789DE}">
-      <dgm:prSet/>
-      <dgm:spPr/>
-      <dgm:t>
-        <a:bodyPr/>
-        <a:lstStyle/>
-        <a:p>
-          <a:endParaRPr lang="en-US"/>
-        </a:p>
-      </dgm:t>
-    </dgm:pt>
-    <dgm:pt modelId="{D8F9A527-09AF-B140-838A-55DF4DB179C5}">
-      <dgm:prSet phldrT="[Text]"/>
-      <dgm:spPr/>
-      <dgm:t>
-        <a:bodyPr/>
-        <a:lstStyle/>
-        <a:p>
-          <a:r>
-            <a:rPr lang="en-US" b="1"/>
-            <a:t>Treatment</a:t>
-          </a:r>
-        </a:p>
-      </dgm:t>
-    </dgm:pt>
-    <dgm:pt modelId="{6BCDDBAD-8FBB-DC4B-9723-C87C5467A7A2}" type="parTrans" cxnId="{EA5CB148-CCE2-7A4D-AC13-FF571FE403E9}">
-      <dgm:prSet/>
-      <dgm:spPr/>
-      <dgm:t>
-        <a:bodyPr/>
-        <a:lstStyle/>
-        <a:p>
-          <a:endParaRPr lang="en-US"/>
-        </a:p>
-      </dgm:t>
-    </dgm:pt>
-    <dgm:pt modelId="{99DD0ED8-A3B6-0E44-8A5F-533131297894}" type="sibTrans" cxnId="{EA5CB148-CCE2-7A4D-AC13-FF571FE403E9}">
-      <dgm:prSet/>
-      <dgm:spPr/>
-      <dgm:t>
-        <a:bodyPr/>
-        <a:lstStyle/>
-        <a:p>
-          <a:endParaRPr lang="en-US"/>
-        </a:p>
-      </dgm:t>
-    </dgm:pt>
-    <dgm:pt modelId="{5FF27E8B-6DD9-EF4B-A803-C798AEF62AA3}" type="pres">
-      <dgm:prSet presAssocID="{2AFBA9D6-57E6-1747-BE1A-BC30FF59EFC7}" presName="cycle" presStyleCnt="0">
-        <dgm:presLayoutVars>
-          <dgm:dir/>
-          <dgm:resizeHandles val="exact"/>
-        </dgm:presLayoutVars>
-      </dgm:prSet>
-      <dgm:spPr/>
-    </dgm:pt>
-    <dgm:pt modelId="{6D5D3D91-FFD4-EE4F-BA93-19E05EE104C6}" type="pres">
-      <dgm:prSet presAssocID="{4992799E-678C-1644-BAB5-45376C4E9BCC}" presName="dummy" presStyleCnt="0"/>
-      <dgm:spPr/>
-    </dgm:pt>
-    <dgm:pt modelId="{72A1BD8C-9BA7-DF40-AB13-54AF4A64C774}" type="pres">
-      <dgm:prSet presAssocID="{4992799E-678C-1644-BAB5-45376C4E9BCC}" presName="node" presStyleLbl="revTx" presStyleIdx="0" presStyleCnt="3">
-        <dgm:presLayoutVars>
-          <dgm:bulletEnabled val="1"/>
-        </dgm:presLayoutVars>
-      </dgm:prSet>
-      <dgm:spPr/>
-    </dgm:pt>
-    <dgm:pt modelId="{E5972367-1D0F-3F42-A4B0-A32CE17DB0E2}" type="pres">
-      <dgm:prSet presAssocID="{0376A2C8-3862-614F-93E3-DF6A3BA3792C}" presName="sibTrans" presStyleLbl="node1" presStyleIdx="0" presStyleCnt="3"/>
-      <dgm:spPr/>
-    </dgm:pt>
-    <dgm:pt modelId="{FDDCF62B-7D30-7747-857F-BEA10A4993DF}" type="pres">
-      <dgm:prSet presAssocID="{C8EA277B-42E9-3542-B18D-4E0E7CC9E2FD}" presName="dummy" presStyleCnt="0"/>
-      <dgm:spPr/>
-    </dgm:pt>
-    <dgm:pt modelId="{0F186D10-BF90-1943-9906-BE5931198E0E}" type="pres">
-      <dgm:prSet presAssocID="{C8EA277B-42E9-3542-B18D-4E0E7CC9E2FD}" presName="node" presStyleLbl="revTx" presStyleIdx="1" presStyleCnt="3">
-        <dgm:presLayoutVars>
-          <dgm:bulletEnabled val="1"/>
-        </dgm:presLayoutVars>
-      </dgm:prSet>
-      <dgm:spPr/>
-    </dgm:pt>
-    <dgm:pt modelId="{08A35E68-A8B0-2642-9EE0-584DCD565B71}" type="pres">
-      <dgm:prSet presAssocID="{4DCC9BC1-AB77-9045-898A-465998B10AB1}" presName="sibTrans" presStyleLbl="node1" presStyleIdx="1" presStyleCnt="3"/>
-      <dgm:spPr/>
-    </dgm:pt>
-    <dgm:pt modelId="{2840D037-78A6-044F-B003-833708335EE8}" type="pres">
-      <dgm:prSet presAssocID="{D8F9A527-09AF-B140-838A-55DF4DB179C5}" presName="dummy" presStyleCnt="0"/>
-      <dgm:spPr/>
-    </dgm:pt>
-    <dgm:pt modelId="{7E171857-7526-8A41-946B-E62B3476A379}" type="pres">
-      <dgm:prSet presAssocID="{D8F9A527-09AF-B140-838A-55DF4DB179C5}" presName="node" presStyleLbl="revTx" presStyleIdx="2" presStyleCnt="3">
-        <dgm:presLayoutVars>
-          <dgm:bulletEnabled val="1"/>
-        </dgm:presLayoutVars>
-      </dgm:prSet>
-      <dgm:spPr/>
-    </dgm:pt>
-    <dgm:pt modelId="{B10B807F-A421-DC40-9C24-68A34ED8B7E8}" type="pres">
-      <dgm:prSet presAssocID="{99DD0ED8-A3B6-0E44-8A5F-533131297894}" presName="sibTrans" presStyleLbl="node1" presStyleIdx="2" presStyleCnt="3"/>
-      <dgm:spPr/>
-    </dgm:pt>
-  </dgm:ptLst>
-  <dgm:cxnLst>
-    <dgm:cxn modelId="{CEC21C17-53E6-EF45-8EEB-15F94B7795BA}" srcId="{2AFBA9D6-57E6-1747-BE1A-BC30FF59EFC7}" destId="{4992799E-678C-1644-BAB5-45376C4E9BCC}" srcOrd="0" destOrd="0" parTransId="{6CA93F6F-2C5B-3543-B35F-D1B2E291110D}" sibTransId="{0376A2C8-3862-614F-93E3-DF6A3BA3792C}"/>
-    <dgm:cxn modelId="{D54AC92A-1BA5-4E45-B052-E351A038EF53}" type="presOf" srcId="{D8F9A527-09AF-B140-838A-55DF4DB179C5}" destId="{7E171857-7526-8A41-946B-E62B3476A379}" srcOrd="0" destOrd="0" presId="urn:microsoft.com/office/officeart/2005/8/layout/cycle1"/>
-    <dgm:cxn modelId="{EA5CB148-CCE2-7A4D-AC13-FF571FE403E9}" srcId="{2AFBA9D6-57E6-1747-BE1A-BC30FF59EFC7}" destId="{D8F9A527-09AF-B140-838A-55DF4DB179C5}" srcOrd="2" destOrd="0" parTransId="{6BCDDBAD-8FBB-DC4B-9723-C87C5467A7A2}" sibTransId="{99DD0ED8-A3B6-0E44-8A5F-533131297894}"/>
-    <dgm:cxn modelId="{BE940955-C501-E543-9DCA-73B33FA53A13}" type="presOf" srcId="{C8EA277B-42E9-3542-B18D-4E0E7CC9E2FD}" destId="{0F186D10-BF90-1943-9906-BE5931198E0E}" srcOrd="0" destOrd="0" presId="urn:microsoft.com/office/officeart/2005/8/layout/cycle1"/>
-    <dgm:cxn modelId="{BBAB4A5F-9791-8249-9D2E-EE75291DBFDD}" type="presOf" srcId="{2AFBA9D6-57E6-1747-BE1A-BC30FF59EFC7}" destId="{5FF27E8B-6DD9-EF4B-A803-C798AEF62AA3}" srcOrd="0" destOrd="0" presId="urn:microsoft.com/office/officeart/2005/8/layout/cycle1"/>
-    <dgm:cxn modelId="{08CF3662-458E-D14B-AB63-AF7EEDA5B237}" type="presOf" srcId="{0376A2C8-3862-614F-93E3-DF6A3BA3792C}" destId="{E5972367-1D0F-3F42-A4B0-A32CE17DB0E2}" srcOrd="0" destOrd="0" presId="urn:microsoft.com/office/officeart/2005/8/layout/cycle1"/>
-    <dgm:cxn modelId="{28BD9083-3030-194F-A61A-84A96562614D}" type="presOf" srcId="{4DCC9BC1-AB77-9045-898A-465998B10AB1}" destId="{08A35E68-A8B0-2642-9EE0-584DCD565B71}" srcOrd="0" destOrd="0" presId="urn:microsoft.com/office/officeart/2005/8/layout/cycle1"/>
-    <dgm:cxn modelId="{4D67A284-FC58-7448-B458-68BDD6D789DE}" srcId="{2AFBA9D6-57E6-1747-BE1A-BC30FF59EFC7}" destId="{C8EA277B-42E9-3542-B18D-4E0E7CC9E2FD}" srcOrd="1" destOrd="0" parTransId="{D4C7B1B2-5F09-C045-B921-A26E2215EDDC}" sibTransId="{4DCC9BC1-AB77-9045-898A-465998B10AB1}"/>
-    <dgm:cxn modelId="{31236F9D-D7BA-CF49-9AC2-EEF595491CBB}" type="presOf" srcId="{4992799E-678C-1644-BAB5-45376C4E9BCC}" destId="{72A1BD8C-9BA7-DF40-AB13-54AF4A64C774}" srcOrd="0" destOrd="0" presId="urn:microsoft.com/office/officeart/2005/8/layout/cycle1"/>
-    <dgm:cxn modelId="{FD6CFCC0-D984-0B48-AB0B-2256B418F367}" type="presOf" srcId="{99DD0ED8-A3B6-0E44-8A5F-533131297894}" destId="{B10B807F-A421-DC40-9C24-68A34ED8B7E8}" srcOrd="0" destOrd="0" presId="urn:microsoft.com/office/officeart/2005/8/layout/cycle1"/>
-    <dgm:cxn modelId="{2B267630-22B6-B048-906A-3E7896E4C108}" type="presParOf" srcId="{5FF27E8B-6DD9-EF4B-A803-C798AEF62AA3}" destId="{6D5D3D91-FFD4-EE4F-BA93-19E05EE104C6}" srcOrd="0" destOrd="0" presId="urn:microsoft.com/office/officeart/2005/8/layout/cycle1"/>
-    <dgm:cxn modelId="{B527C8DB-FCB9-A84E-8FBA-80BE17BDA754}" type="presParOf" srcId="{5FF27E8B-6DD9-EF4B-A803-C798AEF62AA3}" destId="{72A1BD8C-9BA7-DF40-AB13-54AF4A64C774}" srcOrd="1" destOrd="0" presId="urn:microsoft.com/office/officeart/2005/8/layout/cycle1"/>
-    <dgm:cxn modelId="{3D23FE68-19C9-D54B-9E04-48D57D62C4DB}" type="presParOf" srcId="{5FF27E8B-6DD9-EF4B-A803-C798AEF62AA3}" destId="{E5972367-1D0F-3F42-A4B0-A32CE17DB0E2}" srcOrd="2" destOrd="0" presId="urn:microsoft.com/office/officeart/2005/8/layout/cycle1"/>
-    <dgm:cxn modelId="{753944E0-9F59-A44D-9398-E4DC50641CD0}" type="presParOf" srcId="{5FF27E8B-6DD9-EF4B-A803-C798AEF62AA3}" destId="{FDDCF62B-7D30-7747-857F-BEA10A4993DF}" srcOrd="3" destOrd="0" presId="urn:microsoft.com/office/officeart/2005/8/layout/cycle1"/>
-    <dgm:cxn modelId="{8C719392-DD48-144E-922C-01D015E0E98E}" type="presParOf" srcId="{5FF27E8B-6DD9-EF4B-A803-C798AEF62AA3}" destId="{0F186D10-BF90-1943-9906-BE5931198E0E}" srcOrd="4" destOrd="0" presId="urn:microsoft.com/office/officeart/2005/8/layout/cycle1"/>
-    <dgm:cxn modelId="{46D598DF-1C9F-2348-9CEF-31FB2C333350}" type="presParOf" srcId="{5FF27E8B-6DD9-EF4B-A803-C798AEF62AA3}" destId="{08A35E68-A8B0-2642-9EE0-584DCD565B71}" srcOrd="5" destOrd="0" presId="urn:microsoft.com/office/officeart/2005/8/layout/cycle1"/>
-    <dgm:cxn modelId="{BB29EFE4-4CB7-D145-BBCD-7FC201B107B3}" type="presParOf" srcId="{5FF27E8B-6DD9-EF4B-A803-C798AEF62AA3}" destId="{2840D037-78A6-044F-B003-833708335EE8}" srcOrd="6" destOrd="0" presId="urn:microsoft.com/office/officeart/2005/8/layout/cycle1"/>
-    <dgm:cxn modelId="{65026FD4-98EE-5448-9437-8F9C71AA6439}" type="presParOf" srcId="{5FF27E8B-6DD9-EF4B-A803-C798AEF62AA3}" destId="{7E171857-7526-8A41-946B-E62B3476A379}" srcOrd="7" destOrd="0" presId="urn:microsoft.com/office/officeart/2005/8/layout/cycle1"/>
-    <dgm:cxn modelId="{41F6CEEA-0F52-9F43-8109-4D6CAB7EB41F}" type="presParOf" srcId="{5FF27E8B-6DD9-EF4B-A803-C798AEF62AA3}" destId="{B10B807F-A421-DC40-9C24-68A34ED8B7E8}" srcOrd="8" destOrd="0" presId="urn:microsoft.com/office/officeart/2005/8/layout/cycle1"/>
-  </dgm:cxnLst>
-  <dgm:bg/>
-  <dgm:whole/>
-  <dgm:extLst>
-    <a:ext uri="http://schemas.microsoft.com/office/drawing/2008/diagram">
-      <dsp:dataModelExt xmlns:dsp="http://schemas.microsoft.com/office/drawing/2008/diagram" relId="rId6" minVer="http://schemas.openxmlformats.org/drawingml/2006/diagram"/>
-    </a:ext>
-    <a:ext uri="{C62137D5-CB1D-491B-B009-E17868A290BF}">
-      <dgm14:recolorImg xmlns:dgm14="http://schemas.microsoft.com/office/drawing/2010/diagram" val="1"/>
-    </a:ext>
-  </dgm:extLst>
-</dgm:dataModel>
-</file>
-
-<file path=ppt/diagrams/drawing1.xml><?xml version="1.0" encoding="utf-8"?>
-<dsp:drawing xmlns:dgm="http://schemas.openxmlformats.org/drawingml/2006/diagram" xmlns:dsp="http://schemas.microsoft.com/office/drawing/2008/diagram" xmlns:a="http://schemas.openxmlformats.org/drawingml/2006/main">
-  <dsp:spTree>
-    <dsp:nvGrpSpPr>
-      <dsp:cNvPr id="0" name=""/>
-      <dsp:cNvGrpSpPr/>
-    </dsp:nvGrpSpPr>
-    <dsp:grpSpPr/>
-    <dsp:sp modelId="{72A1BD8C-9BA7-DF40-AB13-54AF4A64C774}">
-      <dsp:nvSpPr>
-        <dsp:cNvPr id="0" name=""/>
-        <dsp:cNvSpPr/>
-      </dsp:nvSpPr>
-      <dsp:spPr>
-        <a:xfrm>
-          <a:off x="4502517" y="321144"/>
-          <a:ext cx="1640495" cy="1640495"/>
-        </a:xfrm>
-        <a:prstGeom prst="rect">
-          <a:avLst/>
-        </a:prstGeom>
-        <a:noFill/>
-        <a:ln>
-          <a:noFill/>
-        </a:ln>
-        <a:effectLst/>
-      </dsp:spPr>
-      <dsp:style>
-        <a:lnRef idx="0">
-          <a:scrgbClr r="0" g="0" b="0"/>
-        </a:lnRef>
-        <a:fillRef idx="0">
-          <a:scrgbClr r="0" g="0" b="0"/>
-        </a:fillRef>
-        <a:effectRef idx="0">
-          <a:scrgbClr r="0" g="0" b="0"/>
-        </a:effectRef>
-        <a:fontRef idx="minor"/>
-      </dsp:style>
-      <dsp:txBody>
-        <a:bodyPr spcFirstLastPara="0" vert="horz" wrap="square" lIns="31750" tIns="31750" rIns="31750" bIns="31750" numCol="1" spcCol="1270" anchor="ctr" anchorCtr="0">
-          <a:noAutofit/>
-        </a:bodyPr>
-        <a:lstStyle/>
-        <a:p>
-          <a:pPr marL="0" lvl="0" indent="0" algn="ctr" defTabSz="1111250">
-            <a:lnSpc>
-              <a:spcPct val="90000"/>
-            </a:lnSpc>
-            <a:spcBef>
-              <a:spcPct val="0"/>
-            </a:spcBef>
-            <a:spcAft>
-              <a:spcPct val="35000"/>
-            </a:spcAft>
-            <a:buNone/>
-          </a:pPr>
-          <a:r>
-            <a:rPr lang="en-US" sz="2500" b="1" kern="1200"/>
-            <a:t>Assessment</a:t>
-          </a:r>
-        </a:p>
-      </dsp:txBody>
-      <dsp:txXfrm>
-        <a:off x="4502517" y="321144"/>
-        <a:ext cx="1640495" cy="1640495"/>
-      </dsp:txXfrm>
-    </dsp:sp>
-    <dsp:sp modelId="{E5972367-1D0F-3F42-A4B0-A32CE17DB0E2}">
-      <dsp:nvSpPr>
-        <dsp:cNvPr id="0" name=""/>
-        <dsp:cNvSpPr/>
-      </dsp:nvSpPr>
-      <dsp:spPr>
-        <a:xfrm>
-          <a:off x="2003984" y="-1568"/>
-          <a:ext cx="3878730" cy="3878730"/>
-        </a:xfrm>
-        <a:prstGeom prst="circularArrow">
-          <a:avLst>
-            <a:gd name="adj1" fmla="val 8247"/>
-            <a:gd name="adj2" fmla="val 576031"/>
-            <a:gd name="adj3" fmla="val 2964247"/>
-            <a:gd name="adj4" fmla="val 51460"/>
-            <a:gd name="adj5" fmla="val 9622"/>
-          </a:avLst>
-        </a:prstGeom>
-        <a:gradFill rotWithShape="0">
-          <a:gsLst>
-            <a:gs pos="0">
-              <a:schemeClr val="accent2">
-                <a:hueOff val="0"/>
-                <a:satOff val="0"/>
-                <a:lumOff val="0"/>
-                <a:alphaOff val="0"/>
-                <a:satMod val="103000"/>
-                <a:lumMod val="102000"/>
-                <a:tint val="94000"/>
-              </a:schemeClr>
-            </a:gs>
-            <a:gs pos="50000">
-              <a:schemeClr val="accent2">
-                <a:hueOff val="0"/>
-                <a:satOff val="0"/>
-                <a:lumOff val="0"/>
-                <a:alphaOff val="0"/>
-                <a:satMod val="110000"/>
-                <a:lumMod val="100000"/>
-                <a:shade val="100000"/>
-              </a:schemeClr>
-            </a:gs>
-            <a:gs pos="100000">
-              <a:schemeClr val="accent2">
-                <a:hueOff val="0"/>
-                <a:satOff val="0"/>
-                <a:lumOff val="0"/>
-                <a:alphaOff val="0"/>
-                <a:lumMod val="99000"/>
-                <a:satMod val="120000"/>
-                <a:shade val="78000"/>
-              </a:schemeClr>
-            </a:gs>
-          </a:gsLst>
-          <a:lin ang="5400000" scaled="0"/>
-        </a:gradFill>
-        <a:ln>
-          <a:noFill/>
-        </a:ln>
-        <a:effectLst/>
-      </dsp:spPr>
-      <dsp:style>
-        <a:lnRef idx="0">
-          <a:scrgbClr r="0" g="0" b="0"/>
-        </a:lnRef>
-        <a:fillRef idx="3">
-          <a:scrgbClr r="0" g="0" b="0"/>
-        </a:fillRef>
-        <a:effectRef idx="2">
-          <a:scrgbClr r="0" g="0" b="0"/>
-        </a:effectRef>
-        <a:fontRef idx="minor">
-          <a:schemeClr val="lt1"/>
-        </a:fontRef>
-      </dsp:style>
-    </dsp:sp>
-    <dsp:sp modelId="{0F186D10-BF90-1943-9906-BE5931198E0E}">
-      <dsp:nvSpPr>
-        <dsp:cNvPr id="0" name=""/>
-        <dsp:cNvSpPr/>
-      </dsp:nvSpPr>
-      <dsp:spPr>
-        <a:xfrm>
-          <a:off x="3123102" y="2710360"/>
-          <a:ext cx="1640495" cy="1640495"/>
-        </a:xfrm>
-        <a:prstGeom prst="rect">
-          <a:avLst/>
-        </a:prstGeom>
-        <a:noFill/>
-        <a:ln>
-          <a:noFill/>
-        </a:ln>
-        <a:effectLst/>
-      </dsp:spPr>
-      <dsp:style>
-        <a:lnRef idx="0">
-          <a:scrgbClr r="0" g="0" b="0"/>
-        </a:lnRef>
-        <a:fillRef idx="0">
-          <a:scrgbClr r="0" g="0" b="0"/>
-        </a:fillRef>
-        <a:effectRef idx="0">
-          <a:scrgbClr r="0" g="0" b="0"/>
-        </a:effectRef>
-        <a:fontRef idx="minor"/>
-      </dsp:style>
-      <dsp:txBody>
-        <a:bodyPr spcFirstLastPara="0" vert="horz" wrap="square" lIns="31750" tIns="31750" rIns="31750" bIns="31750" numCol="1" spcCol="1270" anchor="ctr" anchorCtr="0">
-          <a:noAutofit/>
-        </a:bodyPr>
-        <a:lstStyle/>
-        <a:p>
-          <a:pPr marL="0" lvl="0" indent="0" algn="ctr" defTabSz="1111250">
-            <a:lnSpc>
-              <a:spcPct val="90000"/>
-            </a:lnSpc>
-            <a:spcBef>
-              <a:spcPct val="0"/>
-            </a:spcBef>
-            <a:spcAft>
-              <a:spcPct val="35000"/>
-            </a:spcAft>
-            <a:buNone/>
-          </a:pPr>
-          <a:r>
-            <a:rPr lang="en-US" sz="2500" b="1" kern="1200"/>
-            <a:t>Treatment Planning</a:t>
-          </a:r>
-        </a:p>
-      </dsp:txBody>
-      <dsp:txXfrm>
-        <a:off x="3123102" y="2710360"/>
-        <a:ext cx="1640495" cy="1640495"/>
-      </dsp:txXfrm>
-    </dsp:sp>
-    <dsp:sp modelId="{08A35E68-A8B0-2642-9EE0-584DCD565B71}">
-      <dsp:nvSpPr>
-        <dsp:cNvPr id="0" name=""/>
-        <dsp:cNvSpPr/>
-      </dsp:nvSpPr>
-      <dsp:spPr>
-        <a:xfrm>
-          <a:off x="2003984" y="-1568"/>
-          <a:ext cx="3878730" cy="3878730"/>
-        </a:xfrm>
-        <a:prstGeom prst="circularArrow">
-          <a:avLst>
-            <a:gd name="adj1" fmla="val 8247"/>
-            <a:gd name="adj2" fmla="val 576031"/>
-            <a:gd name="adj3" fmla="val 10172508"/>
-            <a:gd name="adj4" fmla="val 7259721"/>
-            <a:gd name="adj5" fmla="val 9622"/>
-          </a:avLst>
-        </a:prstGeom>
-        <a:gradFill rotWithShape="0">
-          <a:gsLst>
-            <a:gs pos="0">
-              <a:schemeClr val="accent2">
-                <a:hueOff val="-727682"/>
-                <a:satOff val="-41964"/>
-                <a:lumOff val="4314"/>
-                <a:alphaOff val="0"/>
-                <a:satMod val="103000"/>
-                <a:lumMod val="102000"/>
-                <a:tint val="94000"/>
-              </a:schemeClr>
-            </a:gs>
-            <a:gs pos="50000">
-              <a:schemeClr val="accent2">
-                <a:hueOff val="-727682"/>
-                <a:satOff val="-41964"/>
-                <a:lumOff val="4314"/>
-                <a:alphaOff val="0"/>
-                <a:satMod val="110000"/>
-                <a:lumMod val="100000"/>
-                <a:shade val="100000"/>
-              </a:schemeClr>
-            </a:gs>
-            <a:gs pos="100000">
-              <a:schemeClr val="accent2">
-                <a:hueOff val="-727682"/>
-                <a:satOff val="-41964"/>
-                <a:lumOff val="4314"/>
-                <a:alphaOff val="0"/>
-                <a:lumMod val="99000"/>
-                <a:satMod val="120000"/>
-                <a:shade val="78000"/>
-              </a:schemeClr>
-            </a:gs>
-          </a:gsLst>
-          <a:lin ang="5400000" scaled="0"/>
-        </a:gradFill>
-        <a:ln>
-          <a:noFill/>
-        </a:ln>
-        <a:effectLst/>
-      </dsp:spPr>
-      <dsp:style>
-        <a:lnRef idx="0">
-          <a:scrgbClr r="0" g="0" b="0"/>
-        </a:lnRef>
-        <a:fillRef idx="3">
-          <a:scrgbClr r="0" g="0" b="0"/>
-        </a:fillRef>
-        <a:effectRef idx="2">
-          <a:scrgbClr r="0" g="0" b="0"/>
-        </a:effectRef>
-        <a:fontRef idx="minor">
-          <a:schemeClr val="lt1"/>
-        </a:fontRef>
-      </dsp:style>
-    </dsp:sp>
-    <dsp:sp modelId="{7E171857-7526-8A41-946B-E62B3476A379}">
-      <dsp:nvSpPr>
-        <dsp:cNvPr id="0" name=""/>
-        <dsp:cNvSpPr/>
-      </dsp:nvSpPr>
-      <dsp:spPr>
-        <a:xfrm>
-          <a:off x="1743687" y="321144"/>
-          <a:ext cx="1640495" cy="1640495"/>
-        </a:xfrm>
-        <a:prstGeom prst="rect">
-          <a:avLst/>
-        </a:prstGeom>
-        <a:noFill/>
-        <a:ln>
-          <a:noFill/>
-        </a:ln>
-        <a:effectLst/>
-      </dsp:spPr>
-      <dsp:style>
-        <a:lnRef idx="0">
-          <a:scrgbClr r="0" g="0" b="0"/>
-        </a:lnRef>
-        <a:fillRef idx="0">
-          <a:scrgbClr r="0" g="0" b="0"/>
-        </a:fillRef>
-        <a:effectRef idx="0">
-          <a:scrgbClr r="0" g="0" b="0"/>
-        </a:effectRef>
-        <a:fontRef idx="minor"/>
-      </dsp:style>
-      <dsp:txBody>
-        <a:bodyPr spcFirstLastPara="0" vert="horz" wrap="square" lIns="31750" tIns="31750" rIns="31750" bIns="31750" numCol="1" spcCol="1270" anchor="ctr" anchorCtr="0">
-          <a:noAutofit/>
-        </a:bodyPr>
-        <a:lstStyle/>
-        <a:p>
-          <a:pPr marL="0" lvl="0" indent="0" algn="ctr" defTabSz="1111250">
-            <a:lnSpc>
-              <a:spcPct val="90000"/>
-            </a:lnSpc>
-            <a:spcBef>
-              <a:spcPct val="0"/>
-            </a:spcBef>
-            <a:spcAft>
-              <a:spcPct val="35000"/>
-            </a:spcAft>
-            <a:buNone/>
-          </a:pPr>
-          <a:r>
-            <a:rPr lang="en-US" sz="2500" b="1" kern="1200"/>
-            <a:t>Treatment</a:t>
-          </a:r>
-        </a:p>
-      </dsp:txBody>
-      <dsp:txXfrm>
-        <a:off x="1743687" y="321144"/>
-        <a:ext cx="1640495" cy="1640495"/>
-      </dsp:txXfrm>
-    </dsp:sp>
-    <dsp:sp modelId="{B10B807F-A421-DC40-9C24-68A34ED8B7E8}">
-      <dsp:nvSpPr>
-        <dsp:cNvPr id="0" name=""/>
-        <dsp:cNvSpPr/>
-      </dsp:nvSpPr>
-      <dsp:spPr>
-        <a:xfrm>
-          <a:off x="2003984" y="-1568"/>
-          <a:ext cx="3878730" cy="3878730"/>
-        </a:xfrm>
-        <a:prstGeom prst="circularArrow">
-          <a:avLst>
-            <a:gd name="adj1" fmla="val 8247"/>
-            <a:gd name="adj2" fmla="val 576031"/>
-            <a:gd name="adj3" fmla="val 16857086"/>
-            <a:gd name="adj4" fmla="val 14966882"/>
-            <a:gd name="adj5" fmla="val 9622"/>
-          </a:avLst>
-        </a:prstGeom>
-        <a:gradFill rotWithShape="0">
-          <a:gsLst>
-            <a:gs pos="0">
-              <a:schemeClr val="accent2">
-                <a:hueOff val="-1455363"/>
-                <a:satOff val="-83928"/>
-                <a:lumOff val="8628"/>
-                <a:alphaOff val="0"/>
-                <a:satMod val="103000"/>
-                <a:lumMod val="102000"/>
-                <a:tint val="94000"/>
-              </a:schemeClr>
-            </a:gs>
-            <a:gs pos="50000">
-              <a:schemeClr val="accent2">
-                <a:hueOff val="-1455363"/>
-                <a:satOff val="-83928"/>
-                <a:lumOff val="8628"/>
-                <a:alphaOff val="0"/>
-                <a:satMod val="110000"/>
-                <a:lumMod val="100000"/>
-                <a:shade val="100000"/>
-              </a:schemeClr>
-            </a:gs>
-            <a:gs pos="100000">
-              <a:schemeClr val="accent2">
-                <a:hueOff val="-1455363"/>
-                <a:satOff val="-83928"/>
-                <a:lumOff val="8628"/>
-                <a:alphaOff val="0"/>
-                <a:lumMod val="99000"/>
-                <a:satMod val="120000"/>
-                <a:shade val="78000"/>
-              </a:schemeClr>
-            </a:gs>
-          </a:gsLst>
-          <a:lin ang="5400000" scaled="0"/>
-        </a:gradFill>
-        <a:ln>
-          <a:noFill/>
-        </a:ln>
-        <a:effectLst/>
-      </dsp:spPr>
-      <dsp:style>
-        <a:lnRef idx="0">
-          <a:scrgbClr r="0" g="0" b="0"/>
-        </a:lnRef>
-        <a:fillRef idx="3">
-          <a:scrgbClr r="0" g="0" b="0"/>
-        </a:fillRef>
-        <a:effectRef idx="2">
-          <a:scrgbClr r="0" g="0" b="0"/>
-        </a:effectRef>
-        <a:fontRef idx="minor">
-          <a:schemeClr val="lt1"/>
-        </a:fontRef>
-      </dsp:style>
-    </dsp:sp>
-  </dsp:spTree>
-</dsp:drawing>
-</file>
-
-<file path=ppt/diagrams/layout1.xml><?xml version="1.0" encoding="utf-8"?>
-<dgm:layoutDef xmlns:dgm="http://schemas.openxmlformats.org/drawingml/2006/diagram" xmlns:a="http://schemas.openxmlformats.org/drawingml/2006/main" uniqueId="urn:microsoft.com/office/officeart/2005/8/layout/cycle1">
-  <dgm:title val=""/>
-  <dgm:desc val=""/>
-  <dgm:catLst>
-    <dgm:cat type="cycle" pri="2000"/>
-  </dgm:catLst>
-  <dgm:sampData>
-    <dgm:dataModel>
-      <dgm:ptLst>
-        <dgm:pt modelId="0" type="doc"/>
-        <dgm:pt modelId="1">
-          <dgm:prSet phldr="1"/>
-        </dgm:pt>
-        <dgm:pt modelId="2">
-          <dgm:prSet phldr="1"/>
-        </dgm:pt>
-        <dgm:pt modelId="3">
-          <dgm:prSet phldr="1"/>
-        </dgm:pt>
-        <dgm:pt modelId="4">
-          <dgm:prSet phldr="1"/>
-        </dgm:pt>
-        <dgm:pt modelId="5">
-          <dgm:prSet phldr="1"/>
-        </dgm:pt>
-      </dgm:ptLst>
-      <dgm:cxnLst>
-        <dgm:cxn modelId="6" srcId="0" destId="1" srcOrd="0" destOrd="0"/>
-        <dgm:cxn modelId="7" srcId="0" destId="2" srcOrd="1" destOrd="0"/>
-        <dgm:cxn modelId="8" srcId="0" destId="3" srcOrd="2" destOrd="0"/>
-        <dgm:cxn modelId="9" srcId="0" destId="4" srcOrd="3" destOrd="0"/>
-        <dgm:cxn modelId="10" srcId="0" destId="5" srcOrd="4" destOrd="0"/>
-      </dgm:cxnLst>
-      <dgm:bg/>
-      <dgm:whole/>
-    </dgm:dataModel>
-  </dgm:sampData>
-  <dgm:styleData>
-    <dgm:dataModel>
-      <dgm:ptLst>
-        <dgm:pt modelId="0" type="doc"/>
-        <dgm:pt modelId="1"/>
-        <dgm:pt modelId="2"/>
-        <dgm:pt modelId="3"/>
-      </dgm:ptLst>
-      <dgm:cxnLst>
-        <dgm:cxn modelId="4" srcId="0" destId="1" srcOrd="0" destOrd="0"/>
-        <dgm:cxn modelId="5" srcId="0" destId="2" srcOrd="1" destOrd="0"/>
-        <dgm:cxn modelId="6" srcId="0" destId="3" srcOrd="2" destOrd="0"/>
-      </dgm:cxnLst>
-      <dgm:bg/>
-      <dgm:whole/>
-    </dgm:dataModel>
-  </dgm:styleData>
-  <dgm:clrData>
-    <dgm:dataModel>
-      <dgm:ptLst>
-        <dgm:pt modelId="0" type="doc"/>
-        <dgm:pt modelId="1"/>
-        <dgm:pt modelId="2"/>
-        <dgm:pt modelId="3"/>
-        <dgm:pt modelId="4"/>
-        <dgm:pt modelId="5"/>
-        <dgm:pt modelId="6"/>
-      </dgm:ptLst>
-      <dgm:cxnLst>
-        <dgm:cxn modelId="7" srcId="0" destId="1" srcOrd="0" destOrd="0"/>
-        <dgm:cxn modelId="8" srcId="0" destId="2" srcOrd="1" destOrd="0"/>
-        <dgm:cxn modelId="9" srcId="0" destId="3" srcOrd="2" destOrd="0"/>
-        <dgm:cxn modelId="10" srcId="0" destId="4" srcOrd="3" destOrd="0"/>
-        <dgm:cxn modelId="11" srcId="0" destId="5" srcOrd="4" destOrd="0"/>
-        <dgm:cxn modelId="12" srcId="0" destId="6" srcOrd="5" destOrd="0"/>
-      </dgm:cxnLst>
-      <dgm:bg/>
-      <dgm:whole/>
-    </dgm:dataModel>
-  </dgm:clrData>
-  <dgm:layoutNode name="cycle">
-    <dgm:varLst>
-      <dgm:dir/>
-      <dgm:resizeHandles val="exact"/>
-    </dgm:varLst>
-    <dgm:choose name="Name0">
-      <dgm:if name="Name1" func="var" arg="dir" op="equ" val="norm">
-        <dgm:alg type="cycle">
-          <dgm:param type="stAng" val="0"/>
-          <dgm:param type="spanAng" val="360"/>
-        </dgm:alg>
-      </dgm:if>
-      <dgm:else name="Name2">
-        <dgm:alg type="cycle">
-          <dgm:param type="stAng" val="0"/>
-          <dgm:param type="spanAng" val="-360"/>
-        </dgm:alg>
-      </dgm:else>
-    </dgm:choose>
-    <dgm:shape xmlns:r="http://schemas.openxmlformats.org/officeDocument/2006/relationships" r:blip="">
-      <dgm:adjLst/>
-    </dgm:shape>
-    <dgm:presOf/>
-    <dgm:choose name="Name3">
-      <dgm:if name="Name4" func="var" arg="dir" op="equ" val="norm">
-        <dgm:constrLst>
-          <dgm:constr type="diam" val="1"/>
-          <dgm:constr type="w" for="ch" forName="node" refType="w"/>
-          <dgm:constr type="w" for="ch" ptType="sibTrans" refType="w" refFor="ch" refForName="node" fact="0.5"/>
-          <dgm:constr type="h" for="ch" ptType="sibTrans" op="equ"/>
-          <dgm:constr type="diam" for="ch" ptType="sibTrans" refType="diam" op="equ"/>
-          <dgm:constr type="sibSp" refType="w" refFor="ch" refForName="node" fact="0.15"/>
-          <dgm:constr type="w" for="ch" forName="dummy" refType="sibSp" fact="2.8"/>
-          <dgm:constr type="primFontSz" for="ch" forName="node" op="equ" val="65"/>
-        </dgm:constrLst>
-      </dgm:if>
-      <dgm:else name="Name5">
-        <dgm:constrLst>
-          <dgm:constr type="diam" val="1"/>
-          <dgm:constr type="w" for="ch" forName="node" refType="w"/>
-          <dgm:constr type="w" for="ch" ptType="sibTrans" refType="w" refFor="ch" refForName="node" fact="0.5"/>
-          <dgm:constr type="h" for="ch" ptType="sibTrans" op="equ"/>
-          <dgm:constr type="diam" for="ch" ptType="sibTrans" refType="diam" op="equ" fact="-1"/>
-          <dgm:constr type="sibSp" refType="w" refFor="ch" refForName="node" fact="0.15"/>
-          <dgm:constr type="w" for="ch" forName="dummy" refType="sibSp" fact="2.8"/>
-          <dgm:constr type="primFontSz" for="ch" forName="node" op="equ" val="65"/>
-        </dgm:constrLst>
-      </dgm:else>
-    </dgm:choose>
-    <dgm:ruleLst>
-      <dgm:rule type="diam" val="INF" fact="NaN" max="NaN"/>
-    </dgm:ruleLst>
-    <dgm:forEach name="nodesForEach" axis="ch" ptType="node">
-      <dgm:choose name="Name6">
-        <dgm:if name="Name7" axis="par ch" ptType="doc node" func="cnt" op="gt" val="1">
-          <dgm:layoutNode name="dummy">
-            <dgm:alg type="sp"/>
-            <dgm:shape xmlns:r="http://schemas.openxmlformats.org/officeDocument/2006/relationships" r:blip="">
-              <dgm:adjLst/>
-            </dgm:shape>
-            <dgm:presOf/>
-            <dgm:constrLst>
-              <dgm:constr type="h" refType="w"/>
-            </dgm:constrLst>
-            <dgm:ruleLst/>
-          </dgm:layoutNode>
-        </dgm:if>
-        <dgm:else name="Name8"/>
-      </dgm:choose>
-      <dgm:layoutNode name="node" styleLbl="revTx">
-        <dgm:varLst>
-          <dgm:bulletEnabled val="1"/>
-        </dgm:varLst>
-        <dgm:alg type="tx">
-          <dgm:param type="txAnchorVertCh" val="mid"/>
-        </dgm:alg>
-        <dgm:shape xmlns:r="http://schemas.openxmlformats.org/officeDocument/2006/relationships" type="rect" r:blip="">
-          <dgm:adjLst/>
-        </dgm:shape>
-        <dgm:presOf axis="desOrSelf" ptType="node"/>
-        <dgm:constrLst>
-          <dgm:constr type="h" refType="w"/>
-          <dgm:constr type="lMarg" refType="primFontSz" fact="0.1"/>
-          <dgm:constr type="rMarg" refType="primFontSz" fact="0.1"/>
-          <dgm:constr type="tMarg" refType="primFontSz" fact="0.1"/>
-          <dgm:constr type="bMarg" refType="primFontSz" fact="0.1"/>
-        </dgm:constrLst>
-        <dgm:ruleLst>
-          <dgm:rule type="primFontSz" val="5" fact="NaN" max="NaN"/>
-        </dgm:ruleLst>
-      </dgm:layoutNode>
-      <dgm:choose name="Name9">
-        <dgm:if name="Name10" axis="par ch" ptType="doc node" func="cnt" op="gt" val="1">
-          <dgm:forEach name="Name11" axis="followSib" ptType="sibTrans" hideLastTrans="0" cnt="1">
-            <dgm:layoutNode name="sibTrans" styleLbl="node1">
-              <dgm:alg type="conn">
-                <dgm:param type="connRout" val="curve"/>
-                <dgm:param type="begPts" val="radial"/>
-                <dgm:param type="endPts" val="radial"/>
-              </dgm:alg>
-              <dgm:shape xmlns:r="http://schemas.openxmlformats.org/officeDocument/2006/relationships" type="conn" r:blip="">
-                <dgm:adjLst/>
-              </dgm:shape>
-              <dgm:presOf axis="self"/>
-              <dgm:constrLst>
-                <dgm:constr type="h" refType="w" fact="0.65"/>
-                <dgm:constr type="begPad"/>
-                <dgm:constr type="endPad"/>
-              </dgm:constrLst>
-              <dgm:ruleLst/>
-            </dgm:layoutNode>
-          </dgm:forEach>
-        </dgm:if>
-        <dgm:else name="Name12"/>
-      </dgm:choose>
-    </dgm:forEach>
-  </dgm:layoutNode>
-</dgm:layoutDef>
-</file>
-
-<file path=ppt/diagrams/quickStyle1.xml><?xml version="1.0" encoding="utf-8"?>
-<dgm:styleDef xmlns:dgm="http://schemas.openxmlformats.org/drawingml/2006/diagram" xmlns:a="http://schemas.openxmlformats.org/drawingml/2006/main" uniqueId="urn:microsoft.com/office/officeart/2005/8/quickstyle/simple4">
-  <dgm:title val=""/>
-  <dgm:desc val=""/>
-  <dgm:catLst>
-    <dgm:cat type="simple" pri="10400"/>
-  </dgm:catLst>
-  <dgm:scene3d>
-    <a:camera prst="orthographicFront"/>
-    <a:lightRig rig="threePt" dir="t"/>
-  </dgm:scene3d>
-  <dgm:styleLbl name="node0">
-    <dgm:scene3d>
-      <a:camera prst="orthographicFront"/>
-      <a:lightRig rig="threePt" dir="t"/>
-    </dgm:scene3d>
-    <dgm:sp3d/>
-    <dgm:txPr/>
-    <dgm:style>
-      <a:lnRef idx="0">
-        <a:scrgbClr r="0" g="0" b="0"/>
-      </a:lnRef>
-      <a:fillRef idx="3">
-        <a:scrgbClr r="0" g="0" b="0"/>
-      </a:fillRef>
-      <a:effectRef idx="2">
-        <a:scrgbClr r="0" g="0" b="0"/>
-      </a:effectRef>
-      <a:fontRef idx="minor">
-        <a:schemeClr val="lt1"/>
-      </a:fontRef>
-    </dgm:style>
-  </dgm:styleLbl>
-  <dgm:styleLbl name="lnNode1">
-    <dgm:scene3d>
-      <a:camera prst="orthographicFront"/>
-      <a:lightRig rig="threePt" dir="t"/>
-    </dgm:scene3d>
-    <dgm:sp3d/>
-    <dgm:txPr/>
-    <dgm:style>
-      <a:lnRef idx="1">
-        <a:scrgbClr r="0" g="0" b="0"/>
-      </a:lnRef>
-      <a:fillRef idx="3">
-        <a:scrgbClr r="0" g="0" b="0"/>
-      </a:fillRef>
-      <a:effectRef idx="2">
-        <a:scrgbClr r="0" g="0" b="0"/>
-      </a:effectRef>
-      <a:fontRef idx="minor">
-        <a:schemeClr val="lt1"/>
-      </a:fontRef>
-    </dgm:style>
-  </dgm:styleLbl>
-  <dgm:styleLbl name="vennNode1">
-    <dgm:scene3d>
-      <a:camera prst="orthographicFront"/>
-      <a:lightRig rig="threePt" dir="t"/>
-    </dgm:scene3d>
-    <dgm:sp3d/>
-    <dgm:txPr/>
-    <dgm:style>
-      <a:lnRef idx="0">
-        <a:scrgbClr r="0" g="0" b="0"/>
-      </a:lnRef>
-      <a:fillRef idx="3">
-        <a:scrgbClr r="0" g="0" b="0"/>
-      </a:fillRef>
-      <a:effectRef idx="0">
-        <a:scrgbClr r="0" g="0" b="0"/>
-      </a:effectRef>
-      <a:fontRef idx="minor">
-        <a:schemeClr val="tx1"/>
-      </a:fontRef>
-    </dgm:style>
-  </dgm:styleLbl>
-  <dgm:styleLbl name="alignNode1">
-    <dgm:scene3d>
-      <a:camera prst="orthographicFront"/>
-      <a:lightRig rig="threePt" dir="t"/>
-    </dgm:scene3d>
-    <dgm:sp3d/>
-    <dgm:txPr/>
-    <dgm:style>
-      <a:lnRef idx="1">
-        <a:scrgbClr r="0" g="0" b="0"/>
-      </a:lnRef>
-      <a:fillRef idx="3">
-        <a:scrgbClr r="0" g="0" b="0"/>
-      </a:fillRef>
-      <a:effectRef idx="2">
-        <a:scrgbClr r="0" g="0" b="0"/>
-      </a:effectRef>
-      <a:fontRef idx="minor">
-        <a:schemeClr val="lt1"/>
-      </a:fontRef>
-    </dgm:style>
-  </dgm:styleLbl>
-  <dgm:styleLbl name="node1">
-    <dgm:scene3d>
-      <a:camera prst="orthographicFront"/>
-      <a:lightRig rig="threePt" dir="t"/>
-    </dgm:scene3d>
-    <dgm:sp3d/>
-    <dgm:txPr/>
-    <dgm:style>
-      <a:lnRef idx="0">
-        <a:scrgbClr r="0" g="0" b="0"/>
-      </a:lnRef>
-      <a:fillRef idx="3">
-        <a:scrgbClr r="0" g="0" b="0"/>
-      </a:fillRef>
-      <a:effectRef idx="2">
-        <a:scrgbClr r="0" g="0" b="0"/>
-      </a:effectRef>
-      <a:fontRef idx="minor">
-        <a:schemeClr val="lt1"/>
-      </a:fontRef>
-    </dgm:style>
-  </dgm:styleLbl>
-  <dgm:styleLbl name="node2">
-    <dgm:scene3d>
-      <a:camera prst="orthographicFront"/>
-      <a:lightRig rig="threePt" dir="t"/>
-    </dgm:scene3d>
-    <dgm:sp3d/>
-    <dgm:txPr/>
-    <dgm:style>
-      <a:lnRef idx="0">
-        <a:scrgbClr r="0" g="0" b="0"/>
-      </a:lnRef>
-      <a:fillRef idx="3">
-        <a:scrgbClr r="0" g="0" b="0"/>
-      </a:fillRef>
-      <a:effectRef idx="2">
-        <a:scrgbClr r="0" g="0" b="0"/>
-      </a:effectRef>
-      <a:fontRef idx="minor">
-        <a:schemeClr val="lt1"/>
-      </a:fontRef>
-    </dgm:style>
-  </dgm:styleLbl>
-  <dgm:styleLbl name="node3">
-    <dgm:scene3d>
-      <a:camera prst="orthographicFront"/>
-      <a:lightRig rig="threePt" dir="t"/>
-    </dgm:scene3d>
-    <dgm:sp3d/>
-    <dgm:txPr/>
-    <dgm:style>
-      <a:lnRef idx="0">
-        <a:scrgbClr r="0" g="0" b="0"/>
-      </a:lnRef>
-      <a:fillRef idx="3">
-        <a:scrgbClr r="0" g="0" b="0"/>
-      </a:fillRef>
-      <a:effectRef idx="2">
-        <a:scrgbClr r="0" g="0" b="0"/>
-      </a:effectRef>
-      <a:fontRef idx="minor">
-        <a:schemeClr val="lt1"/>
-      </a:fontRef>
-    </dgm:style>
-  </dgm:styleLbl>
-  <dgm:styleLbl name="node4">
-    <dgm:scene3d>
-      <a:camera prst="orthographicFront"/>
-      <a:lightRig rig="threePt" dir="t"/>
-    </dgm:scene3d>
-    <dgm:sp3d/>
-    <dgm:txPr/>
-    <dgm:style>
-      <a:lnRef idx="0">
-        <a:scrgbClr r="0" g="0" b="0"/>
-      </a:lnRef>
-      <a:fillRef idx="3">
-        <a:scrgbClr r="0" g="0" b="0"/>
-      </a:fillRef>
-      <a:effectRef idx="2">
-        <a:scrgbClr r="0" g="0" b="0"/>
-      </a:effectRef>
-      <a:fontRef idx="minor">
-        <a:schemeClr val="lt1"/>
-      </a:fontRef>
-    </dgm:style>
-  </dgm:styleLbl>
-  <dgm:styleLbl name="fgImgPlace1">
-    <dgm:scene3d>
-      <a:camera prst="orthographicFront"/>
-      <a:lightRig rig="threePt" dir="t"/>
-    </dgm:scene3d>
-    <dgm:sp3d/>
-    <dgm:txPr/>
-    <dgm:style>
-      <a:lnRef idx="0">
-        <a:scrgbClr r="0" g="0" b="0"/>
-      </a:lnRef>
-      <a:fillRef idx="1">
-        <a:scrgbClr r="0" g="0" b="0"/>
-      </a:fillRef>
-      <a:effectRef idx="2">
-        <a:scrgbClr r="0" g="0" b="0"/>
-      </a:effectRef>
-      <a:fontRef idx="minor"/>
-    </dgm:style>
-  </dgm:styleLbl>
-  <dgm:styleLbl name="alignImgPlace1">
-    <dgm:scene3d>
-      <a:camera prst="orthographicFront"/>
-      <a:lightRig rig="threePt" dir="t"/>
-    </dgm:scene3d>
-    <dgm:sp3d/>
-    <dgm:txPr/>
-    <dgm:style>
-      <a:lnRef idx="0">
-        <a:scrgbClr r="0" g="0" b="0"/>
-      </a:lnRef>
-      <a:fillRef idx="1">
-        <a:scrgbClr r="0" g="0" b="0"/>
-      </a:fillRef>
-      <a:effectRef idx="2">
-        <a:scrgbClr r="0" g="0" b="0"/>
-      </a:effectRef>
-      <a:fontRef idx="minor"/>
-    </dgm:style>
-  </dgm:styleLbl>
-  <dgm:styleLbl name="bgImgPlace1">
-    <dgm:scene3d>
-      <a:camera prst="orthographicFront"/>
-      <a:lightRig rig="threePt" dir="t"/>
-    </dgm:scene3d>
-    <dgm:sp3d/>
-    <dgm:txPr/>
-    <dgm:style>
-      <a:lnRef idx="0">
-        <a:scrgbClr r="0" g="0" b="0"/>
-      </a:lnRef>
-      <a:fillRef idx="1">
-        <a:scrgbClr r="0" g="0" b="0"/>
-      </a:fillRef>
-      <a:effectRef idx="2">
-        <a:scrgbClr r="0" g="0" b="0"/>
-      </a:effectRef>
-      <a:fontRef idx="minor"/>
-    </dgm:style>
-  </dgm:styleLbl>
-  <dgm:styleLbl name="sibTrans2D1">
-    <dgm:scene3d>
-      <a:camera prst="orthographicFront"/>
-      <a:lightRig rig="threePt" dir="t"/>
-    </dgm:scene3d>
-    <dgm:sp3d/>
-    <dgm:txPr/>
-    <dgm:style>
-      <a:lnRef idx="0">
-        <a:scrgbClr r="0" g="0" b="0"/>
-      </a:lnRef>
-      <a:fillRef idx="3">
-        <a:scrgbClr r="0" g="0" b="0"/>
-      </a:fillRef>
-      <a:effectRef idx="2">
-        <a:scrgbClr r="0" g="0" b="0"/>
-      </a:effectRef>
-      <a:fontRef idx="minor">
-        <a:schemeClr val="lt1"/>
-      </a:fontRef>
-    </dgm:style>
-  </dgm:styleLbl>
-  <dgm:styleLbl name="fgSibTrans2D1">
-    <dgm:scene3d>
-      <a:camera prst="orthographicFront"/>
-      <a:lightRig rig="threePt" dir="t"/>
-    </dgm:scene3d>
-    <dgm:sp3d/>
-    <dgm:txPr/>
-    <dgm:style>
-      <a:lnRef idx="0">
-        <a:scrgbClr r="0" g="0" b="0"/>
-      </a:lnRef>
-      <a:fillRef idx="3">
-        <a:scrgbClr r="0" g="0" b="0"/>
-      </a:fillRef>
-      <a:effectRef idx="2">
-        <a:scrgbClr r="0" g="0" b="0"/>
-      </a:effectRef>
-      <a:fontRef idx="minor">
-        <a:schemeClr val="lt1"/>
-      </a:fontRef>
-    </dgm:style>
-  </dgm:styleLbl>
-  <dgm:styleLbl name="bgSibTrans2D1">
-    <dgm:scene3d>
-      <a:camera prst="orthographicFront"/>
-      <a:lightRig rig="threePt" dir="t"/>
-    </dgm:scene3d>
-    <dgm:sp3d/>
-    <dgm:txPr/>
-    <dgm:style>
-      <a:lnRef idx="0">
-        <a:scrgbClr r="0" g="0" b="0"/>
-      </a:lnRef>
-      <a:fillRef idx="3">
-        <a:scrgbClr r="0" g="0" b="0"/>
-      </a:fillRef>
-      <a:effectRef idx="2">
-        <a:scrgbClr r="0" g="0" b="0"/>
-      </a:effectRef>
-      <a:fontRef idx="minor">
-        <a:schemeClr val="lt1"/>
-      </a:fontRef>
-    </dgm:style>
-  </dgm:styleLbl>
-  <dgm:styleLbl name="sibTrans1D1">
-    <dgm:scene3d>
-      <a:camera prst="orthographicFront"/>
-      <a:lightRig rig="threePt" dir="t"/>
-    </dgm:scene3d>
-    <dgm:sp3d/>
-    <dgm:txPr/>
-    <dgm:style>
-      <a:lnRef idx="1">
-        <a:scrgbClr r="0" g="0" b="0"/>
-      </a:lnRef>
-      <a:fillRef idx="0">
-        <a:scrgbClr r="0" g="0" b="0"/>
-      </a:fillRef>
-      <a:effectRef idx="0">
-        <a:scrgbClr r="0" g="0" b="0"/>
-      </a:effectRef>
-      <a:fontRef idx="minor"/>
-    </dgm:style>
-  </dgm:styleLbl>
-  <dgm:styleLbl name="callout">
-    <dgm:scene3d>
-      <a:camera prst="orthographicFront"/>
-      <a:lightRig rig="threePt" dir="t"/>
-    </dgm:scene3d>
-    <dgm:sp3d/>
-    <dgm:txPr/>
-    <dgm:style>
-      <a:lnRef idx="2">
-        <a:scrgbClr r="0" g="0" b="0"/>
-      </a:lnRef>
-      <a:fillRef idx="1">
-        <a:scrgbClr r="0" g="0" b="0"/>
-      </a:fillRef>
-      <a:effectRef idx="1">
-        <a:scrgbClr r="0" g="0" b="0"/>
-      </a:effectRef>
-      <a:fontRef idx="minor"/>
-    </dgm:style>
-  </dgm:styleLbl>
-  <dgm:styleLbl name="asst0">
-    <dgm:scene3d>
-      <a:camera prst="orthographicFront"/>
-      <a:lightRig rig="threePt" dir="t"/>
-    </dgm:scene3d>
-    <dgm:sp3d/>
-    <dgm:txPr/>
-    <dgm:style>
-      <a:lnRef idx="0">
-        <a:scrgbClr r="0" g="0" b="0"/>
-      </a:lnRef>
-      <a:fillRef idx="3">
-        <a:scrgbClr r="0" g="0" b="0"/>
-      </a:fillRef>
-      <a:effectRef idx="2">
-        <a:scrgbClr r="0" g="0" b="0"/>
-      </a:effectRef>
-      <a:fontRef idx="minor">
-        <a:schemeClr val="lt1"/>
-      </a:fontRef>
-    </dgm:style>
-  </dgm:styleLbl>
-  <dgm:styleLbl name="asst1">
-    <dgm:scene3d>
-      <a:camera prst="orthographicFront"/>
-      <a:lightRig rig="threePt" dir="t"/>
-    </dgm:scene3d>
-    <dgm:sp3d/>
-    <dgm:txPr/>
-    <dgm:style>
-      <a:lnRef idx="0">
-        <a:scrgbClr r="0" g="0" b="0"/>
-      </a:lnRef>
-      <a:fillRef idx="3">
-        <a:scrgbClr r="0" g="0" b="0"/>
-      </a:fillRef>
-      <a:effectRef idx="2">
-        <a:scrgbClr r="0" g="0" b="0"/>
-      </a:effectRef>
-      <a:fontRef idx="minor">
-        <a:schemeClr val="lt1"/>
-      </a:fontRef>
-    </dgm:style>
-  </dgm:styleLbl>
-  <dgm:styleLbl name="asst2">
-    <dgm:scene3d>
-      <a:camera prst="orthographicFront"/>
-      <a:lightRig rig="threePt" dir="t"/>
-    </dgm:scene3d>
-    <dgm:sp3d/>
-    <dgm:txPr/>
-    <dgm:style>
-      <a:lnRef idx="0">
-        <a:scrgbClr r="0" g="0" b="0"/>
-      </a:lnRef>
-      <a:fillRef idx="3">
-        <a:scrgbClr r="0" g="0" b="0"/>
-      </a:fillRef>
-      <a:effectRef idx="2">
-        <a:scrgbClr r="0" g="0" b="0"/>
-      </a:effectRef>
-      <a:fontRef idx="minor">
-        <a:schemeClr val="lt1"/>
-      </a:fontRef>
-    </dgm:style>
-  </dgm:styleLbl>
-  <dgm:styleLbl name="asst3">
-    <dgm:scene3d>
-      <a:camera prst="orthographicFront"/>
-      <a:lightRig rig="threePt" dir="t"/>
-    </dgm:scene3d>
-    <dgm:sp3d/>
-    <dgm:txPr/>
-    <dgm:style>
-      <a:lnRef idx="0">
-        <a:scrgbClr r="0" g="0" b="0"/>
-      </a:lnRef>
-      <a:fillRef idx="3">
-        <a:scrgbClr r="0" g="0" b="0"/>
-      </a:fillRef>
-      <a:effectRef idx="2">
-        <a:scrgbClr r="0" g="0" b="0"/>
-      </a:effectRef>
-      <a:fontRef idx="minor">
-        <a:schemeClr val="lt1"/>
-      </a:fontRef>
-    </dgm:style>
-  </dgm:styleLbl>
-  <dgm:styleLbl name="asst4">
-    <dgm:scene3d>
-      <a:camera prst="orthographicFront"/>
-      <a:lightRig rig="threePt" dir="t"/>
-    </dgm:scene3d>
-    <dgm:sp3d/>
-    <dgm:txPr/>
-    <dgm:style>
-      <a:lnRef idx="0">
-        <a:scrgbClr r="0" g="0" b="0"/>
-      </a:lnRef>
-      <a:fillRef idx="3">
-        <a:scrgbClr r="0" g="0" b="0"/>
-      </a:fillRef>
-      <a:effectRef idx="2">
-        <a:scrgbClr r="0" g="0" b="0"/>
-      </a:effectRef>
-      <a:fontRef idx="minor">
-        <a:schemeClr val="lt1"/>
-      </a:fontRef>
-    </dgm:style>
-  </dgm:styleLbl>
-  <dgm:styleLbl name="parChTrans2D1">
-    <dgm:scene3d>
-      <a:camera prst="orthographicFront"/>
-      <a:lightRig rig="threePt" dir="t"/>
-    </dgm:scene3d>
-    <dgm:sp3d/>
-    <dgm:txPr/>
-    <dgm:style>
-      <a:lnRef idx="0">
-        <a:scrgbClr r="0" g="0" b="0"/>
-      </a:lnRef>
-      <a:fillRef idx="3">
-        <a:scrgbClr r="0" g="0" b="0"/>
-      </a:fillRef>
-      <a:effectRef idx="2">
-        <a:scrgbClr r="0" g="0" b="0"/>
-      </a:effectRef>
-      <a:fontRef idx="minor">
-        <a:schemeClr val="lt1"/>
-      </a:fontRef>
-    </dgm:style>
-  </dgm:styleLbl>
-  <dgm:styleLbl name="parChTrans2D2">
-    <dgm:scene3d>
-      <a:camera prst="orthographicFront"/>
-      <a:lightRig rig="threePt" dir="t"/>
-    </dgm:scene3d>
-    <dgm:sp3d/>
-    <dgm:txPr/>
-    <dgm:style>
-      <a:lnRef idx="0">
-        <a:scrgbClr r="0" g="0" b="0"/>
-      </a:lnRef>
-      <a:fillRef idx="3">
-        <a:scrgbClr r="0" g="0" b="0"/>
-      </a:fillRef>
-      <a:effectRef idx="2">
-        <a:scrgbClr r="0" g="0" b="0"/>
-      </a:effectRef>
-      <a:fontRef idx="minor">
-        <a:schemeClr val="lt1"/>
-      </a:fontRef>
-    </dgm:style>
-  </dgm:styleLbl>
-  <dgm:styleLbl name="parChTrans2D3">
-    <dgm:scene3d>
-      <a:camera prst="orthographicFront"/>
-      <a:lightRig rig="threePt" dir="t"/>
-    </dgm:scene3d>
-    <dgm:sp3d/>
-    <dgm:txPr/>
-    <dgm:style>
-      <a:lnRef idx="1">
-        <a:scrgbClr r="0" g="0" b="0"/>
-      </a:lnRef>
-      <a:fillRef idx="3">
-        <a:scrgbClr r="0" g="0" b="0"/>
-      </a:fillRef>
-      <a:effectRef idx="2">
-        <a:scrgbClr r="0" g="0" b="0"/>
-      </a:effectRef>
-      <a:fontRef idx="minor">
-        <a:schemeClr val="lt1"/>
-      </a:fontRef>
-    </dgm:style>
-  </dgm:styleLbl>
-  <dgm:styleLbl name="parChTrans2D4">
-    <dgm:scene3d>
-      <a:camera prst="orthographicFront"/>
-      <a:lightRig rig="threePt" dir="t"/>
-    </dgm:scene3d>
-    <dgm:sp3d/>
-    <dgm:txPr/>
-    <dgm:style>
-      <a:lnRef idx="1">
-        <a:scrgbClr r="0" g="0" b="0"/>
-      </a:lnRef>
-      <a:fillRef idx="3">
-        <a:scrgbClr r="0" g="0" b="0"/>
-      </a:fillRef>
-      <a:effectRef idx="2">
-        <a:scrgbClr r="0" g="0" b="0"/>
-      </a:effectRef>
-      <a:fontRef idx="minor">
-        <a:schemeClr val="lt1"/>
-      </a:fontRef>
-    </dgm:style>
-  </dgm:styleLbl>
-  <dgm:styleLbl name="parChTrans1D1">
-    <dgm:scene3d>
-      <a:camera prst="orthographicFront"/>
-      <a:lightRig rig="threePt" dir="t"/>
-    </dgm:scene3d>
-    <dgm:sp3d/>
-    <dgm:txPr/>
-    <dgm:style>
-      <a:lnRef idx="1">
-        <a:scrgbClr r="0" g="0" b="0"/>
-      </a:lnRef>
-      <a:fillRef idx="0">
-        <a:scrgbClr r="0" g="0" b="0"/>
-      </a:fillRef>
-      <a:effectRef idx="0">
-        <a:scrgbClr r="0" g="0" b="0"/>
-      </a:effectRef>
-      <a:fontRef idx="minor"/>
-    </dgm:style>
-  </dgm:styleLbl>
-  <dgm:styleLbl name="parChTrans1D2">
-    <dgm:scene3d>
-      <a:camera prst="orthographicFront"/>
-      <a:lightRig rig="threePt" dir="t"/>
-    </dgm:scene3d>
-    <dgm:sp3d/>
-    <dgm:txPr/>
-    <dgm:style>
-      <a:lnRef idx="1">
-        <a:scrgbClr r="0" g="0" b="0"/>
-      </a:lnRef>
-      <a:fillRef idx="0">
-        <a:scrgbClr r="0" g="0" b="0"/>
-      </a:fillRef>
-      <a:effectRef idx="0">
-        <a:scrgbClr r="0" g="0" b="0"/>
-      </a:effectRef>
-      <a:fontRef idx="minor"/>
-    </dgm:style>
-  </dgm:styleLbl>
-  <dgm:styleLbl name="parChTrans1D3">
-    <dgm:scene3d>
-      <a:camera prst="orthographicFront"/>
-      <a:lightRig rig="threePt" dir="t"/>
-    </dgm:scene3d>
-    <dgm:sp3d/>
-    <dgm:txPr/>
-    <dgm:style>
-      <a:lnRef idx="1">
-        <a:scrgbClr r="0" g="0" b="0"/>
-      </a:lnRef>
-      <a:fillRef idx="0">
-        <a:scrgbClr r="0" g="0" b="0"/>
-      </a:fillRef>
-      <a:effectRef idx="0">
-        <a:scrgbClr r="0" g="0" b="0"/>
-      </a:effectRef>
-      <a:fontRef idx="minor"/>
-    </dgm:style>
-  </dgm:styleLbl>
-  <dgm:styleLbl name="parChTrans1D4">
-    <dgm:scene3d>
-      <a:camera prst="orthographicFront"/>
-      <a:lightRig rig="threePt" dir="t"/>
-    </dgm:scene3d>
-    <dgm:sp3d/>
-    <dgm:txPr/>
-    <dgm:style>
-      <a:lnRef idx="1">
-        <a:scrgbClr r="0" g="0" b="0"/>
-      </a:lnRef>
-      <a:fillRef idx="0">
-        <a:scrgbClr r="0" g="0" b="0"/>
-      </a:fillRef>
-      <a:effectRef idx="0">
-        <a:scrgbClr r="0" g="0" b="0"/>
-      </a:effectRef>
-      <a:fontRef idx="minor"/>
-    </dgm:style>
-  </dgm:styleLbl>
-  <dgm:styleLbl name="fgAcc1">
-    <dgm:scene3d>
-      <a:camera prst="orthographicFront"/>
-      <a:lightRig rig="threePt" dir="t"/>
-    </dgm:scene3d>
-    <dgm:sp3d/>
-    <dgm:txPr/>
-    <dgm:style>
-      <a:lnRef idx="1">
-        <a:scrgbClr r="0" g="0" b="0"/>
-      </a:lnRef>
-      <a:fillRef idx="1">
-        <a:scrgbClr r="0" g="0" b="0"/>
-      </a:fillRef>
-      <a:effectRef idx="0">
-        <a:scrgbClr r="0" g="0" b="0"/>
-      </a:effectRef>
-      <a:fontRef idx="minor"/>
-    </dgm:style>
-  </dgm:styleLbl>
-  <dgm:styleLbl name="conFgAcc1">
-    <dgm:scene3d>
-      <a:camera prst="orthographicFront"/>
-      <a:lightRig rig="threePt" dir="t"/>
-    </dgm:scene3d>
-    <dgm:sp3d/>
-    <dgm:txPr/>
-    <dgm:style>
-      <a:lnRef idx="1">
-        <a:scrgbClr r="0" g="0" b="0"/>
-      </a:lnRef>
-      <a:fillRef idx="1">
-        <a:scrgbClr r="0" g="0" b="0"/>
-      </a:fillRef>
-      <a:effectRef idx="0">
-        <a:scrgbClr r="0" g="0" b="0"/>
-      </a:effectRef>
-      <a:fontRef idx="minor"/>
-    </dgm:style>
-  </dgm:styleLbl>
-  <dgm:styleLbl name="alignAcc1">
-    <dgm:scene3d>
-      <a:camera prst="orthographicFront"/>
-      <a:lightRig rig="threePt" dir="t"/>
-    </dgm:scene3d>
-    <dgm:sp3d/>
-    <dgm:txPr/>
-    <dgm:style>
-      <a:lnRef idx="1">
-        <a:scrgbClr r="0" g="0" b="0"/>
-      </a:lnRef>
-      <a:fillRef idx="1">
-        <a:scrgbClr r="0" g="0" b="0"/>
-      </a:fillRef>
-      <a:effectRef idx="0">
-        <a:scrgbClr r="0" g="0" b="0"/>
-      </a:effectRef>
-      <a:fontRef idx="minor"/>
-    </dgm:style>
-  </dgm:styleLbl>
-  <dgm:styleLbl name="trAlignAcc1">
-    <dgm:scene3d>
-      <a:camera prst="orthographicFront"/>
-      <a:lightRig rig="threePt" dir="t"/>
-    </dgm:scene3d>
-    <dgm:sp3d/>
-    <dgm:txPr/>
-    <dgm:style>
-      <a:lnRef idx="1">
-        <a:scrgbClr r="0" g="0" b="0"/>
-      </a:lnRef>
-      <a:fillRef idx="1">
-        <a:scrgbClr r="0" g="0" b="0"/>
-      </a:fillRef>
-      <a:effectRef idx="0">
-        <a:scrgbClr r="0" g="0" b="0"/>
-      </a:effectRef>
-      <a:fontRef idx="minor"/>
-    </dgm:style>
-  </dgm:styleLbl>
-  <dgm:styleLbl name="bgAcc1">
-    <dgm:scene3d>
-      <a:camera prst="orthographicFront"/>
-      <a:lightRig rig="threePt" dir="t"/>
-    </dgm:scene3d>
-    <dgm:sp3d/>
-    <dgm:txPr/>
-    <dgm:style>
-      <a:lnRef idx="1">
-        <a:scrgbClr r="0" g="0" b="0"/>
-      </a:lnRef>
-      <a:fillRef idx="1">
-        <a:scrgbClr r="0" g="0" b="0"/>
-      </a:fillRef>
-      <a:effectRef idx="0">
-        <a:scrgbClr r="0" g="0" b="0"/>
-      </a:effectRef>
-      <a:fontRef idx="minor"/>
-    </dgm:style>
-  </dgm:styleLbl>
-  <dgm:styleLbl name="solidFgAcc1">
-    <dgm:scene3d>
-      <a:camera prst="orthographicFront"/>
-      <a:lightRig rig="threePt" dir="t"/>
-    </dgm:scene3d>
-    <dgm:sp3d/>
-    <dgm:txPr/>
-    <dgm:style>
-      <a:lnRef idx="1">
-        <a:scrgbClr r="0" g="0" b="0"/>
-      </a:lnRef>
-      <a:fillRef idx="1">
-        <a:scrgbClr r="0" g="0" b="0"/>
-      </a:fillRef>
-      <a:effectRef idx="0">
-        <a:scrgbClr r="0" g="0" b="0"/>
-      </a:effectRef>
-      <a:fontRef idx="minor"/>
-    </dgm:style>
-  </dgm:styleLbl>
-  <dgm:styleLbl name="solidAlignAcc1">
-    <dgm:scene3d>
-      <a:camera prst="orthographicFront"/>
-      <a:lightRig rig="threePt" dir="t"/>
-    </dgm:scene3d>
-    <dgm:sp3d/>
-    <dgm:txPr/>
-    <dgm:style>
-      <a:lnRef idx="1">
-        <a:scrgbClr r="0" g="0" b="0"/>
-      </a:lnRef>
-      <a:fillRef idx="1">
-        <a:scrgbClr r="0" g="0" b="0"/>
-      </a:fillRef>
-      <a:effectRef idx="0">
-        <a:scrgbClr r="0" g="0" b="0"/>
-      </a:effectRef>
-      <a:fontRef idx="minor"/>
-    </dgm:style>
-  </dgm:styleLbl>
-  <dgm:styleLbl name="solidBgAcc1">
-    <dgm:scene3d>
-      <a:camera prst="orthographicFront"/>
-      <a:lightRig rig="threePt" dir="t"/>
-    </dgm:scene3d>
-    <dgm:sp3d/>
-    <dgm:txPr/>
-    <dgm:style>
-      <a:lnRef idx="1">
-        <a:scrgbClr r="0" g="0" b="0"/>
-      </a:lnRef>
-      <a:fillRef idx="1">
-        <a:scrgbClr r="0" g="0" b="0"/>
-      </a:fillRef>
-      <a:effectRef idx="0">
-        <a:scrgbClr r="0" g="0" b="0"/>
-      </a:effectRef>
-      <a:fontRef idx="minor"/>
-    </dgm:style>
-  </dgm:styleLbl>
-  <dgm:styleLbl name="fgAccFollowNode1">
-    <dgm:scene3d>
-      <a:camera prst="orthographicFront"/>
-      <a:lightRig rig="threePt" dir="t"/>
-    </dgm:scene3d>
-    <dgm:sp3d/>
-    <dgm:txPr/>
-    <dgm:style>
-      <a:lnRef idx="1">
-        <a:scrgbClr r="0" g="0" b="0"/>
-      </a:lnRef>
-      <a:fillRef idx="1">
-        <a:scrgbClr r="0" g="0" b="0"/>
-      </a:fillRef>
-      <a:effectRef idx="0">
-        <a:scrgbClr r="0" g="0" b="0"/>
-      </a:effectRef>
-      <a:fontRef idx="minor"/>
-    </dgm:style>
-  </dgm:styleLbl>
-  <dgm:styleLbl name="alignAccFollowNode1">
-    <dgm:scene3d>
-      <a:camera prst="orthographicFront"/>
-      <a:lightRig rig="threePt" dir="t"/>
-    </dgm:scene3d>
-    <dgm:sp3d/>
-    <dgm:txPr/>
-    <dgm:style>
-      <a:lnRef idx="1">
-        <a:scrgbClr r="0" g="0" b="0"/>
-      </a:lnRef>
-      <a:fillRef idx="1">
-        <a:scrgbClr r="0" g="0" b="0"/>
-      </a:fillRef>
-      <a:effectRef idx="0">
-        <a:scrgbClr r="0" g="0" b="0"/>
-      </a:effectRef>
-      <a:fontRef idx="minor"/>
-    </dgm:style>
-  </dgm:styleLbl>
-  <dgm:styleLbl name="bgAccFollowNode1">
-    <dgm:scene3d>
-      <a:camera prst="orthographicFront"/>
-      <a:lightRig rig="threePt" dir="t"/>
-    </dgm:scene3d>
-    <dgm:sp3d/>
-    <dgm:txPr/>
-    <dgm:style>
-      <a:lnRef idx="1">
-        <a:scrgbClr r="0" g="0" b="0"/>
-      </a:lnRef>
-      <a:fillRef idx="1">
-        <a:scrgbClr r="0" g="0" b="0"/>
-      </a:fillRef>
-      <a:effectRef idx="0">
-        <a:scrgbClr r="0" g="0" b="0"/>
-      </a:effectRef>
-      <a:fontRef idx="minor"/>
-    </dgm:style>
-  </dgm:styleLbl>
-  <dgm:styleLbl name="fgAcc0">
-    <dgm:scene3d>
-      <a:camera prst="orthographicFront"/>
-      <a:lightRig rig="threePt" dir="t"/>
-    </dgm:scene3d>
-    <dgm:sp3d/>
-    <dgm:txPr/>
-    <dgm:style>
-      <a:lnRef idx="1">
-        <a:scrgbClr r="0" g="0" b="0"/>
-      </a:lnRef>
-      <a:fillRef idx="1">
-        <a:scrgbClr r="0" g="0" b="0"/>
-      </a:fillRef>
-      <a:effectRef idx="0">
-        <a:scrgbClr r="0" g="0" b="0"/>
-      </a:effectRef>
-      <a:fontRef idx="minor"/>
-    </dgm:style>
-  </dgm:styleLbl>
-  <dgm:styleLbl name="fgAcc2">
-    <dgm:scene3d>
-      <a:camera prst="orthographicFront"/>
-      <a:lightRig rig="threePt" dir="t"/>
-    </dgm:scene3d>
-    <dgm:sp3d/>
-    <dgm:txPr/>
-    <dgm:style>
-      <a:lnRef idx="1">
-        <a:scrgbClr r="0" g="0" b="0"/>
-      </a:lnRef>
-      <a:fillRef idx="1">
-        <a:scrgbClr r="0" g="0" b="0"/>
-      </a:fillRef>
-      <a:effectRef idx="0">
-        <a:scrgbClr r="0" g="0" b="0"/>
-      </a:effectRef>
-      <a:fontRef idx="minor"/>
-    </dgm:style>
-  </dgm:styleLbl>
-  <dgm:styleLbl name="fgAcc3">
-    <dgm:scene3d>
-      <a:camera prst="orthographicFront"/>
-      <a:lightRig rig="threePt" dir="t"/>
-    </dgm:scene3d>
-    <dgm:sp3d/>
-    <dgm:txPr/>
-    <dgm:style>
-      <a:lnRef idx="1">
-        <a:scrgbClr r="0" g="0" b="0"/>
-      </a:lnRef>
-      <a:fillRef idx="1">
-        <a:scrgbClr r="0" g="0" b="0"/>
-      </a:fillRef>
-      <a:effectRef idx="0">
-        <a:scrgbClr r="0" g="0" b="0"/>
-      </a:effectRef>
-      <a:fontRef idx="minor"/>
-    </dgm:style>
-  </dgm:styleLbl>
-  <dgm:styleLbl name="fgAcc4">
-    <dgm:scene3d>
-      <a:camera prst="orthographicFront"/>
-      <a:lightRig rig="threePt" dir="t"/>
-    </dgm:scene3d>
-    <dgm:sp3d/>
-    <dgm:txPr/>
-    <dgm:style>
-      <a:lnRef idx="1">
-        <a:scrgbClr r="0" g="0" b="0"/>
-      </a:lnRef>
-      <a:fillRef idx="1">
-        <a:scrgbClr r="0" g="0" b="0"/>
-      </a:fillRef>
-      <a:effectRef idx="0">
-        <a:scrgbClr r="0" g="0" b="0"/>
-      </a:effectRef>
-      <a:fontRef idx="minor"/>
-    </dgm:style>
-  </dgm:styleLbl>
-  <dgm:styleLbl name="bgShp">
-    <dgm:scene3d>
-      <a:camera prst="orthographicFront"/>
-      <a:lightRig rig="threePt" dir="t"/>
-    </dgm:scene3d>
-    <dgm:sp3d/>
-    <dgm:txPr/>
-    <dgm:style>
-      <a:lnRef idx="0">
-        <a:scrgbClr r="0" g="0" b="0"/>
-      </a:lnRef>
-      <a:fillRef idx="1">
-        <a:scrgbClr r="0" g="0" b="0"/>
-      </a:fillRef>
-      <a:effectRef idx="2">
-        <a:scrgbClr r="0" g="0" b="0"/>
-      </a:effectRef>
-      <a:fontRef idx="minor"/>
-    </dgm:style>
-  </dgm:styleLbl>
-  <dgm:styleLbl name="dkBgShp">
-    <dgm:scene3d>
-      <a:camera prst="orthographicFront"/>
-      <a:lightRig rig="threePt" dir="t"/>
-    </dgm:scene3d>
-    <dgm:sp3d/>
-    <dgm:txPr/>
-    <dgm:style>
-      <a:lnRef idx="0">
-        <a:scrgbClr r="0" g="0" b="0"/>
-      </a:lnRef>
-      <a:fillRef idx="1">
-        <a:scrgbClr r="0" g="0" b="0"/>
-      </a:fillRef>
-      <a:effectRef idx="2">
-        <a:scrgbClr r="0" g="0" b="0"/>
-      </a:effectRef>
-      <a:fontRef idx="minor"/>
-    </dgm:style>
-  </dgm:styleLbl>
-  <dgm:styleLbl name="trBgShp">
-    <dgm:scene3d>
-      <a:camera prst="orthographicFront"/>
-      <a:lightRig rig="threePt" dir="t"/>
-    </dgm:scene3d>
-    <dgm:sp3d/>
-    <dgm:txPr/>
-    <dgm:style>
-      <a:lnRef idx="0">
-        <a:scrgbClr r="0" g="0" b="0"/>
-      </a:lnRef>
-      <a:fillRef idx="1">
-        <a:scrgbClr r="0" g="0" b="0"/>
-      </a:fillRef>
-      <a:effectRef idx="0">
-        <a:scrgbClr r="0" g="0" b="0"/>
-      </a:effectRef>
-      <a:fontRef idx="minor"/>
-    </dgm:style>
-  </dgm:styleLbl>
-  <dgm:styleLbl name="fgShp">
-    <dgm:scene3d>
-      <a:camera prst="orthographicFront"/>
-      <a:lightRig rig="threePt" dir="t"/>
-    </dgm:scene3d>
-    <dgm:sp3d/>
-    <dgm:txPr/>
-    <dgm:style>
-      <a:lnRef idx="0">
-        <a:scrgbClr r="0" g="0" b="0"/>
-      </a:lnRef>
-      <a:fillRef idx="3">
-        <a:scrgbClr r="0" g="0" b="0"/>
-      </a:fillRef>
-      <a:effectRef idx="2">
-        <a:scrgbClr r="0" g="0" b="0"/>
-      </a:effectRef>
-      <a:fontRef idx="minor"/>
-    </dgm:style>
-  </dgm:styleLbl>
-  <dgm:styleLbl name="revTx">
-    <dgm:scene3d>
-      <a:camera prst="orthographicFront"/>
-      <a:lightRig rig="threePt" dir="t"/>
-    </dgm:scene3d>
-    <dgm:sp3d/>
-    <dgm:txPr/>
-    <dgm:style>
-      <a:lnRef idx="0">
-        <a:scrgbClr r="0" g="0" b="0"/>
-      </a:lnRef>
-      <a:fillRef idx="0">
-        <a:scrgbClr r="0" g="0" b="0"/>
-      </a:fillRef>
-      <a:effectRef idx="0">
-        <a:scrgbClr r="0" g="0" b="0"/>
-      </a:effectRef>
-      <a:fontRef idx="minor"/>
-    </dgm:style>
-  </dgm:styleLbl>
-</dgm:styleDef>
-</file>
-
 <file path=ppt/notesMasters/notesMaster1.xml><?xml version="1.0" encoding="utf-8"?>
 <p:notesMaster xmlns:a="http://schemas.openxmlformats.org/drawingml/2006/main" xmlns:r="http://schemas.openxmlformats.org/officeDocument/2006/relationships" xmlns:p="http://schemas.openxmlformats.org/presentationml/2006/main">
   <p:cSld>
@@ -2849,7 +199,7 @@
             </a:lvl1pPr>
           </a:lstStyle>
           <a:p>
-            <a:fld id="{BAA6833F-DE2B-2C43-BDD6-207D762B9BFB}" type="datetimeFigureOut">
+            <a:fld id="{3C1622B7-790A-3A4C-9F2C-EB33E432ACCD}" type="datetimeFigureOut">
               <a:rPr lang="en-US" smtClean="0"/>
               <a:t>1/11/22</a:t>
             </a:fld>
@@ -3007,7 +357,7 @@
             </a:lvl1pPr>
           </a:lstStyle>
           <a:p>
-            <a:fld id="{CFEE75F3-92F0-424A-833D-D5BEF3F45FB8}" type="slidenum">
+            <a:fld id="{42E0F7BC-2996-FD4A-8F04-C7CBBFA54748}" type="slidenum">
               <a:rPr lang="en-US" smtClean="0"/>
               <a:t>‹#›</a:t>
             </a:fld>
@@ -3018,7 +368,7 @@
     </p:spTree>
     <p:extLst>
       <p:ext uri="{BB962C8B-B14F-4D97-AF65-F5344CB8AC3E}">
-        <p14:creationId xmlns:p14="http://schemas.microsoft.com/office/powerpoint/2010/main" val="3226014452"/>
+        <p14:creationId xmlns:p14="http://schemas.microsoft.com/office/powerpoint/2010/main" val="2975814239"/>
       </p:ext>
     </p:extLst>
   </p:cSld>
@@ -3192,7 +542,7 @@
     </p:spTree>
     <p:extLst>
       <p:ext uri="{BB962C8B-B14F-4D97-AF65-F5344CB8AC3E}">
-        <p14:creationId xmlns:p14="http://schemas.microsoft.com/office/powerpoint/2010/main" val="1208962937"/>
+        <p14:creationId xmlns:p14="http://schemas.microsoft.com/office/powerpoint/2010/main" val="3301340579"/>
       </p:ext>
     </p:extLst>
   </p:cSld>
@@ -3267,7 +617,7 @@
           <a:p>
             <a:fld id="{AA0A589D-B577-494C-AEB5-A5D4F1908003}" type="slidenum">
               <a:rPr lang="en-US" smtClean="0"/>
-              <a:t>3</a:t>
+              <a:t>5</a:t>
             </a:fld>
             <a:endParaRPr lang="en-US"/>
           </a:p>
@@ -3276,7 +626,7 @@
     </p:spTree>
     <p:extLst>
       <p:ext uri="{BB962C8B-B14F-4D97-AF65-F5344CB8AC3E}">
-        <p14:creationId xmlns:p14="http://schemas.microsoft.com/office/powerpoint/2010/main" val="771711444"/>
+        <p14:creationId xmlns:p14="http://schemas.microsoft.com/office/powerpoint/2010/main" val="1131766828"/>
       </p:ext>
     </p:extLst>
   </p:cSld>
@@ -3308,7 +658,7 @@
           <p:cNvPr id="2" name="Title 1">
             <a:extLst>
               <a:ext uri="{FF2B5EF4-FFF2-40B4-BE49-F238E27FC236}">
-                <a16:creationId xmlns:a16="http://schemas.microsoft.com/office/drawing/2014/main" id="{BD7B2A29-2DFF-284E-9081-DD677AAEF82B}"/>
+                <a16:creationId xmlns:a16="http://schemas.microsoft.com/office/drawing/2014/main" id="{39732B85-AFC9-7944-9651-7912E3BF763A}"/>
               </a:ext>
             </a:extLst>
           </p:cNvPr>
@@ -3345,7 +695,7 @@
           <p:cNvPr id="3" name="Subtitle 2">
             <a:extLst>
               <a:ext uri="{FF2B5EF4-FFF2-40B4-BE49-F238E27FC236}">
-                <a16:creationId xmlns:a16="http://schemas.microsoft.com/office/drawing/2014/main" id="{BFB4C9EB-AC5E-F043-952E-F13FD7FC3074}"/>
+                <a16:creationId xmlns:a16="http://schemas.microsoft.com/office/drawing/2014/main" id="{FF9008D3-F878-A748-902C-7B59DFE37CD6}"/>
               </a:ext>
             </a:extLst>
           </p:cNvPr>
@@ -3415,7 +765,7 @@
           <p:cNvPr id="4" name="Date Placeholder 3">
             <a:extLst>
               <a:ext uri="{FF2B5EF4-FFF2-40B4-BE49-F238E27FC236}">
-                <a16:creationId xmlns:a16="http://schemas.microsoft.com/office/drawing/2014/main" id="{77E57FBF-4E9B-DE40-864E-282DEBC37AC8}"/>
+                <a16:creationId xmlns:a16="http://schemas.microsoft.com/office/drawing/2014/main" id="{5DA3BF96-6E12-E243-AB79-F6A77286356B}"/>
               </a:ext>
             </a:extLst>
           </p:cNvPr>
@@ -3431,7 +781,7 @@
           <a:bodyPr/>
           <a:lstStyle/>
           <a:p>
-            <a:fld id="{FA5EFB8A-D34C-5C4C-AEE0-50383CAE7DE1}" type="datetimeFigureOut">
+            <a:fld id="{71CD3EC6-36DF-1A41-B975-C54B8BE0B25A}" type="datetimeFigureOut">
               <a:rPr lang="en-US" smtClean="0"/>
               <a:t>1/11/22</a:t>
             </a:fld>
@@ -3444,7 +794,7 @@
           <p:cNvPr id="5" name="Footer Placeholder 4">
             <a:extLst>
               <a:ext uri="{FF2B5EF4-FFF2-40B4-BE49-F238E27FC236}">
-                <a16:creationId xmlns:a16="http://schemas.microsoft.com/office/drawing/2014/main" id="{39BC12E1-FFF8-AA4C-BA1A-0E8AEC01F4F6}"/>
+                <a16:creationId xmlns:a16="http://schemas.microsoft.com/office/drawing/2014/main" id="{BD7824D4-C1A7-B749-ADE3-6CA46EAFBEE6}"/>
               </a:ext>
             </a:extLst>
           </p:cNvPr>
@@ -3469,7 +819,7 @@
           <p:cNvPr id="6" name="Slide Number Placeholder 5">
             <a:extLst>
               <a:ext uri="{FF2B5EF4-FFF2-40B4-BE49-F238E27FC236}">
-                <a16:creationId xmlns:a16="http://schemas.microsoft.com/office/drawing/2014/main" id="{9E45DE6C-B1F4-9742-8BC9-40CEADD41EE6}"/>
+                <a16:creationId xmlns:a16="http://schemas.microsoft.com/office/drawing/2014/main" id="{4D4BB09D-4883-F44F-9984-28DDE184A60D}"/>
               </a:ext>
             </a:extLst>
           </p:cNvPr>
@@ -3485,7 +835,7 @@
           <a:bodyPr/>
           <a:lstStyle/>
           <a:p>
-            <a:fld id="{C3D42199-6FFF-4641-805E-C920AB637C03}" type="slidenum">
+            <a:fld id="{FCCC9029-544E-0E44-B93B-AA58A7064529}" type="slidenum">
               <a:rPr lang="en-US" smtClean="0"/>
               <a:t>‹#›</a:t>
             </a:fld>
@@ -3496,7 +846,7 @@
     </p:spTree>
     <p:extLst>
       <p:ext uri="{BB962C8B-B14F-4D97-AF65-F5344CB8AC3E}">
-        <p14:creationId xmlns:p14="http://schemas.microsoft.com/office/powerpoint/2010/main" val="1251519614"/>
+        <p14:creationId xmlns:p14="http://schemas.microsoft.com/office/powerpoint/2010/main" val="2262663974"/>
       </p:ext>
     </p:extLst>
   </p:cSld>
@@ -3528,7 +878,7 @@
           <p:cNvPr id="2" name="Title 1">
             <a:extLst>
               <a:ext uri="{FF2B5EF4-FFF2-40B4-BE49-F238E27FC236}">
-                <a16:creationId xmlns:a16="http://schemas.microsoft.com/office/drawing/2014/main" id="{4FFC4772-7DBC-B74B-95AF-D9433E486643}"/>
+                <a16:creationId xmlns:a16="http://schemas.microsoft.com/office/drawing/2014/main" id="{FB82F804-AA18-EE4D-A583-03A3FB41E306}"/>
               </a:ext>
             </a:extLst>
           </p:cNvPr>
@@ -3556,7 +906,7 @@
           <p:cNvPr id="3" name="Vertical Text Placeholder 2">
             <a:extLst>
               <a:ext uri="{FF2B5EF4-FFF2-40B4-BE49-F238E27FC236}">
-                <a16:creationId xmlns:a16="http://schemas.microsoft.com/office/drawing/2014/main" id="{FD88FF87-72D6-044B-ACBE-4A307BB90D9C}"/>
+                <a16:creationId xmlns:a16="http://schemas.microsoft.com/office/drawing/2014/main" id="{D5B221E4-0D31-D64F-A1E2-E67EE68AB570}"/>
               </a:ext>
             </a:extLst>
           </p:cNvPr>
@@ -3613,7 +963,7 @@
           <p:cNvPr id="4" name="Date Placeholder 3">
             <a:extLst>
               <a:ext uri="{FF2B5EF4-FFF2-40B4-BE49-F238E27FC236}">
-                <a16:creationId xmlns:a16="http://schemas.microsoft.com/office/drawing/2014/main" id="{26A0C076-562E-C946-9EA0-BD8180869809}"/>
+                <a16:creationId xmlns:a16="http://schemas.microsoft.com/office/drawing/2014/main" id="{C64C9D93-9B56-6946-B0AC-968B9A4778F9}"/>
               </a:ext>
             </a:extLst>
           </p:cNvPr>
@@ -3629,7 +979,7 @@
           <a:bodyPr/>
           <a:lstStyle/>
           <a:p>
-            <a:fld id="{FA5EFB8A-D34C-5C4C-AEE0-50383CAE7DE1}" type="datetimeFigureOut">
+            <a:fld id="{71CD3EC6-36DF-1A41-B975-C54B8BE0B25A}" type="datetimeFigureOut">
               <a:rPr lang="en-US" smtClean="0"/>
               <a:t>1/11/22</a:t>
             </a:fld>
@@ -3642,7 +992,7 @@
           <p:cNvPr id="5" name="Footer Placeholder 4">
             <a:extLst>
               <a:ext uri="{FF2B5EF4-FFF2-40B4-BE49-F238E27FC236}">
-                <a16:creationId xmlns:a16="http://schemas.microsoft.com/office/drawing/2014/main" id="{6CF7DF31-7408-D246-8932-48B829C35433}"/>
+                <a16:creationId xmlns:a16="http://schemas.microsoft.com/office/drawing/2014/main" id="{F0EADE13-D772-F144-BC1A-DBA2A53CED23}"/>
               </a:ext>
             </a:extLst>
           </p:cNvPr>
@@ -3667,7 +1017,7 @@
           <p:cNvPr id="6" name="Slide Number Placeholder 5">
             <a:extLst>
               <a:ext uri="{FF2B5EF4-FFF2-40B4-BE49-F238E27FC236}">
-                <a16:creationId xmlns:a16="http://schemas.microsoft.com/office/drawing/2014/main" id="{19B29509-4EBF-784E-A91C-BBEF369F73EC}"/>
+                <a16:creationId xmlns:a16="http://schemas.microsoft.com/office/drawing/2014/main" id="{2581B1C0-00D7-B64B-BC91-E7068141FCFD}"/>
               </a:ext>
             </a:extLst>
           </p:cNvPr>
@@ -3683,7 +1033,7 @@
           <a:bodyPr/>
           <a:lstStyle/>
           <a:p>
-            <a:fld id="{C3D42199-6FFF-4641-805E-C920AB637C03}" type="slidenum">
+            <a:fld id="{FCCC9029-544E-0E44-B93B-AA58A7064529}" type="slidenum">
               <a:rPr lang="en-US" smtClean="0"/>
               <a:t>‹#›</a:t>
             </a:fld>
@@ -3694,7 +1044,7 @@
     </p:spTree>
     <p:extLst>
       <p:ext uri="{BB962C8B-B14F-4D97-AF65-F5344CB8AC3E}">
-        <p14:creationId xmlns:p14="http://schemas.microsoft.com/office/powerpoint/2010/main" val="2838835598"/>
+        <p14:creationId xmlns:p14="http://schemas.microsoft.com/office/powerpoint/2010/main" val="1604764252"/>
       </p:ext>
     </p:extLst>
   </p:cSld>
@@ -3726,7 +1076,7 @@
           <p:cNvPr id="2" name="Vertical Title 1">
             <a:extLst>
               <a:ext uri="{FF2B5EF4-FFF2-40B4-BE49-F238E27FC236}">
-                <a16:creationId xmlns:a16="http://schemas.microsoft.com/office/drawing/2014/main" id="{C9E84E61-BD96-9D45-BE4F-DC025B4242F4}"/>
+                <a16:creationId xmlns:a16="http://schemas.microsoft.com/office/drawing/2014/main" id="{7EC3FD8C-E3A7-EB41-9020-A7A6A8D89357}"/>
               </a:ext>
             </a:extLst>
           </p:cNvPr>
@@ -3759,7 +1109,7 @@
           <p:cNvPr id="3" name="Vertical Text Placeholder 2">
             <a:extLst>
               <a:ext uri="{FF2B5EF4-FFF2-40B4-BE49-F238E27FC236}">
-                <a16:creationId xmlns:a16="http://schemas.microsoft.com/office/drawing/2014/main" id="{F8BB1047-6E43-DF43-8EC8-2E1496202C80}"/>
+                <a16:creationId xmlns:a16="http://schemas.microsoft.com/office/drawing/2014/main" id="{0B51ADEE-9B67-CD41-A82D-6BE0C481E42A}"/>
               </a:ext>
             </a:extLst>
           </p:cNvPr>
@@ -3821,7 +1171,7 @@
           <p:cNvPr id="4" name="Date Placeholder 3">
             <a:extLst>
               <a:ext uri="{FF2B5EF4-FFF2-40B4-BE49-F238E27FC236}">
-                <a16:creationId xmlns:a16="http://schemas.microsoft.com/office/drawing/2014/main" id="{765A6E3A-C92E-174A-93BF-D1F61C89BA62}"/>
+                <a16:creationId xmlns:a16="http://schemas.microsoft.com/office/drawing/2014/main" id="{6F07DE6C-C412-F744-8F42-E49B5E91A1B0}"/>
               </a:ext>
             </a:extLst>
           </p:cNvPr>
@@ -3837,7 +1187,7 @@
           <a:bodyPr/>
           <a:lstStyle/>
           <a:p>
-            <a:fld id="{FA5EFB8A-D34C-5C4C-AEE0-50383CAE7DE1}" type="datetimeFigureOut">
+            <a:fld id="{71CD3EC6-36DF-1A41-B975-C54B8BE0B25A}" type="datetimeFigureOut">
               <a:rPr lang="en-US" smtClean="0"/>
               <a:t>1/11/22</a:t>
             </a:fld>
@@ -3850,7 +1200,7 @@
           <p:cNvPr id="5" name="Footer Placeholder 4">
             <a:extLst>
               <a:ext uri="{FF2B5EF4-FFF2-40B4-BE49-F238E27FC236}">
-                <a16:creationId xmlns:a16="http://schemas.microsoft.com/office/drawing/2014/main" id="{42C7F0A5-E2E3-4644-863B-DB51BF9B8F91}"/>
+                <a16:creationId xmlns:a16="http://schemas.microsoft.com/office/drawing/2014/main" id="{F086241F-DC7F-D24F-849D-4D670377E850}"/>
               </a:ext>
             </a:extLst>
           </p:cNvPr>
@@ -3875,7 +1225,7 @@
           <p:cNvPr id="6" name="Slide Number Placeholder 5">
             <a:extLst>
               <a:ext uri="{FF2B5EF4-FFF2-40B4-BE49-F238E27FC236}">
-                <a16:creationId xmlns:a16="http://schemas.microsoft.com/office/drawing/2014/main" id="{A954C00F-ED69-8F44-8BC5-43BB0083CA8A}"/>
+                <a16:creationId xmlns:a16="http://schemas.microsoft.com/office/drawing/2014/main" id="{E794A048-F332-5740-AEE2-BD815B45A873}"/>
               </a:ext>
             </a:extLst>
           </p:cNvPr>
@@ -3891,7 +1241,7 @@
           <a:bodyPr/>
           <a:lstStyle/>
           <a:p>
-            <a:fld id="{C3D42199-6FFF-4641-805E-C920AB637C03}" type="slidenum">
+            <a:fld id="{FCCC9029-544E-0E44-B93B-AA58A7064529}" type="slidenum">
               <a:rPr lang="en-US" smtClean="0"/>
               <a:t>‹#›</a:t>
             </a:fld>
@@ -3902,7 +1252,7 @@
     </p:spTree>
     <p:extLst>
       <p:ext uri="{BB962C8B-B14F-4D97-AF65-F5344CB8AC3E}">
-        <p14:creationId xmlns:p14="http://schemas.microsoft.com/office/powerpoint/2010/main" val="602837471"/>
+        <p14:creationId xmlns:p14="http://schemas.microsoft.com/office/powerpoint/2010/main" val="3999068600"/>
       </p:ext>
     </p:extLst>
   </p:cSld>
@@ -3934,7 +1284,7 @@
           <p:cNvPr id="2" name="Title 1">
             <a:extLst>
               <a:ext uri="{FF2B5EF4-FFF2-40B4-BE49-F238E27FC236}">
-                <a16:creationId xmlns:a16="http://schemas.microsoft.com/office/drawing/2014/main" id="{DABF3DE5-00AC-8445-A1C7-1C4782F5FFAC}"/>
+                <a16:creationId xmlns:a16="http://schemas.microsoft.com/office/drawing/2014/main" id="{79D17434-B49C-A246-9D07-AF51DE22F57A}"/>
               </a:ext>
             </a:extLst>
           </p:cNvPr>
@@ -3962,7 +1312,7 @@
           <p:cNvPr id="3" name="Content Placeholder 2">
             <a:extLst>
               <a:ext uri="{FF2B5EF4-FFF2-40B4-BE49-F238E27FC236}">
-                <a16:creationId xmlns:a16="http://schemas.microsoft.com/office/drawing/2014/main" id="{52D35CF1-A4E2-0D44-8B79-EFA4CC8CCDC8}"/>
+                <a16:creationId xmlns:a16="http://schemas.microsoft.com/office/drawing/2014/main" id="{29095B05-EFF3-714F-B474-6E78E9EE66A5}"/>
               </a:ext>
             </a:extLst>
           </p:cNvPr>
@@ -4019,7 +1369,7 @@
           <p:cNvPr id="4" name="Date Placeholder 3">
             <a:extLst>
               <a:ext uri="{FF2B5EF4-FFF2-40B4-BE49-F238E27FC236}">
-                <a16:creationId xmlns:a16="http://schemas.microsoft.com/office/drawing/2014/main" id="{5EE174AA-E1AB-DE43-9620-AB27A4A2E7D3}"/>
+                <a16:creationId xmlns:a16="http://schemas.microsoft.com/office/drawing/2014/main" id="{BC3E7C40-392A-804A-BF12-CD4FC32C0892}"/>
               </a:ext>
             </a:extLst>
           </p:cNvPr>
@@ -4035,7 +1385,7 @@
           <a:bodyPr/>
           <a:lstStyle/>
           <a:p>
-            <a:fld id="{FA5EFB8A-D34C-5C4C-AEE0-50383CAE7DE1}" type="datetimeFigureOut">
+            <a:fld id="{71CD3EC6-36DF-1A41-B975-C54B8BE0B25A}" type="datetimeFigureOut">
               <a:rPr lang="en-US" smtClean="0"/>
               <a:t>1/11/22</a:t>
             </a:fld>
@@ -4048,7 +1398,7 @@
           <p:cNvPr id="5" name="Footer Placeholder 4">
             <a:extLst>
               <a:ext uri="{FF2B5EF4-FFF2-40B4-BE49-F238E27FC236}">
-                <a16:creationId xmlns:a16="http://schemas.microsoft.com/office/drawing/2014/main" id="{A475E1ED-9923-5D42-B7A6-998E0D0F9798}"/>
+                <a16:creationId xmlns:a16="http://schemas.microsoft.com/office/drawing/2014/main" id="{0DBE4972-C159-E448-B745-C53DE3E7B276}"/>
               </a:ext>
             </a:extLst>
           </p:cNvPr>
@@ -4073,7 +1423,7 @@
           <p:cNvPr id="6" name="Slide Number Placeholder 5">
             <a:extLst>
               <a:ext uri="{FF2B5EF4-FFF2-40B4-BE49-F238E27FC236}">
-                <a16:creationId xmlns:a16="http://schemas.microsoft.com/office/drawing/2014/main" id="{8429B3CF-762F-5E4A-8C59-AD73E8652C69}"/>
+                <a16:creationId xmlns:a16="http://schemas.microsoft.com/office/drawing/2014/main" id="{31333C97-D0D4-C64A-BDAC-7D49770FD65B}"/>
               </a:ext>
             </a:extLst>
           </p:cNvPr>
@@ -4089,7 +1439,7 @@
           <a:bodyPr/>
           <a:lstStyle/>
           <a:p>
-            <a:fld id="{C3D42199-6FFF-4641-805E-C920AB637C03}" type="slidenum">
+            <a:fld id="{FCCC9029-544E-0E44-B93B-AA58A7064529}" type="slidenum">
               <a:rPr lang="en-US" smtClean="0"/>
               <a:t>‹#›</a:t>
             </a:fld>
@@ -4100,7 +1450,7 @@
     </p:spTree>
     <p:extLst>
       <p:ext uri="{BB962C8B-B14F-4D97-AF65-F5344CB8AC3E}">
-        <p14:creationId xmlns:p14="http://schemas.microsoft.com/office/powerpoint/2010/main" val="1272742805"/>
+        <p14:creationId xmlns:p14="http://schemas.microsoft.com/office/powerpoint/2010/main" val="2475219485"/>
       </p:ext>
     </p:extLst>
   </p:cSld>
@@ -4132,7 +1482,7 @@
           <p:cNvPr id="2" name="Title 1">
             <a:extLst>
               <a:ext uri="{FF2B5EF4-FFF2-40B4-BE49-F238E27FC236}">
-                <a16:creationId xmlns:a16="http://schemas.microsoft.com/office/drawing/2014/main" id="{852E591C-FB4E-0F4B-97E2-C2511CC38CA4}"/>
+                <a16:creationId xmlns:a16="http://schemas.microsoft.com/office/drawing/2014/main" id="{D1F3CF9A-9AB7-0646-AEB1-A9FB0E4F198E}"/>
               </a:ext>
             </a:extLst>
           </p:cNvPr>
@@ -4169,7 +1519,7 @@
           <p:cNvPr id="3" name="Text Placeholder 2">
             <a:extLst>
               <a:ext uri="{FF2B5EF4-FFF2-40B4-BE49-F238E27FC236}">
-                <a16:creationId xmlns:a16="http://schemas.microsoft.com/office/drawing/2014/main" id="{6A8969CB-CC68-9749-9A8C-A1361DD1EC28}"/>
+                <a16:creationId xmlns:a16="http://schemas.microsoft.com/office/drawing/2014/main" id="{B077D163-2B53-6C4C-B858-E29A250E8965}"/>
               </a:ext>
             </a:extLst>
           </p:cNvPr>
@@ -4294,7 +1644,7 @@
           <p:cNvPr id="4" name="Date Placeholder 3">
             <a:extLst>
               <a:ext uri="{FF2B5EF4-FFF2-40B4-BE49-F238E27FC236}">
-                <a16:creationId xmlns:a16="http://schemas.microsoft.com/office/drawing/2014/main" id="{53A1EF8C-87F3-FF42-AF47-A080E438C0EC}"/>
+                <a16:creationId xmlns:a16="http://schemas.microsoft.com/office/drawing/2014/main" id="{7B7F613A-6074-C144-8D3B-BF1ABC5A0CE3}"/>
               </a:ext>
             </a:extLst>
           </p:cNvPr>
@@ -4310,7 +1660,7 @@
           <a:bodyPr/>
           <a:lstStyle/>
           <a:p>
-            <a:fld id="{FA5EFB8A-D34C-5C4C-AEE0-50383CAE7DE1}" type="datetimeFigureOut">
+            <a:fld id="{71CD3EC6-36DF-1A41-B975-C54B8BE0B25A}" type="datetimeFigureOut">
               <a:rPr lang="en-US" smtClean="0"/>
               <a:t>1/11/22</a:t>
             </a:fld>
@@ -4323,7 +1673,7 @@
           <p:cNvPr id="5" name="Footer Placeholder 4">
             <a:extLst>
               <a:ext uri="{FF2B5EF4-FFF2-40B4-BE49-F238E27FC236}">
-                <a16:creationId xmlns:a16="http://schemas.microsoft.com/office/drawing/2014/main" id="{7BDA1A90-A780-3441-A6C9-9E9C46205514}"/>
+                <a16:creationId xmlns:a16="http://schemas.microsoft.com/office/drawing/2014/main" id="{0154D973-1D84-C549-9B21-5BFC191ADFB0}"/>
               </a:ext>
             </a:extLst>
           </p:cNvPr>
@@ -4348,7 +1698,7 @@
           <p:cNvPr id="6" name="Slide Number Placeholder 5">
             <a:extLst>
               <a:ext uri="{FF2B5EF4-FFF2-40B4-BE49-F238E27FC236}">
-                <a16:creationId xmlns:a16="http://schemas.microsoft.com/office/drawing/2014/main" id="{ECB1175B-F64A-B945-B61F-6C7CB837176E}"/>
+                <a16:creationId xmlns:a16="http://schemas.microsoft.com/office/drawing/2014/main" id="{B59C6A90-FEA3-594A-9773-A5CF0EE00BE8}"/>
               </a:ext>
             </a:extLst>
           </p:cNvPr>
@@ -4364,7 +1714,7 @@
           <a:bodyPr/>
           <a:lstStyle/>
           <a:p>
-            <a:fld id="{C3D42199-6FFF-4641-805E-C920AB637C03}" type="slidenum">
+            <a:fld id="{FCCC9029-544E-0E44-B93B-AA58A7064529}" type="slidenum">
               <a:rPr lang="en-US" smtClean="0"/>
               <a:t>‹#›</a:t>
             </a:fld>
@@ -4375,7 +1725,7 @@
     </p:spTree>
     <p:extLst>
       <p:ext uri="{BB962C8B-B14F-4D97-AF65-F5344CB8AC3E}">
-        <p14:creationId xmlns:p14="http://schemas.microsoft.com/office/powerpoint/2010/main" val="2618787271"/>
+        <p14:creationId xmlns:p14="http://schemas.microsoft.com/office/powerpoint/2010/main" val="154135064"/>
       </p:ext>
     </p:extLst>
   </p:cSld>
@@ -4407,7 +1757,7 @@
           <p:cNvPr id="2" name="Title 1">
             <a:extLst>
               <a:ext uri="{FF2B5EF4-FFF2-40B4-BE49-F238E27FC236}">
-                <a16:creationId xmlns:a16="http://schemas.microsoft.com/office/drawing/2014/main" id="{7C8DC383-4626-884A-B511-B70775DA861E}"/>
+                <a16:creationId xmlns:a16="http://schemas.microsoft.com/office/drawing/2014/main" id="{940B57BA-2197-6643-AD9A-F966D81248F8}"/>
               </a:ext>
             </a:extLst>
           </p:cNvPr>
@@ -4435,7 +1785,7 @@
           <p:cNvPr id="3" name="Content Placeholder 2">
             <a:extLst>
               <a:ext uri="{FF2B5EF4-FFF2-40B4-BE49-F238E27FC236}">
-                <a16:creationId xmlns:a16="http://schemas.microsoft.com/office/drawing/2014/main" id="{52612D5A-4E32-AB4F-89B6-3E30D97C9EB0}"/>
+                <a16:creationId xmlns:a16="http://schemas.microsoft.com/office/drawing/2014/main" id="{3A550946-8DD8-5744-9E43-337EBF8996E2}"/>
               </a:ext>
             </a:extLst>
           </p:cNvPr>
@@ -4497,7 +1847,7 @@
           <p:cNvPr id="4" name="Content Placeholder 3">
             <a:extLst>
               <a:ext uri="{FF2B5EF4-FFF2-40B4-BE49-F238E27FC236}">
-                <a16:creationId xmlns:a16="http://schemas.microsoft.com/office/drawing/2014/main" id="{3DDFDDCB-C085-B64E-AAED-1A8DE0D25423}"/>
+                <a16:creationId xmlns:a16="http://schemas.microsoft.com/office/drawing/2014/main" id="{72646175-6AF0-9F4E-9836-7B44E4B51691}"/>
               </a:ext>
             </a:extLst>
           </p:cNvPr>
@@ -4559,7 +1909,7 @@
           <p:cNvPr id="5" name="Date Placeholder 4">
             <a:extLst>
               <a:ext uri="{FF2B5EF4-FFF2-40B4-BE49-F238E27FC236}">
-                <a16:creationId xmlns:a16="http://schemas.microsoft.com/office/drawing/2014/main" id="{86899A12-1E85-2045-B8BE-65D2930FFE92}"/>
+                <a16:creationId xmlns:a16="http://schemas.microsoft.com/office/drawing/2014/main" id="{066BDF7A-9C46-5948-9487-B50A4E72B420}"/>
               </a:ext>
             </a:extLst>
           </p:cNvPr>
@@ -4575,7 +1925,7 @@
           <a:bodyPr/>
           <a:lstStyle/>
           <a:p>
-            <a:fld id="{FA5EFB8A-D34C-5C4C-AEE0-50383CAE7DE1}" type="datetimeFigureOut">
+            <a:fld id="{71CD3EC6-36DF-1A41-B975-C54B8BE0B25A}" type="datetimeFigureOut">
               <a:rPr lang="en-US" smtClean="0"/>
               <a:t>1/11/22</a:t>
             </a:fld>
@@ -4588,7 +1938,7 @@
           <p:cNvPr id="6" name="Footer Placeholder 5">
             <a:extLst>
               <a:ext uri="{FF2B5EF4-FFF2-40B4-BE49-F238E27FC236}">
-                <a16:creationId xmlns:a16="http://schemas.microsoft.com/office/drawing/2014/main" id="{EBF53959-0F50-5D4C-A42E-75FAA3E5F7EB}"/>
+                <a16:creationId xmlns:a16="http://schemas.microsoft.com/office/drawing/2014/main" id="{CAD590DB-78C3-A346-85E1-6FD623F82949}"/>
               </a:ext>
             </a:extLst>
           </p:cNvPr>
@@ -4613,7 +1963,7 @@
           <p:cNvPr id="7" name="Slide Number Placeholder 6">
             <a:extLst>
               <a:ext uri="{FF2B5EF4-FFF2-40B4-BE49-F238E27FC236}">
-                <a16:creationId xmlns:a16="http://schemas.microsoft.com/office/drawing/2014/main" id="{9672CD1A-E904-534C-BB70-0629A7EFED3C}"/>
+                <a16:creationId xmlns:a16="http://schemas.microsoft.com/office/drawing/2014/main" id="{C7E684A6-75A2-F24C-991C-D8EBEA75F224}"/>
               </a:ext>
             </a:extLst>
           </p:cNvPr>
@@ -4629,7 +1979,7 @@
           <a:bodyPr/>
           <a:lstStyle/>
           <a:p>
-            <a:fld id="{C3D42199-6FFF-4641-805E-C920AB637C03}" type="slidenum">
+            <a:fld id="{FCCC9029-544E-0E44-B93B-AA58A7064529}" type="slidenum">
               <a:rPr lang="en-US" smtClean="0"/>
               <a:t>‹#›</a:t>
             </a:fld>
@@ -4640,7 +1990,7 @@
     </p:spTree>
     <p:extLst>
       <p:ext uri="{BB962C8B-B14F-4D97-AF65-F5344CB8AC3E}">
-        <p14:creationId xmlns:p14="http://schemas.microsoft.com/office/powerpoint/2010/main" val="4142322519"/>
+        <p14:creationId xmlns:p14="http://schemas.microsoft.com/office/powerpoint/2010/main" val="891917717"/>
       </p:ext>
     </p:extLst>
   </p:cSld>
@@ -4672,7 +2022,7 @@
           <p:cNvPr id="2" name="Title 1">
             <a:extLst>
               <a:ext uri="{FF2B5EF4-FFF2-40B4-BE49-F238E27FC236}">
-                <a16:creationId xmlns:a16="http://schemas.microsoft.com/office/drawing/2014/main" id="{5A92ECB2-C554-9E4E-A79B-0E524184FDCB}"/>
+                <a16:creationId xmlns:a16="http://schemas.microsoft.com/office/drawing/2014/main" id="{8980DC9A-3BCB-AB4A-A3D3-18E53C31E0C4}"/>
               </a:ext>
             </a:extLst>
           </p:cNvPr>
@@ -4705,7 +2055,7 @@
           <p:cNvPr id="3" name="Text Placeholder 2">
             <a:extLst>
               <a:ext uri="{FF2B5EF4-FFF2-40B4-BE49-F238E27FC236}">
-                <a16:creationId xmlns:a16="http://schemas.microsoft.com/office/drawing/2014/main" id="{90A2A80F-1D0C-A740-AFD6-100AD0D42DF2}"/>
+                <a16:creationId xmlns:a16="http://schemas.microsoft.com/office/drawing/2014/main" id="{12074844-94C5-4A4F-A0FB-66880EA60E61}"/>
               </a:ext>
             </a:extLst>
           </p:cNvPr>
@@ -4776,7 +2126,7 @@
           <p:cNvPr id="4" name="Content Placeholder 3">
             <a:extLst>
               <a:ext uri="{FF2B5EF4-FFF2-40B4-BE49-F238E27FC236}">
-                <a16:creationId xmlns:a16="http://schemas.microsoft.com/office/drawing/2014/main" id="{4B886663-7AC0-044B-8E5F-51DFBEAD6044}"/>
+                <a16:creationId xmlns:a16="http://schemas.microsoft.com/office/drawing/2014/main" id="{2458D5A2-82EF-1D41-91C5-F8FA107299C2}"/>
               </a:ext>
             </a:extLst>
           </p:cNvPr>
@@ -4838,7 +2188,7 @@
           <p:cNvPr id="5" name="Text Placeholder 4">
             <a:extLst>
               <a:ext uri="{FF2B5EF4-FFF2-40B4-BE49-F238E27FC236}">
-                <a16:creationId xmlns:a16="http://schemas.microsoft.com/office/drawing/2014/main" id="{60B207FD-BC04-9C4F-9401-663C40C36BF2}"/>
+                <a16:creationId xmlns:a16="http://schemas.microsoft.com/office/drawing/2014/main" id="{871CA3DF-CC3D-F248-A557-1175C0898FE5}"/>
               </a:ext>
             </a:extLst>
           </p:cNvPr>
@@ -4909,7 +2259,7 @@
           <p:cNvPr id="6" name="Content Placeholder 5">
             <a:extLst>
               <a:ext uri="{FF2B5EF4-FFF2-40B4-BE49-F238E27FC236}">
-                <a16:creationId xmlns:a16="http://schemas.microsoft.com/office/drawing/2014/main" id="{EA0CF976-508A-E24C-BEAC-C5E01AA808AA}"/>
+                <a16:creationId xmlns:a16="http://schemas.microsoft.com/office/drawing/2014/main" id="{98D3EF3A-5786-FB47-ACD5-AA800A943770}"/>
               </a:ext>
             </a:extLst>
           </p:cNvPr>
@@ -4971,7 +2321,7 @@
           <p:cNvPr id="7" name="Date Placeholder 6">
             <a:extLst>
               <a:ext uri="{FF2B5EF4-FFF2-40B4-BE49-F238E27FC236}">
-                <a16:creationId xmlns:a16="http://schemas.microsoft.com/office/drawing/2014/main" id="{B4DF014A-0063-F348-A2C7-9493A1B7422C}"/>
+                <a16:creationId xmlns:a16="http://schemas.microsoft.com/office/drawing/2014/main" id="{9AF75FEC-0600-8646-835C-22EEB467621C}"/>
               </a:ext>
             </a:extLst>
           </p:cNvPr>
@@ -4987,7 +2337,7 @@
           <a:bodyPr/>
           <a:lstStyle/>
           <a:p>
-            <a:fld id="{FA5EFB8A-D34C-5C4C-AEE0-50383CAE7DE1}" type="datetimeFigureOut">
+            <a:fld id="{71CD3EC6-36DF-1A41-B975-C54B8BE0B25A}" type="datetimeFigureOut">
               <a:rPr lang="en-US" smtClean="0"/>
               <a:t>1/11/22</a:t>
             </a:fld>
@@ -5000,7 +2350,7 @@
           <p:cNvPr id="8" name="Footer Placeholder 7">
             <a:extLst>
               <a:ext uri="{FF2B5EF4-FFF2-40B4-BE49-F238E27FC236}">
-                <a16:creationId xmlns:a16="http://schemas.microsoft.com/office/drawing/2014/main" id="{4DDF1CDA-1CE0-E94F-9CDB-12791FD6133A}"/>
+                <a16:creationId xmlns:a16="http://schemas.microsoft.com/office/drawing/2014/main" id="{02939E39-F130-644A-AA09-781F1E2B5C33}"/>
               </a:ext>
             </a:extLst>
           </p:cNvPr>
@@ -5025,7 +2375,7 @@
           <p:cNvPr id="9" name="Slide Number Placeholder 8">
             <a:extLst>
               <a:ext uri="{FF2B5EF4-FFF2-40B4-BE49-F238E27FC236}">
-                <a16:creationId xmlns:a16="http://schemas.microsoft.com/office/drawing/2014/main" id="{4E7D6694-B9B8-A243-B4C3-85D589457850}"/>
+                <a16:creationId xmlns:a16="http://schemas.microsoft.com/office/drawing/2014/main" id="{697F3CED-BA47-8C4F-B053-B7DA4C85E7CC}"/>
               </a:ext>
             </a:extLst>
           </p:cNvPr>
@@ -5041,7 +2391,7 @@
           <a:bodyPr/>
           <a:lstStyle/>
           <a:p>
-            <a:fld id="{C3D42199-6FFF-4641-805E-C920AB637C03}" type="slidenum">
+            <a:fld id="{FCCC9029-544E-0E44-B93B-AA58A7064529}" type="slidenum">
               <a:rPr lang="en-US" smtClean="0"/>
               <a:t>‹#›</a:t>
             </a:fld>
@@ -5052,7 +2402,7 @@
     </p:spTree>
     <p:extLst>
       <p:ext uri="{BB962C8B-B14F-4D97-AF65-F5344CB8AC3E}">
-        <p14:creationId xmlns:p14="http://schemas.microsoft.com/office/powerpoint/2010/main" val="4188985662"/>
+        <p14:creationId xmlns:p14="http://schemas.microsoft.com/office/powerpoint/2010/main" val="671049058"/>
       </p:ext>
     </p:extLst>
   </p:cSld>
@@ -5084,7 +2434,7 @@
           <p:cNvPr id="2" name="Title 1">
             <a:extLst>
               <a:ext uri="{FF2B5EF4-FFF2-40B4-BE49-F238E27FC236}">
-                <a16:creationId xmlns:a16="http://schemas.microsoft.com/office/drawing/2014/main" id="{7E6B5A2F-F356-FF47-B6C8-B9B1C8B6FF1D}"/>
+                <a16:creationId xmlns:a16="http://schemas.microsoft.com/office/drawing/2014/main" id="{0EF92F01-9558-6541-B599-17D9537EC015}"/>
               </a:ext>
             </a:extLst>
           </p:cNvPr>
@@ -5112,7 +2462,7 @@
           <p:cNvPr id="3" name="Date Placeholder 2">
             <a:extLst>
               <a:ext uri="{FF2B5EF4-FFF2-40B4-BE49-F238E27FC236}">
-                <a16:creationId xmlns:a16="http://schemas.microsoft.com/office/drawing/2014/main" id="{C206BB49-4122-8343-A784-491CD4BC4AEA}"/>
+                <a16:creationId xmlns:a16="http://schemas.microsoft.com/office/drawing/2014/main" id="{791B421C-75A0-B347-9BF0-35D12CEAB461}"/>
               </a:ext>
             </a:extLst>
           </p:cNvPr>
@@ -5128,7 +2478,7 @@
           <a:bodyPr/>
           <a:lstStyle/>
           <a:p>
-            <a:fld id="{FA5EFB8A-D34C-5C4C-AEE0-50383CAE7DE1}" type="datetimeFigureOut">
+            <a:fld id="{71CD3EC6-36DF-1A41-B975-C54B8BE0B25A}" type="datetimeFigureOut">
               <a:rPr lang="en-US" smtClean="0"/>
               <a:t>1/11/22</a:t>
             </a:fld>
@@ -5141,7 +2491,7 @@
           <p:cNvPr id="4" name="Footer Placeholder 3">
             <a:extLst>
               <a:ext uri="{FF2B5EF4-FFF2-40B4-BE49-F238E27FC236}">
-                <a16:creationId xmlns:a16="http://schemas.microsoft.com/office/drawing/2014/main" id="{26FD45B6-FB4C-2A40-A3B0-CC66143DD240}"/>
+                <a16:creationId xmlns:a16="http://schemas.microsoft.com/office/drawing/2014/main" id="{BF039DF2-29B1-544D-BD19-DB8B0C4BD8EE}"/>
               </a:ext>
             </a:extLst>
           </p:cNvPr>
@@ -5166,7 +2516,7 @@
           <p:cNvPr id="5" name="Slide Number Placeholder 4">
             <a:extLst>
               <a:ext uri="{FF2B5EF4-FFF2-40B4-BE49-F238E27FC236}">
-                <a16:creationId xmlns:a16="http://schemas.microsoft.com/office/drawing/2014/main" id="{5A56460D-218C-EF43-BB43-3184F93E0858}"/>
+                <a16:creationId xmlns:a16="http://schemas.microsoft.com/office/drawing/2014/main" id="{FDD1858B-140D-5347-9C3E-A05FC9198F99}"/>
               </a:ext>
             </a:extLst>
           </p:cNvPr>
@@ -5182,7 +2532,7 @@
           <a:bodyPr/>
           <a:lstStyle/>
           <a:p>
-            <a:fld id="{C3D42199-6FFF-4641-805E-C920AB637C03}" type="slidenum">
+            <a:fld id="{FCCC9029-544E-0E44-B93B-AA58A7064529}" type="slidenum">
               <a:rPr lang="en-US" smtClean="0"/>
               <a:t>‹#›</a:t>
             </a:fld>
@@ -5193,7 +2543,7 @@
     </p:spTree>
     <p:extLst>
       <p:ext uri="{BB962C8B-B14F-4D97-AF65-F5344CB8AC3E}">
-        <p14:creationId xmlns:p14="http://schemas.microsoft.com/office/powerpoint/2010/main" val="1068146113"/>
+        <p14:creationId xmlns:p14="http://schemas.microsoft.com/office/powerpoint/2010/main" val="4269914091"/>
       </p:ext>
     </p:extLst>
   </p:cSld>
@@ -5225,7 +2575,7 @@
           <p:cNvPr id="2" name="Date Placeholder 1">
             <a:extLst>
               <a:ext uri="{FF2B5EF4-FFF2-40B4-BE49-F238E27FC236}">
-                <a16:creationId xmlns:a16="http://schemas.microsoft.com/office/drawing/2014/main" id="{6605CA5F-339B-534B-A698-65D26EE9DBDA}"/>
+                <a16:creationId xmlns:a16="http://schemas.microsoft.com/office/drawing/2014/main" id="{93E95895-AC1E-5F41-89C7-375524435B4E}"/>
               </a:ext>
             </a:extLst>
           </p:cNvPr>
@@ -5241,7 +2591,7 @@
           <a:bodyPr/>
           <a:lstStyle/>
           <a:p>
-            <a:fld id="{FA5EFB8A-D34C-5C4C-AEE0-50383CAE7DE1}" type="datetimeFigureOut">
+            <a:fld id="{71CD3EC6-36DF-1A41-B975-C54B8BE0B25A}" type="datetimeFigureOut">
               <a:rPr lang="en-US" smtClean="0"/>
               <a:t>1/11/22</a:t>
             </a:fld>
@@ -5254,7 +2604,7 @@
           <p:cNvPr id="3" name="Footer Placeholder 2">
             <a:extLst>
               <a:ext uri="{FF2B5EF4-FFF2-40B4-BE49-F238E27FC236}">
-                <a16:creationId xmlns:a16="http://schemas.microsoft.com/office/drawing/2014/main" id="{322600A3-780F-5A48-A22A-1DDE0507AAA3}"/>
+                <a16:creationId xmlns:a16="http://schemas.microsoft.com/office/drawing/2014/main" id="{7E3175BE-D741-174D-A76E-0D07F81040B7}"/>
               </a:ext>
             </a:extLst>
           </p:cNvPr>
@@ -5279,7 +2629,7 @@
           <p:cNvPr id="4" name="Slide Number Placeholder 3">
             <a:extLst>
               <a:ext uri="{FF2B5EF4-FFF2-40B4-BE49-F238E27FC236}">
-                <a16:creationId xmlns:a16="http://schemas.microsoft.com/office/drawing/2014/main" id="{5B4892A6-190E-8947-8DD1-461335ACAE3C}"/>
+                <a16:creationId xmlns:a16="http://schemas.microsoft.com/office/drawing/2014/main" id="{B4CB4F2B-C5A2-F94B-B4AE-E77F05DB69EF}"/>
               </a:ext>
             </a:extLst>
           </p:cNvPr>
@@ -5295,7 +2645,7 @@
           <a:bodyPr/>
           <a:lstStyle/>
           <a:p>
-            <a:fld id="{C3D42199-6FFF-4641-805E-C920AB637C03}" type="slidenum">
+            <a:fld id="{FCCC9029-544E-0E44-B93B-AA58A7064529}" type="slidenum">
               <a:rPr lang="en-US" smtClean="0"/>
               <a:t>‹#›</a:t>
             </a:fld>
@@ -5306,7 +2656,7 @@
     </p:spTree>
     <p:extLst>
       <p:ext uri="{BB962C8B-B14F-4D97-AF65-F5344CB8AC3E}">
-        <p14:creationId xmlns:p14="http://schemas.microsoft.com/office/powerpoint/2010/main" val="303895782"/>
+        <p14:creationId xmlns:p14="http://schemas.microsoft.com/office/powerpoint/2010/main" val="4235266473"/>
       </p:ext>
     </p:extLst>
   </p:cSld>
@@ -5338,7 +2688,7 @@
           <p:cNvPr id="2" name="Title 1">
             <a:extLst>
               <a:ext uri="{FF2B5EF4-FFF2-40B4-BE49-F238E27FC236}">
-                <a16:creationId xmlns:a16="http://schemas.microsoft.com/office/drawing/2014/main" id="{6E1FF56C-302B-B64F-9919-6838A8CBF3D0}"/>
+                <a16:creationId xmlns:a16="http://schemas.microsoft.com/office/drawing/2014/main" id="{0730634C-3149-E047-8794-33481D36C899}"/>
               </a:ext>
             </a:extLst>
           </p:cNvPr>
@@ -5375,7 +2725,7 @@
           <p:cNvPr id="3" name="Content Placeholder 2">
             <a:extLst>
               <a:ext uri="{FF2B5EF4-FFF2-40B4-BE49-F238E27FC236}">
-                <a16:creationId xmlns:a16="http://schemas.microsoft.com/office/drawing/2014/main" id="{E22AED3F-2BD3-914D-8F17-C81EE7A0A6BF}"/>
+                <a16:creationId xmlns:a16="http://schemas.microsoft.com/office/drawing/2014/main" id="{3156E947-ECBE-AE4F-BC5E-7718CD9A912C}"/>
               </a:ext>
             </a:extLst>
           </p:cNvPr>
@@ -5465,7 +2815,7 @@
           <p:cNvPr id="4" name="Text Placeholder 3">
             <a:extLst>
               <a:ext uri="{FF2B5EF4-FFF2-40B4-BE49-F238E27FC236}">
-                <a16:creationId xmlns:a16="http://schemas.microsoft.com/office/drawing/2014/main" id="{D98C8C2B-B526-9945-A066-0045A8068ACC}"/>
+                <a16:creationId xmlns:a16="http://schemas.microsoft.com/office/drawing/2014/main" id="{A8ACDC05-AB56-7641-89F4-A88DD2E097ED}"/>
               </a:ext>
             </a:extLst>
           </p:cNvPr>
@@ -5536,7 +2886,7 @@
           <p:cNvPr id="5" name="Date Placeholder 4">
             <a:extLst>
               <a:ext uri="{FF2B5EF4-FFF2-40B4-BE49-F238E27FC236}">
-                <a16:creationId xmlns:a16="http://schemas.microsoft.com/office/drawing/2014/main" id="{70860C9E-79FA-A547-B494-E4F43B49ABE3}"/>
+                <a16:creationId xmlns:a16="http://schemas.microsoft.com/office/drawing/2014/main" id="{C3686A94-8DFB-2445-98C4-8D642B36170E}"/>
               </a:ext>
             </a:extLst>
           </p:cNvPr>
@@ -5552,7 +2902,7 @@
           <a:bodyPr/>
           <a:lstStyle/>
           <a:p>
-            <a:fld id="{FA5EFB8A-D34C-5C4C-AEE0-50383CAE7DE1}" type="datetimeFigureOut">
+            <a:fld id="{71CD3EC6-36DF-1A41-B975-C54B8BE0B25A}" type="datetimeFigureOut">
               <a:rPr lang="en-US" smtClean="0"/>
               <a:t>1/11/22</a:t>
             </a:fld>
@@ -5565,7 +2915,7 @@
           <p:cNvPr id="6" name="Footer Placeholder 5">
             <a:extLst>
               <a:ext uri="{FF2B5EF4-FFF2-40B4-BE49-F238E27FC236}">
-                <a16:creationId xmlns:a16="http://schemas.microsoft.com/office/drawing/2014/main" id="{69F8A2AD-B521-0841-B852-0FCDE6FD9DDA}"/>
+                <a16:creationId xmlns:a16="http://schemas.microsoft.com/office/drawing/2014/main" id="{63981AA3-E5B5-8946-8041-99A7D8FBBED8}"/>
               </a:ext>
             </a:extLst>
           </p:cNvPr>
@@ -5590,7 +2940,7 @@
           <p:cNvPr id="7" name="Slide Number Placeholder 6">
             <a:extLst>
               <a:ext uri="{FF2B5EF4-FFF2-40B4-BE49-F238E27FC236}">
-                <a16:creationId xmlns:a16="http://schemas.microsoft.com/office/drawing/2014/main" id="{148C89CB-3FBE-7A42-A902-B26F6C5D98F7}"/>
+                <a16:creationId xmlns:a16="http://schemas.microsoft.com/office/drawing/2014/main" id="{176EF5D5-130A-2449-906F-623F1C5FE884}"/>
               </a:ext>
             </a:extLst>
           </p:cNvPr>
@@ -5606,7 +2956,7 @@
           <a:bodyPr/>
           <a:lstStyle/>
           <a:p>
-            <a:fld id="{C3D42199-6FFF-4641-805E-C920AB637C03}" type="slidenum">
+            <a:fld id="{FCCC9029-544E-0E44-B93B-AA58A7064529}" type="slidenum">
               <a:rPr lang="en-US" smtClean="0"/>
               <a:t>‹#›</a:t>
             </a:fld>
@@ -5617,7 +2967,7 @@
     </p:spTree>
     <p:extLst>
       <p:ext uri="{BB962C8B-B14F-4D97-AF65-F5344CB8AC3E}">
-        <p14:creationId xmlns:p14="http://schemas.microsoft.com/office/powerpoint/2010/main" val="1090266927"/>
+        <p14:creationId xmlns:p14="http://schemas.microsoft.com/office/powerpoint/2010/main" val="1572858252"/>
       </p:ext>
     </p:extLst>
   </p:cSld>
@@ -5649,7 +2999,7 @@
           <p:cNvPr id="2" name="Title 1">
             <a:extLst>
               <a:ext uri="{FF2B5EF4-FFF2-40B4-BE49-F238E27FC236}">
-                <a16:creationId xmlns:a16="http://schemas.microsoft.com/office/drawing/2014/main" id="{E7E92AF1-0DF0-D74C-B1F2-D0A13FEC82CD}"/>
+                <a16:creationId xmlns:a16="http://schemas.microsoft.com/office/drawing/2014/main" id="{14A61E1B-5822-D140-86F6-7E76C6F04FA8}"/>
               </a:ext>
             </a:extLst>
           </p:cNvPr>
@@ -5686,7 +3036,7 @@
           <p:cNvPr id="3" name="Picture Placeholder 2">
             <a:extLst>
               <a:ext uri="{FF2B5EF4-FFF2-40B4-BE49-F238E27FC236}">
-                <a16:creationId xmlns:a16="http://schemas.microsoft.com/office/drawing/2014/main" id="{1E06BEB1-BA38-D148-8887-EBF665E92F3A}"/>
+                <a16:creationId xmlns:a16="http://schemas.microsoft.com/office/drawing/2014/main" id="{18E08E04-CD2D-2045-BE0A-3A886BC69245}"/>
               </a:ext>
             </a:extLst>
           </p:cNvPr>
@@ -5753,7 +3103,7 @@
           <p:cNvPr id="4" name="Text Placeholder 3">
             <a:extLst>
               <a:ext uri="{FF2B5EF4-FFF2-40B4-BE49-F238E27FC236}">
-                <a16:creationId xmlns:a16="http://schemas.microsoft.com/office/drawing/2014/main" id="{13B84528-B064-2841-9EAF-99FB3771FFCE}"/>
+                <a16:creationId xmlns:a16="http://schemas.microsoft.com/office/drawing/2014/main" id="{FF881031-09C0-974B-B786-C0EBCD257D23}"/>
               </a:ext>
             </a:extLst>
           </p:cNvPr>
@@ -5824,7 +3174,7 @@
           <p:cNvPr id="5" name="Date Placeholder 4">
             <a:extLst>
               <a:ext uri="{FF2B5EF4-FFF2-40B4-BE49-F238E27FC236}">
-                <a16:creationId xmlns:a16="http://schemas.microsoft.com/office/drawing/2014/main" id="{8A681592-88B6-2944-A284-7FFFD30407A1}"/>
+                <a16:creationId xmlns:a16="http://schemas.microsoft.com/office/drawing/2014/main" id="{0126A952-6F23-6043-B6A3-D74F60B0574C}"/>
               </a:ext>
             </a:extLst>
           </p:cNvPr>
@@ -5840,7 +3190,7 @@
           <a:bodyPr/>
           <a:lstStyle/>
           <a:p>
-            <a:fld id="{FA5EFB8A-D34C-5C4C-AEE0-50383CAE7DE1}" type="datetimeFigureOut">
+            <a:fld id="{71CD3EC6-36DF-1A41-B975-C54B8BE0B25A}" type="datetimeFigureOut">
               <a:rPr lang="en-US" smtClean="0"/>
               <a:t>1/11/22</a:t>
             </a:fld>
@@ -5853,7 +3203,7 @@
           <p:cNvPr id="6" name="Footer Placeholder 5">
             <a:extLst>
               <a:ext uri="{FF2B5EF4-FFF2-40B4-BE49-F238E27FC236}">
-                <a16:creationId xmlns:a16="http://schemas.microsoft.com/office/drawing/2014/main" id="{7581E6E5-0EA4-F746-AF74-2E80F274C688}"/>
+                <a16:creationId xmlns:a16="http://schemas.microsoft.com/office/drawing/2014/main" id="{C6D95507-8EF2-7640-8953-B5799D15CD54}"/>
               </a:ext>
             </a:extLst>
           </p:cNvPr>
@@ -5878,7 +3228,7 @@
           <p:cNvPr id="7" name="Slide Number Placeholder 6">
             <a:extLst>
               <a:ext uri="{FF2B5EF4-FFF2-40B4-BE49-F238E27FC236}">
-                <a16:creationId xmlns:a16="http://schemas.microsoft.com/office/drawing/2014/main" id="{75B07F3D-AD4E-1F43-9CBE-024170B3107C}"/>
+                <a16:creationId xmlns:a16="http://schemas.microsoft.com/office/drawing/2014/main" id="{8DA5C042-FC67-7840-9F97-3779BB618021}"/>
               </a:ext>
             </a:extLst>
           </p:cNvPr>
@@ -5894,7 +3244,7 @@
           <a:bodyPr/>
           <a:lstStyle/>
           <a:p>
-            <a:fld id="{C3D42199-6FFF-4641-805E-C920AB637C03}" type="slidenum">
+            <a:fld id="{FCCC9029-544E-0E44-B93B-AA58A7064529}" type="slidenum">
               <a:rPr lang="en-US" smtClean="0"/>
               <a:t>‹#›</a:t>
             </a:fld>
@@ -5905,7 +3255,7 @@
     </p:spTree>
     <p:extLst>
       <p:ext uri="{BB962C8B-B14F-4D97-AF65-F5344CB8AC3E}">
-        <p14:creationId xmlns:p14="http://schemas.microsoft.com/office/powerpoint/2010/main" val="645215674"/>
+        <p14:creationId xmlns:p14="http://schemas.microsoft.com/office/powerpoint/2010/main" val="4205246994"/>
       </p:ext>
     </p:extLst>
   </p:cSld>
@@ -5972,7 +3322,7 @@
           <p:cNvPr id="2" name="Title Placeholder 1">
             <a:extLst>
               <a:ext uri="{FF2B5EF4-FFF2-40B4-BE49-F238E27FC236}">
-                <a16:creationId xmlns:a16="http://schemas.microsoft.com/office/drawing/2014/main" id="{66C9BEE8-D41B-F143-A946-CCAA7BCEC3EA}"/>
+                <a16:creationId xmlns:a16="http://schemas.microsoft.com/office/drawing/2014/main" id="{3200875F-F2CD-6345-8D4B-52A21D89A8E1}"/>
               </a:ext>
             </a:extLst>
           </p:cNvPr>
@@ -6010,7 +3360,7 @@
           <p:cNvPr id="3" name="Text Placeholder 2">
             <a:extLst>
               <a:ext uri="{FF2B5EF4-FFF2-40B4-BE49-F238E27FC236}">
-                <a16:creationId xmlns:a16="http://schemas.microsoft.com/office/drawing/2014/main" id="{8F9498EA-6EFD-4E48-BE13-978A893475C8}"/>
+                <a16:creationId xmlns:a16="http://schemas.microsoft.com/office/drawing/2014/main" id="{EC885CC7-F671-FC4F-92DE-0DA927AF09EF}"/>
               </a:ext>
             </a:extLst>
           </p:cNvPr>
@@ -6077,7 +3427,7 @@
           <p:cNvPr id="4" name="Date Placeholder 3">
             <a:extLst>
               <a:ext uri="{FF2B5EF4-FFF2-40B4-BE49-F238E27FC236}">
-                <a16:creationId xmlns:a16="http://schemas.microsoft.com/office/drawing/2014/main" id="{25CF1D20-11DB-9B4A-B76D-9D9FC1CBD0B5}"/>
+                <a16:creationId xmlns:a16="http://schemas.microsoft.com/office/drawing/2014/main" id="{2649CE03-B72D-364E-8493-730CFEC60846}"/>
               </a:ext>
             </a:extLst>
           </p:cNvPr>
@@ -6111,7 +3461,7 @@
             </a:lvl1pPr>
           </a:lstStyle>
           <a:p>
-            <a:fld id="{FA5EFB8A-D34C-5C4C-AEE0-50383CAE7DE1}" type="datetimeFigureOut">
+            <a:fld id="{71CD3EC6-36DF-1A41-B975-C54B8BE0B25A}" type="datetimeFigureOut">
               <a:rPr lang="en-US" smtClean="0"/>
               <a:t>1/11/22</a:t>
             </a:fld>
@@ -6124,7 +3474,7 @@
           <p:cNvPr id="5" name="Footer Placeholder 4">
             <a:extLst>
               <a:ext uri="{FF2B5EF4-FFF2-40B4-BE49-F238E27FC236}">
-                <a16:creationId xmlns:a16="http://schemas.microsoft.com/office/drawing/2014/main" id="{58D74AC3-16DC-444D-AA02-7F351745235E}"/>
+                <a16:creationId xmlns:a16="http://schemas.microsoft.com/office/drawing/2014/main" id="{935E5B32-3607-024F-B17D-09D400D246B7}"/>
               </a:ext>
             </a:extLst>
           </p:cNvPr>
@@ -6167,7 +3517,7 @@
           <p:cNvPr id="6" name="Slide Number Placeholder 5">
             <a:extLst>
               <a:ext uri="{FF2B5EF4-FFF2-40B4-BE49-F238E27FC236}">
-                <a16:creationId xmlns:a16="http://schemas.microsoft.com/office/drawing/2014/main" id="{165339F1-898F-D54B-B0B3-CDD158FD69DA}"/>
+                <a16:creationId xmlns:a16="http://schemas.microsoft.com/office/drawing/2014/main" id="{1E62FAF0-DC85-B647-A8DD-7237D4755EA9}"/>
               </a:ext>
             </a:extLst>
           </p:cNvPr>
@@ -6201,7 +3551,7 @@
             </a:lvl1pPr>
           </a:lstStyle>
           <a:p>
-            <a:fld id="{C3D42199-6FFF-4641-805E-C920AB637C03}" type="slidenum">
+            <a:fld id="{FCCC9029-544E-0E44-B93B-AA58A7064529}" type="slidenum">
               <a:rPr lang="en-US" smtClean="0"/>
               <a:t>‹#›</a:t>
             </a:fld>
@@ -6212,7 +3562,7 @@
     </p:spTree>
     <p:extLst>
       <p:ext uri="{BB962C8B-B14F-4D97-AF65-F5344CB8AC3E}">
-        <p14:creationId xmlns:p14="http://schemas.microsoft.com/office/powerpoint/2010/main" val="3237333323"/>
+        <p14:creationId xmlns:p14="http://schemas.microsoft.com/office/powerpoint/2010/main" val="3583037217"/>
       </p:ext>
     </p:extLst>
   </p:cSld>
@@ -6532,13 +3882,7 @@
       </p:grpSpPr>
       <p:sp>
         <p:nvSpPr>
-          <p:cNvPr id="2" name="Title 1">
-            <a:extLst>
-              <a:ext uri="{FF2B5EF4-FFF2-40B4-BE49-F238E27FC236}">
-                <a16:creationId xmlns:a16="http://schemas.microsoft.com/office/drawing/2014/main" id="{DB10F36C-DF82-0243-AF30-FEAA51A20634}"/>
-              </a:ext>
-            </a:extLst>
-          </p:cNvPr>
+          <p:cNvPr id="2" name="Title 1"/>
           <p:cNvSpPr>
             <a:spLocks noGrp="1"/>
           </p:cNvSpPr>
@@ -6551,10 +3895,35 @@
           <a:bodyPr/>
           <a:lstStyle/>
           <a:p>
-            <a:pPr algn="ctr"/>
-            <a:r>
-              <a:rPr lang="en-US" dirty="0"/>
-              <a:t>SESSION 4 SOAP NOTE</a:t>
+            <a:r>
+              <a:rPr lang="en-US" b="1">
+                <a:solidFill>
+                  <a:srgbClr val="FF0000"/>
+                </a:solidFill>
+              </a:rPr>
+              <a:t>Activity #21:  Review Lesson Plan for Session #3</a:t>
+            </a:r>
+          </a:p>
+        </p:txBody>
+      </p:sp>
+      <p:sp>
+        <p:nvSpPr>
+          <p:cNvPr id="3" name="Content Placeholder 2"/>
+          <p:cNvSpPr>
+            <a:spLocks noGrp="1"/>
+          </p:cNvSpPr>
+          <p:nvPr>
+            <p:ph idx="1"/>
+          </p:nvPr>
+        </p:nvSpPr>
+        <p:spPr/>
+        <p:txBody>
+          <a:bodyPr/>
+          <a:lstStyle/>
+          <a:p>
+            <a:r>
+              <a:rPr lang="en-US"/>
+              <a:t>Any questions?</a:t>
             </a:r>
           </a:p>
         </p:txBody>
@@ -6562,7 +3931,7 @@
     </p:spTree>
     <p:extLst>
       <p:ext uri="{BB962C8B-B14F-4D97-AF65-F5344CB8AC3E}">
-        <p14:creationId xmlns:p14="http://schemas.microsoft.com/office/powerpoint/2010/main" val="625936446"/>
+        <p14:creationId xmlns:p14="http://schemas.microsoft.com/office/powerpoint/2010/main" val="336724971"/>
       </p:ext>
     </p:extLst>
   </p:cSld>
@@ -6601,31 +3970,23 @@
         </p:nvSpPr>
         <p:spPr>
           <a:xfrm>
-            <a:off x="2231028" y="14749"/>
-            <a:ext cx="8436973" cy="1018903"/>
+            <a:off x="2152650" y="365127"/>
+            <a:ext cx="7886700" cy="710639"/>
           </a:xfrm>
         </p:spPr>
         <p:txBody>
           <a:bodyPr>
-            <a:normAutofit/>
+            <a:normAutofit fontScale="90000"/>
           </a:bodyPr>
           <a:lstStyle/>
           <a:p>
             <a:r>
-              <a:rPr lang="en-US" sz="2800" b="1" dirty="0">
+              <a:rPr lang="en-US" b="1" dirty="0">
                 <a:solidFill>
                   <a:srgbClr val="FF0000"/>
                 </a:solidFill>
               </a:rPr>
-              <a:t>Activity #25:  More Data Collection Practice </a:t>
-            </a:r>
-            <a:r>
-              <a:rPr lang="en-US" sz="2800" dirty="0">
-                <a:solidFill>
-                  <a:srgbClr val="FF0000"/>
-                </a:solidFill>
-              </a:rPr>
-              <a:t>(Session 5) </a:t>
+              <a:t>Activity #22:  Collect Data (Session 3)</a:t>
             </a:r>
           </a:p>
         </p:txBody>
@@ -6635,7 +3996,7 @@
           <p:cNvPr id="5" name="Content Placeholder 4">
             <a:extLst>
               <a:ext uri="{FF2B5EF4-FFF2-40B4-BE49-F238E27FC236}">
-                <a16:creationId xmlns:a16="http://schemas.microsoft.com/office/drawing/2014/main" id="{2ED61AC0-DBA7-D646-AF43-2B7B46DF6B47}"/>
+                <a16:creationId xmlns:a16="http://schemas.microsoft.com/office/drawing/2014/main" id="{1F0552AB-27BD-E44D-98D4-E3B1C93DDCB4}"/>
               </a:ext>
             </a:extLst>
           </p:cNvPr>
@@ -6652,8 +4013,12 @@
           <a:lstStyle/>
           <a:p>
             <a:r>
-              <a:rPr lang="en-US"/>
-              <a:t>Video location: SSD 5 Matthew TX </a:t>
+              <a:rPr lang="en-US" dirty="0"/>
+              <a:t>Video Location: </a:t>
+            </a:r>
+            <a:r>
+              <a:rPr lang="en-US"/>
+              <a:t>Treatment folder SSD 3 Matthew Tx</a:t>
             </a:r>
           </a:p>
         </p:txBody>
@@ -6661,7 +4026,7 @@
     </p:spTree>
     <p:extLst>
       <p:ext uri="{BB962C8B-B14F-4D97-AF65-F5344CB8AC3E}">
-        <p14:creationId xmlns:p14="http://schemas.microsoft.com/office/powerpoint/2010/main" val="99528774"/>
+        <p14:creationId xmlns:p14="http://schemas.microsoft.com/office/powerpoint/2010/main" val="561068977"/>
       </p:ext>
     </p:extLst>
   </p:cSld>
@@ -6690,46 +4055,12 @@
       </p:grpSpPr>
       <p:sp>
         <p:nvSpPr>
-          <p:cNvPr id="2" name="Title 1">
-            <a:extLst>
-              <a:ext uri="{FF2B5EF4-FFF2-40B4-BE49-F238E27FC236}">
-                <a16:creationId xmlns:a16="http://schemas.microsoft.com/office/drawing/2014/main" id="{F751355A-A37F-194A-9A8E-274E26C09340}"/>
-              </a:ext>
-            </a:extLst>
-          </p:cNvPr>
+          <p:cNvPr id="2" name="Title 1"/>
           <p:cNvSpPr>
             <a:spLocks noGrp="1"/>
           </p:cNvSpPr>
           <p:nvPr>
             <p:ph type="title"/>
-          </p:nvPr>
-        </p:nvSpPr>
-        <p:spPr/>
-        <p:txBody>
-          <a:bodyPr/>
-          <a:lstStyle/>
-          <a:p>
-            <a:r>
-              <a:rPr lang="en-US" dirty="0"/>
-              <a:t>Make Data Collection Efficient</a:t>
-            </a:r>
-          </a:p>
-        </p:txBody>
-      </p:sp>
-      <p:sp>
-        <p:nvSpPr>
-          <p:cNvPr id="3" name="Content Placeholder 2">
-            <a:extLst>
-              <a:ext uri="{FF2B5EF4-FFF2-40B4-BE49-F238E27FC236}">
-                <a16:creationId xmlns:a16="http://schemas.microsoft.com/office/drawing/2014/main" id="{46B3976B-9136-374E-8847-227B36F2FABF}"/>
-              </a:ext>
-            </a:extLst>
-          </p:cNvPr>
-          <p:cNvSpPr>
-            <a:spLocks noGrp="1"/>
-          </p:cNvSpPr>
-          <p:nvPr>
-            <p:ph idx="1"/>
           </p:nvPr>
         </p:nvSpPr>
         <p:spPr/>
@@ -6740,57 +4071,98 @@
           <a:lstStyle/>
           <a:p>
             <a:r>
-              <a:rPr lang="en-US" dirty="0"/>
-              <a:t>Start with goals that are easy to measure</a:t>
+              <a:rPr lang="en-US" b="1" dirty="0">
+                <a:solidFill>
+                  <a:srgbClr val="FF0000"/>
+                </a:solidFill>
+              </a:rPr>
+              <a:t>Activity 23: Strategies and Parent Counseling</a:t>
+            </a:r>
+            <a:r>
+              <a:rPr lang="en-US" b="1" dirty="0">
+                <a:solidFill>
+                  <a:srgbClr val="FF0000"/>
+                </a:solidFill>
+                <a:effectLst/>
+              </a:rPr>
+              <a:t> (Session 3)</a:t>
+            </a:r>
+            <a:endParaRPr lang="en-US" b="1" dirty="0">
+              <a:solidFill>
+                <a:srgbClr val="FF0000"/>
+              </a:solidFill>
+            </a:endParaRPr>
+          </a:p>
+        </p:txBody>
+      </p:sp>
+      <p:sp>
+        <p:nvSpPr>
+          <p:cNvPr id="3" name="Content Placeholder 2"/>
+          <p:cNvSpPr>
+            <a:spLocks noGrp="1"/>
+          </p:cNvSpPr>
+          <p:nvPr>
+            <p:ph idx="1"/>
+          </p:nvPr>
+        </p:nvSpPr>
+        <p:spPr/>
+        <p:txBody>
+          <a:bodyPr>
+            <a:normAutofit/>
+          </a:bodyPr>
+          <a:lstStyle/>
+          <a:p>
+            <a:pPr marL="0" indent="0">
+              <a:buNone/>
+            </a:pPr>
+            <a:r>
+              <a:rPr lang="en-US" sz="2400" dirty="0"/>
+              <a:t>After watching the whole session, answer the following questions:</a:t>
+            </a:r>
+          </a:p>
+          <a:p>
+            <a:r>
+              <a:rPr lang="en-US" sz="2400" dirty="0"/>
+              <a:t>Matthew really struggles to produce –</a:t>
+            </a:r>
+            <a:r>
+              <a:rPr lang="en-US" sz="2400" dirty="0" err="1"/>
+              <a:t>ks</a:t>
+            </a:r>
+            <a:r>
+              <a:rPr lang="en-US" sz="2400" dirty="0"/>
+              <a:t> at the end of words.  What strategies does the clinician use to try to teach Matthew?</a:t>
+            </a:r>
+          </a:p>
+          <a:p>
+            <a:r>
+              <a:rPr lang="en-US" sz="2400" dirty="0"/>
+              <a:t>What strategies does the clinician use to answer Matthew’s parents’ concerns?</a:t>
+            </a:r>
+          </a:p>
+          <a:p>
+            <a:r>
+              <a:rPr lang="en-US" sz="2400" dirty="0"/>
+              <a:t>Why doesn’t the clinician send home the –</a:t>
+            </a:r>
+            <a:r>
+              <a:rPr lang="en-US" sz="2400" dirty="0" err="1"/>
+              <a:t>ts</a:t>
+            </a:r>
+            <a:r>
+              <a:rPr lang="en-US" sz="2400" dirty="0"/>
+              <a:t> cards?</a:t>
             </a:r>
           </a:p>
           <a:p>
             <a:endParaRPr lang="en-US" dirty="0"/>
-          </a:p>
-          <a:p>
-            <a:r>
-              <a:rPr lang="en-US" dirty="0"/>
-              <a:t>Method of data collection reflects therapy setting and tasks</a:t>
-            </a:r>
-          </a:p>
-          <a:p>
-            <a:pPr lvl="1"/>
-            <a:r>
-              <a:rPr lang="en-US" dirty="0"/>
-              <a:t>Paper and pencil not always practical</a:t>
-            </a:r>
-          </a:p>
-          <a:p>
-            <a:pPr lvl="1"/>
-            <a:endParaRPr lang="en-US" dirty="0"/>
-          </a:p>
-          <a:p>
-            <a:r>
-              <a:rPr lang="en-US" dirty="0"/>
-              <a:t>Let client take own data</a:t>
-            </a:r>
-          </a:p>
-          <a:p>
-            <a:endParaRPr lang="en-US" dirty="0"/>
-          </a:p>
-          <a:p>
-            <a:r>
-              <a:rPr lang="en-US" dirty="0"/>
-              <a:t>Take good data less often</a:t>
-            </a:r>
-          </a:p>
-          <a:p>
-            <a:pPr marL="0" indent="0">
-              <a:buNone/>
-            </a:pPr>
-            <a:endParaRPr lang="en-US" sz="2400" dirty="0"/>
           </a:p>
         </p:txBody>
       </p:sp>
     </p:spTree>
     <p:extLst>
       <p:ext uri="{BB962C8B-B14F-4D97-AF65-F5344CB8AC3E}">
-        <p14:creationId xmlns:p14="http://schemas.microsoft.com/office/powerpoint/2010/main" val="4190771434"/>
+        <p14:creationId xmlns:p14="http://schemas.microsoft.com/office/powerpoint/2010/main" val="974664708"/>
       </p:ext>
     </p:extLst>
   </p:cSld>
@@ -6817,393 +4189,323 @@
           <a:chExt cx="0" cy="0"/>
         </a:xfrm>
       </p:grpSpPr>
-      <p:graphicFrame>
-        <p:nvGraphicFramePr>
-          <p:cNvPr id="6" name="Content Placeholder 5"/>
-          <p:cNvGraphicFramePr>
-            <a:graphicFrameLocks noGrp="1"/>
-          </p:cNvGraphicFramePr>
-          <p:nvPr>
-            <p:ph idx="1"/>
-          </p:nvPr>
-        </p:nvGraphicFramePr>
-        <p:xfrm>
-          <a:off x="2152650" y="1825625"/>
-          <a:ext cx="7886700" cy="4351338"/>
-        </p:xfrm>
-        <a:graphic>
-          <a:graphicData uri="http://schemas.openxmlformats.org/drawingml/2006/diagram">
-            <dgm:relIds xmlns:dgm="http://schemas.openxmlformats.org/drawingml/2006/diagram" xmlns:r="http://schemas.openxmlformats.org/officeDocument/2006/relationships" r:dm="rId2" r:lo="rId3" r:qs="rId4" r:cs="rId5"/>
-          </a:graphicData>
-        </a:graphic>
-      </p:graphicFrame>
-      <p:sp>
-        <p:nvSpPr>
-          <p:cNvPr id="7" name="TextBox 6"/>
-          <p:cNvSpPr txBox="1"/>
-          <p:nvPr/>
+      <p:sp>
+        <p:nvSpPr>
+          <p:cNvPr id="2" name="Title 1"/>
+          <p:cNvSpPr>
+            <a:spLocks noGrp="1"/>
+          </p:cNvSpPr>
+          <p:nvPr>
+            <p:ph type="title"/>
+          </p:nvPr>
         </p:nvSpPr>
         <p:spPr>
           <a:xfrm>
-            <a:off x="2613025" y="356462"/>
-            <a:ext cx="7481538" cy="984885"/>
+            <a:off x="2152650" y="210748"/>
+            <a:ext cx="7886700" cy="1325563"/>
           </a:xfrm>
-          <a:prstGeom prst="rect">
-            <a:avLst/>
-          </a:prstGeom>
-          <a:noFill/>
         </p:spPr>
         <p:txBody>
-          <a:bodyPr wrap="square" rtlCol="0">
-            <a:spAutoFit/>
-          </a:bodyPr>
+          <a:bodyPr/>
           <a:lstStyle/>
           <a:p>
             <a:pPr algn="ctr"/>
             <a:r>
-              <a:rPr lang="en-US" sz="4000"/>
-              <a:t>Big Picture</a:t>
-            </a:r>
-            <a:endParaRPr lang="en-US" sz="4000" b="1"/>
-          </a:p>
-          <a:p>
-            <a:pPr algn="ctr"/>
-            <a:r>
-              <a:rPr lang="en-US" b="1"/>
-              <a:t>Assessment/Treatment Planning/Treatment Cycle</a:t>
-            </a:r>
-            <a:endParaRPr lang="en-US"/>
-          </a:p>
-        </p:txBody>
-      </p:sp>
-      <p:sp>
-        <p:nvSpPr>
-          <p:cNvPr id="8" name="TextBox 7"/>
-          <p:cNvSpPr txBox="1"/>
-          <p:nvPr/>
+              <a:rPr lang="en-US" dirty="0"/>
+              <a:t>SESSION 3 SOAP NOTE</a:t>
+            </a:r>
+          </a:p>
+        </p:txBody>
+      </p:sp>
+    </p:spTree>
+    <p:extLst>
+      <p:ext uri="{BB962C8B-B14F-4D97-AF65-F5344CB8AC3E}">
+        <p14:creationId xmlns:p14="http://schemas.microsoft.com/office/powerpoint/2010/main" val="2121757163"/>
+      </p:ext>
+    </p:extLst>
+  </p:cSld>
+  <p:clrMapOvr>
+    <a:masterClrMapping/>
+  </p:clrMapOvr>
+</p:sld>
+</file>
+
+<file path=ppt/slides/slide5.xml><?xml version="1.0" encoding="utf-8"?>
+<p:sld xmlns:a="http://schemas.openxmlformats.org/drawingml/2006/main" xmlns:r="http://schemas.openxmlformats.org/officeDocument/2006/relationships" xmlns:p="http://schemas.openxmlformats.org/presentationml/2006/main">
+  <p:cSld>
+    <p:spTree>
+      <p:nvGrpSpPr>
+        <p:cNvPr id="1" name=""/>
+        <p:cNvGrpSpPr/>
+        <p:nvPr/>
+      </p:nvGrpSpPr>
+      <p:grpSpPr>
+        <a:xfrm>
+          <a:off x="0" y="0"/>
+          <a:ext cx="0" cy="0"/>
+          <a:chOff x="0" y="0"/>
+          <a:chExt cx="0" cy="0"/>
+        </a:xfrm>
+      </p:grpSpPr>
+      <p:sp>
+        <p:nvSpPr>
+          <p:cNvPr id="2" name="Title 1"/>
+          <p:cNvSpPr>
+            <a:spLocks noGrp="1"/>
+          </p:cNvSpPr>
+          <p:nvPr>
+            <p:ph type="title"/>
+          </p:nvPr>
         </p:nvSpPr>
         <p:spPr>
           <a:xfrm>
-            <a:off x="7762067" y="1801814"/>
-            <a:ext cx="2185262" cy="646331"/>
+            <a:off x="2152650" y="247561"/>
+            <a:ext cx="7886700" cy="758280"/>
           </a:xfrm>
-          <a:prstGeom prst="rect">
-            <a:avLst/>
-          </a:prstGeom>
-          <a:noFill/>
         </p:spPr>
         <p:txBody>
-          <a:bodyPr wrap="square" rtlCol="0">
-            <a:spAutoFit/>
+          <a:bodyPr>
+            <a:normAutofit fontScale="90000"/>
           </a:bodyPr>
           <a:lstStyle/>
           <a:p>
             <a:r>
-              <a:rPr lang="en-US"/>
-              <a:t>Referral, Intake, File Review</a:t>
-            </a:r>
-          </a:p>
-        </p:txBody>
-      </p:sp>
-      <p:sp>
-        <p:nvSpPr>
-          <p:cNvPr id="12" name="TextBox 11"/>
-          <p:cNvSpPr txBox="1"/>
-          <p:nvPr/>
-        </p:nvSpPr>
-        <p:spPr>
-          <a:xfrm>
-            <a:off x="5215987" y="3286954"/>
-            <a:ext cx="1751309" cy="1015663"/>
-          </a:xfrm>
-          <a:prstGeom prst="rect">
-            <a:avLst/>
-          </a:prstGeom>
-          <a:noFill/>
-        </p:spPr>
-        <p:txBody>
-          <a:bodyPr wrap="square" rtlCol="0">
-            <a:spAutoFit/>
-          </a:bodyPr>
-          <a:lstStyle/>
-          <a:p>
-            <a:pPr algn="ctr"/>
-            <a:r>
-              <a:rPr lang="en-US" sz="2000" b="1">
+              <a:rPr lang="en-US" b="1" dirty="0">
                 <a:solidFill>
                   <a:srgbClr val="FF0000"/>
                 </a:solidFill>
               </a:rPr>
-              <a:t>Ongoing Progress Monitoring</a:t>
-            </a:r>
-          </a:p>
-        </p:txBody>
-      </p:sp>
-      <p:sp>
-        <p:nvSpPr>
-          <p:cNvPr id="13" name="TextBox 12"/>
-          <p:cNvSpPr txBox="1"/>
-          <p:nvPr/>
+              <a:t>Assignment 3:  Create a data sheet </a:t>
+            </a:r>
+            <a:br>
+              <a:rPr lang="en-US" b="1" dirty="0">
+                <a:solidFill>
+                  <a:srgbClr val="FF0000"/>
+                </a:solidFill>
+              </a:rPr>
+            </a:br>
+            <a:endParaRPr lang="en-US" b="1" dirty="0">
+              <a:solidFill>
+                <a:srgbClr val="FF0000"/>
+              </a:solidFill>
+            </a:endParaRPr>
+          </a:p>
+        </p:txBody>
+      </p:sp>
+      <p:sp>
+        <p:nvSpPr>
+          <p:cNvPr id="3" name="Content Placeholder 2"/>
+          <p:cNvSpPr>
+            <a:spLocks noGrp="1"/>
+          </p:cNvSpPr>
+          <p:nvPr>
+            <p:ph idx="1"/>
+          </p:nvPr>
         </p:nvSpPr>
         <p:spPr>
           <a:xfrm>
-            <a:off x="8854698" y="2743201"/>
-            <a:ext cx="1518834" cy="646331"/>
+            <a:off x="1857920" y="718548"/>
+            <a:ext cx="8476161" cy="6025153"/>
           </a:xfrm>
-          <a:prstGeom prst="rect">
-            <a:avLst/>
-          </a:prstGeom>
-          <a:noFill/>
         </p:spPr>
         <p:txBody>
-          <a:bodyPr wrap="square" rtlCol="0">
-            <a:spAutoFit/>
+          <a:bodyPr>
+            <a:normAutofit fontScale="77500" lnSpcReduction="20000"/>
           </a:bodyPr>
           <a:lstStyle/>
           <a:p>
-            <a:r>
-              <a:rPr lang="en-US"/>
-              <a:t>Differential Diagnosis</a:t>
-            </a:r>
-          </a:p>
-        </p:txBody>
-      </p:sp>
-      <p:sp>
-        <p:nvSpPr>
-          <p:cNvPr id="14" name="TextBox 13"/>
-          <p:cNvSpPr txBox="1"/>
-          <p:nvPr/>
-        </p:nvSpPr>
-        <p:spPr>
-          <a:xfrm>
-            <a:off x="3073831" y="5787758"/>
-            <a:ext cx="3279964" cy="369332"/>
-          </a:xfrm>
-          <a:prstGeom prst="rect">
-            <a:avLst/>
-          </a:prstGeom>
-          <a:noFill/>
-        </p:spPr>
-        <p:txBody>
-          <a:bodyPr wrap="square" rtlCol="0">
-            <a:spAutoFit/>
-          </a:bodyPr>
-          <a:lstStyle/>
-          <a:p>
-            <a:r>
-              <a:rPr lang="en-US"/>
-              <a:t>Reviewing Empirical Evidence</a:t>
-            </a:r>
-          </a:p>
-        </p:txBody>
-      </p:sp>
-      <p:sp>
-        <p:nvSpPr>
-          <p:cNvPr id="15" name="TextBox 14"/>
-          <p:cNvSpPr txBox="1"/>
-          <p:nvPr/>
-        </p:nvSpPr>
-        <p:spPr>
-          <a:xfrm>
-            <a:off x="8498237" y="3471621"/>
-            <a:ext cx="1596326" cy="646331"/>
-          </a:xfrm>
-          <a:prstGeom prst="rect">
-            <a:avLst/>
-          </a:prstGeom>
-          <a:noFill/>
-        </p:spPr>
-        <p:txBody>
-          <a:bodyPr wrap="square" rtlCol="0">
-            <a:spAutoFit/>
-          </a:bodyPr>
-          <a:lstStyle/>
-          <a:p>
-            <a:r>
-              <a:rPr lang="en-US"/>
-              <a:t>Programmatic Evidence</a:t>
-            </a:r>
-          </a:p>
-        </p:txBody>
-      </p:sp>
-      <p:sp>
-        <p:nvSpPr>
-          <p:cNvPr id="16" name="TextBox 15"/>
-          <p:cNvSpPr txBox="1"/>
-          <p:nvPr/>
-        </p:nvSpPr>
-        <p:spPr>
-          <a:xfrm>
-            <a:off x="6576447" y="5787758"/>
-            <a:ext cx="3518116" cy="369332"/>
-          </a:xfrm>
-          <a:prstGeom prst="rect">
-            <a:avLst/>
-          </a:prstGeom>
-          <a:noFill/>
-        </p:spPr>
-        <p:txBody>
-          <a:bodyPr wrap="square" rtlCol="0">
-            <a:spAutoFit/>
-          </a:bodyPr>
-          <a:lstStyle/>
-          <a:p>
-            <a:r>
-              <a:rPr lang="en-US"/>
-              <a:t>Selecting a Treatment Approach</a:t>
-            </a:r>
-          </a:p>
-        </p:txBody>
-      </p:sp>
-      <p:sp>
-        <p:nvSpPr>
-          <p:cNvPr id="17" name="TextBox 16"/>
-          <p:cNvSpPr txBox="1"/>
-          <p:nvPr/>
-        </p:nvSpPr>
-        <p:spPr>
-          <a:xfrm>
-            <a:off x="3585275" y="6110924"/>
-            <a:ext cx="2991173" cy="646331"/>
-          </a:xfrm>
-          <a:prstGeom prst="rect">
-            <a:avLst/>
-          </a:prstGeom>
-          <a:noFill/>
-        </p:spPr>
-        <p:txBody>
-          <a:bodyPr wrap="square" rtlCol="0">
-            <a:spAutoFit/>
-          </a:bodyPr>
-          <a:lstStyle/>
-          <a:p>
-            <a:r>
-              <a:rPr lang="en-US"/>
-              <a:t>Determining Frequency, Duration, Service delivery</a:t>
-            </a:r>
-          </a:p>
-        </p:txBody>
-      </p:sp>
-      <p:sp>
-        <p:nvSpPr>
-          <p:cNvPr id="18" name="TextBox 17"/>
-          <p:cNvSpPr txBox="1"/>
-          <p:nvPr/>
-        </p:nvSpPr>
-        <p:spPr>
-          <a:xfrm>
-            <a:off x="3427455" y="1880674"/>
-            <a:ext cx="1286359" cy="646331"/>
-          </a:xfrm>
-          <a:prstGeom prst="rect">
-            <a:avLst/>
-          </a:prstGeom>
-          <a:noFill/>
-        </p:spPr>
-        <p:txBody>
-          <a:bodyPr wrap="square" rtlCol="0">
-            <a:spAutoFit/>
-          </a:bodyPr>
-          <a:lstStyle/>
-          <a:p>
-            <a:r>
-              <a:rPr lang="en-US"/>
-              <a:t>Session Planning</a:t>
-            </a:r>
-          </a:p>
-        </p:txBody>
-      </p:sp>
-      <p:sp>
-        <p:nvSpPr>
-          <p:cNvPr id="19" name="TextBox 18"/>
-          <p:cNvSpPr txBox="1"/>
-          <p:nvPr/>
-        </p:nvSpPr>
-        <p:spPr>
-          <a:xfrm>
-            <a:off x="2613025" y="2862445"/>
-            <a:ext cx="1282216" cy="646331"/>
-          </a:xfrm>
-          <a:prstGeom prst="rect">
-            <a:avLst/>
-          </a:prstGeom>
-          <a:noFill/>
-        </p:spPr>
-        <p:txBody>
-          <a:bodyPr wrap="square" rtlCol="0">
-            <a:spAutoFit/>
-          </a:bodyPr>
-          <a:lstStyle/>
-          <a:p>
-            <a:r>
-              <a:rPr lang="en-US"/>
-              <a:t>Data Collection</a:t>
-            </a:r>
-          </a:p>
-        </p:txBody>
-      </p:sp>
-      <p:sp>
-        <p:nvSpPr>
-          <p:cNvPr id="21" name="TextBox 20"/>
-          <p:cNvSpPr txBox="1"/>
-          <p:nvPr/>
-        </p:nvSpPr>
-        <p:spPr>
-          <a:xfrm>
-            <a:off x="6576448" y="6276814"/>
-            <a:ext cx="2882685" cy="369332"/>
-          </a:xfrm>
-          <a:prstGeom prst="rect">
-            <a:avLst/>
-          </a:prstGeom>
-          <a:noFill/>
-        </p:spPr>
-        <p:txBody>
-          <a:bodyPr wrap="square" rtlCol="0">
-            <a:spAutoFit/>
-          </a:bodyPr>
-          <a:lstStyle/>
-          <a:p>
-            <a:r>
-              <a:rPr lang="en-US"/>
-              <a:t>Goal Selection</a:t>
-            </a:r>
-          </a:p>
-        </p:txBody>
-      </p:sp>
-      <p:sp>
-        <p:nvSpPr>
-          <p:cNvPr id="20" name="TextBox 19"/>
-          <p:cNvSpPr txBox="1"/>
-          <p:nvPr/>
-        </p:nvSpPr>
-        <p:spPr>
-          <a:xfrm>
-            <a:off x="2543629" y="4001295"/>
-            <a:ext cx="1355486" cy="830997"/>
-          </a:xfrm>
-          <a:prstGeom prst="rect">
-            <a:avLst/>
-          </a:prstGeom>
-          <a:noFill/>
-        </p:spPr>
-        <p:txBody>
-          <a:bodyPr wrap="square" rtlCol="0">
-            <a:spAutoFit/>
-          </a:bodyPr>
-          <a:lstStyle/>
-          <a:p>
-            <a:r>
-              <a:rPr lang="en-US" sz="1600"/>
-              <a:t>Service Delivery, Referral</a:t>
-            </a:r>
+            <a:pPr marL="0" indent="0">
+              <a:buNone/>
+            </a:pPr>
+            <a:r>
+              <a:rPr lang="en-US" b="1" dirty="0">
+                <a:solidFill>
+                  <a:schemeClr val="tx2">
+                    <a:lumMod val="50000"/>
+                  </a:schemeClr>
+                </a:solidFill>
+              </a:rPr>
+              <a:t>Scenario #1</a:t>
+            </a:r>
+            <a:r>
+              <a:rPr lang="en-US" dirty="0">
+                <a:solidFill>
+                  <a:schemeClr val="tx2">
+                    <a:lumMod val="50000"/>
+                  </a:schemeClr>
+                </a:solidFill>
+              </a:rPr>
+              <a:t>:  11-year-old with mixed expressive/receptive language delays secondary to Down Syndrome</a:t>
+            </a:r>
+            <a:endParaRPr lang="en-US" sz="1100" dirty="0">
+              <a:solidFill>
+                <a:schemeClr val="tx2">
+                  <a:lumMod val="50000"/>
+                </a:schemeClr>
+              </a:solidFill>
+            </a:endParaRPr>
+          </a:p>
+          <a:p>
+            <a:pPr marL="0" indent="0">
+              <a:buNone/>
+            </a:pPr>
+            <a:r>
+              <a:rPr lang="en-US" dirty="0">
+                <a:solidFill>
+                  <a:schemeClr val="tx2">
+                    <a:lumMod val="50000"/>
+                  </a:schemeClr>
+                </a:solidFill>
+              </a:rPr>
+              <a:t>Goal:  When given incomplete, inaccurate, or complex oral directions during structured therapy activities, </a:t>
+            </a:r>
+            <a:r>
+              <a:rPr lang="en-US" dirty="0" err="1">
+                <a:solidFill>
+                  <a:schemeClr val="tx2">
+                    <a:lumMod val="50000"/>
+                  </a:schemeClr>
+                </a:solidFill>
+              </a:rPr>
+              <a:t>Detriche</a:t>
+            </a:r>
+            <a:r>
+              <a:rPr lang="en-US" dirty="0">
+                <a:solidFill>
+                  <a:schemeClr val="tx2">
+                    <a:lumMod val="50000"/>
+                  </a:schemeClr>
+                </a:solidFill>
+              </a:rPr>
+              <a:t> will ask appropriate clarifying questions on at least 80% of the opportunities across 2 consecutive sessions. </a:t>
+            </a:r>
+          </a:p>
+          <a:p>
+            <a:pPr marL="0" indent="0">
+              <a:buNone/>
+            </a:pPr>
+            <a:endParaRPr lang="en-US" sz="1200" dirty="0">
+              <a:solidFill>
+                <a:schemeClr val="tx2">
+                  <a:lumMod val="50000"/>
+                </a:schemeClr>
+              </a:solidFill>
+            </a:endParaRPr>
+          </a:p>
+          <a:p>
+            <a:pPr marL="0" indent="0">
+              <a:buNone/>
+            </a:pPr>
+            <a:r>
+              <a:rPr lang="en-US" dirty="0">
+                <a:solidFill>
+                  <a:schemeClr val="tx2">
+                    <a:lumMod val="50000"/>
+                  </a:schemeClr>
+                </a:solidFill>
+              </a:rPr>
+              <a:t>Baseline:  </a:t>
+            </a:r>
+            <a:r>
+              <a:rPr lang="en-US" dirty="0" err="1">
+                <a:solidFill>
+                  <a:schemeClr val="tx2">
+                    <a:lumMod val="50000"/>
+                  </a:schemeClr>
+                </a:solidFill>
+              </a:rPr>
+              <a:t>Detriche</a:t>
+            </a:r>
+            <a:r>
+              <a:rPr lang="en-US" dirty="0">
+                <a:solidFill>
+                  <a:schemeClr val="tx2">
+                    <a:lumMod val="50000"/>
+                  </a:schemeClr>
+                </a:solidFill>
+              </a:rPr>
+              <a:t> does not ask clarifying questions, but will attempt to follow oral directions even when he has insufficient information or does not understand the direction.</a:t>
+            </a:r>
+          </a:p>
+          <a:p>
+            <a:pPr marL="0" indent="0">
+              <a:buNone/>
+            </a:pPr>
+            <a:r>
+              <a:rPr lang="en-US" dirty="0"/>
+              <a:t> </a:t>
+            </a:r>
+          </a:p>
+          <a:p>
+            <a:pPr marL="0" indent="0">
+              <a:buNone/>
+            </a:pPr>
+            <a:r>
+              <a:rPr lang="en-US" b="1" dirty="0">
+                <a:solidFill>
+                  <a:schemeClr val="accent2">
+                    <a:lumMod val="50000"/>
+                  </a:schemeClr>
+                </a:solidFill>
+              </a:rPr>
+              <a:t>Scenario #2:</a:t>
+            </a:r>
+            <a:r>
+              <a:rPr lang="en-US" dirty="0">
+                <a:solidFill>
+                  <a:schemeClr val="accent2">
+                    <a:lumMod val="50000"/>
+                  </a:schemeClr>
+                </a:solidFill>
+              </a:rPr>
+              <a:t>  65-year-old male with dysarthria, secondary to a stroke</a:t>
+            </a:r>
+          </a:p>
+          <a:p>
+            <a:r>
+              <a:rPr lang="en-US" dirty="0">
+                <a:solidFill>
+                  <a:schemeClr val="accent2">
+                    <a:lumMod val="50000"/>
+                  </a:schemeClr>
+                </a:solidFill>
+              </a:rPr>
+              <a:t> Goal:   During conversation in the therapy setting, John will independently repair a communication breakdown by using gestures, writing, and/or his personalized communication book on at least 3 of 5 occasions across 2 sessions.</a:t>
+            </a:r>
+          </a:p>
+          <a:p>
+            <a:endParaRPr lang="en-US" sz="1100" dirty="0">
+              <a:solidFill>
+                <a:schemeClr val="accent2">
+                  <a:lumMod val="50000"/>
+                </a:schemeClr>
+              </a:solidFill>
+            </a:endParaRPr>
+          </a:p>
+          <a:p>
+            <a:r>
+              <a:rPr lang="en-US" dirty="0">
+                <a:solidFill>
+                  <a:schemeClr val="accent2">
+                    <a:lumMod val="50000"/>
+                  </a:schemeClr>
+                </a:solidFill>
+              </a:rPr>
+              <a:t>Baseline:  When a communication breakdown occurs, John will restate his message, but that is often unsuccessful in resolving the breakdown.  He needs verbal prompts to use augmentative communication strategies.</a:t>
+            </a:r>
+          </a:p>
+          <a:p>
+            <a:pPr marL="0" indent="0">
+              <a:buNone/>
+            </a:pPr>
+            <a:endParaRPr lang="en-US" dirty="0"/>
           </a:p>
         </p:txBody>
       </p:sp>
     </p:spTree>
     <p:extLst>
       <p:ext uri="{BB962C8B-B14F-4D97-AF65-F5344CB8AC3E}">
-        <p14:creationId xmlns:p14="http://schemas.microsoft.com/office/powerpoint/2010/main" val="406816722"/>
+        <p14:creationId xmlns:p14="http://schemas.microsoft.com/office/powerpoint/2010/main" val="415209136"/>
       </p:ext>
     </p:extLst>
   </p:cSld>

</xml_diff>